<commit_message>
some command added in My-Note
</commit_message>
<xml_diff>
--- a/My_Notes.pptx
+++ b/My_Notes.pptx
@@ -6,10 +6,24 @@
   </p:sldMasterIdLst>
   <p:sldIdLst>
     <p:sldId id="256" r:id="rId2"/>
-    <p:sldId id="257" r:id="rId3"/>
-    <p:sldId id="258" r:id="rId4"/>
-    <p:sldId id="259" r:id="rId5"/>
-    <p:sldId id="260" r:id="rId6"/>
+    <p:sldId id="262" r:id="rId3"/>
+    <p:sldId id="257" r:id="rId4"/>
+    <p:sldId id="258" r:id="rId5"/>
+    <p:sldId id="259" r:id="rId6"/>
+    <p:sldId id="260" r:id="rId7"/>
+    <p:sldId id="263" r:id="rId8"/>
+    <p:sldId id="261" r:id="rId9"/>
+    <p:sldId id="264" r:id="rId10"/>
+    <p:sldId id="265" r:id="rId11"/>
+    <p:sldId id="266" r:id="rId12"/>
+    <p:sldId id="267" r:id="rId13"/>
+    <p:sldId id="268" r:id="rId14"/>
+    <p:sldId id="269" r:id="rId15"/>
+    <p:sldId id="270" r:id="rId16"/>
+    <p:sldId id="271" r:id="rId17"/>
+    <p:sldId id="272" r:id="rId18"/>
+    <p:sldId id="273" r:id="rId19"/>
+    <p:sldId id="274" r:id="rId20"/>
   </p:sldIdLst>
   <p:sldSz cx="12192000" cy="6858000"/>
   <p:notesSz cx="6858000" cy="9144000"/>
@@ -247,7 +261,7 @@
           <a:p>
             <a:fld id="{7E78085B-F18A-4A1F-99A8-25ED8654ADA2}" type="datetimeFigureOut">
               <a:rPr lang="en-US" smtClean="0"/>
-              <a:t>7/8/2020</a:t>
+              <a:t>7/9/2020</a:t>
             </a:fld>
             <a:endParaRPr lang="en-US"/>
           </a:p>
@@ -417,7 +431,7 @@
           <a:p>
             <a:fld id="{7E78085B-F18A-4A1F-99A8-25ED8654ADA2}" type="datetimeFigureOut">
               <a:rPr lang="en-US" smtClean="0"/>
-              <a:t>7/8/2020</a:t>
+              <a:t>7/9/2020</a:t>
             </a:fld>
             <a:endParaRPr lang="en-US"/>
           </a:p>
@@ -597,7 +611,7 @@
           <a:p>
             <a:fld id="{7E78085B-F18A-4A1F-99A8-25ED8654ADA2}" type="datetimeFigureOut">
               <a:rPr lang="en-US" smtClean="0"/>
-              <a:t>7/8/2020</a:t>
+              <a:t>7/9/2020</a:t>
             </a:fld>
             <a:endParaRPr lang="en-US"/>
           </a:p>
@@ -767,7 +781,7 @@
           <a:p>
             <a:fld id="{7E78085B-F18A-4A1F-99A8-25ED8654ADA2}" type="datetimeFigureOut">
               <a:rPr lang="en-US" smtClean="0"/>
-              <a:t>7/8/2020</a:t>
+              <a:t>7/9/2020</a:t>
             </a:fld>
             <a:endParaRPr lang="en-US"/>
           </a:p>
@@ -1013,7 +1027,7 @@
           <a:p>
             <a:fld id="{7E78085B-F18A-4A1F-99A8-25ED8654ADA2}" type="datetimeFigureOut">
               <a:rPr lang="en-US" smtClean="0"/>
-              <a:t>7/8/2020</a:t>
+              <a:t>7/9/2020</a:t>
             </a:fld>
             <a:endParaRPr lang="en-US"/>
           </a:p>
@@ -1245,7 +1259,7 @@
           <a:p>
             <a:fld id="{7E78085B-F18A-4A1F-99A8-25ED8654ADA2}" type="datetimeFigureOut">
               <a:rPr lang="en-US" smtClean="0"/>
-              <a:t>7/8/2020</a:t>
+              <a:t>7/9/2020</a:t>
             </a:fld>
             <a:endParaRPr lang="en-US"/>
           </a:p>
@@ -1612,7 +1626,7 @@
           <a:p>
             <a:fld id="{7E78085B-F18A-4A1F-99A8-25ED8654ADA2}" type="datetimeFigureOut">
               <a:rPr lang="en-US" smtClean="0"/>
-              <a:t>7/8/2020</a:t>
+              <a:t>7/9/2020</a:t>
             </a:fld>
             <a:endParaRPr lang="en-US"/>
           </a:p>
@@ -1730,7 +1744,7 @@
           <a:p>
             <a:fld id="{7E78085B-F18A-4A1F-99A8-25ED8654ADA2}" type="datetimeFigureOut">
               <a:rPr lang="en-US" smtClean="0"/>
-              <a:t>7/8/2020</a:t>
+              <a:t>7/9/2020</a:t>
             </a:fld>
             <a:endParaRPr lang="en-US"/>
           </a:p>
@@ -1825,7 +1839,7 @@
           <a:p>
             <a:fld id="{7E78085B-F18A-4A1F-99A8-25ED8654ADA2}" type="datetimeFigureOut">
               <a:rPr lang="en-US" smtClean="0"/>
-              <a:t>7/8/2020</a:t>
+              <a:t>7/9/2020</a:t>
             </a:fld>
             <a:endParaRPr lang="en-US"/>
           </a:p>
@@ -2102,7 +2116,7 @@
           <a:p>
             <a:fld id="{7E78085B-F18A-4A1F-99A8-25ED8654ADA2}" type="datetimeFigureOut">
               <a:rPr lang="en-US" smtClean="0"/>
-              <a:t>7/8/2020</a:t>
+              <a:t>7/9/2020</a:t>
             </a:fld>
             <a:endParaRPr lang="en-US"/>
           </a:p>
@@ -2355,7 +2369,7 @@
           <a:p>
             <a:fld id="{7E78085B-F18A-4A1F-99A8-25ED8654ADA2}" type="datetimeFigureOut">
               <a:rPr lang="en-US" smtClean="0"/>
-              <a:t>7/8/2020</a:t>
+              <a:t>7/9/2020</a:t>
             </a:fld>
             <a:endParaRPr lang="en-US"/>
           </a:p>
@@ -2568,7 +2582,7 @@
           <a:p>
             <a:fld id="{7E78085B-F18A-4A1F-99A8-25ED8654ADA2}" type="datetimeFigureOut">
               <a:rPr lang="en-US" smtClean="0"/>
-              <a:t>7/8/2020</a:t>
+              <a:t>7/9/2020</a:t>
             </a:fld>
             <a:endParaRPr lang="en-US"/>
           </a:p>
@@ -3017,6 +3031,734 @@
 </p:sld>
 </file>
 
+<file path=ppt/slides/slide10.xml><?xml version="1.0" encoding="utf-8"?>
+<p:sld xmlns:a="http://schemas.openxmlformats.org/drawingml/2006/main" xmlns:r="http://schemas.openxmlformats.org/officeDocument/2006/relationships" xmlns:p="http://schemas.openxmlformats.org/presentationml/2006/main">
+  <p:cSld>
+    <p:spTree>
+      <p:nvGrpSpPr>
+        <p:cNvPr id="1" name=""/>
+        <p:cNvGrpSpPr/>
+        <p:nvPr/>
+      </p:nvGrpSpPr>
+      <p:grpSpPr>
+        <a:xfrm>
+          <a:off x="0" y="0"/>
+          <a:ext cx="0" cy="0"/>
+          <a:chOff x="0" y="0"/>
+          <a:chExt cx="0" cy="0"/>
+        </a:xfrm>
+      </p:grpSpPr>
+      <p:sp>
+        <p:nvSpPr>
+          <p:cNvPr id="2" name="Title 1"/>
+          <p:cNvSpPr>
+            <a:spLocks noGrp="1"/>
+          </p:cNvSpPr>
+          <p:nvPr>
+            <p:ph type="title"/>
+          </p:nvPr>
+        </p:nvSpPr>
+        <p:spPr/>
+        <p:txBody>
+          <a:bodyPr/>
+          <a:lstStyle/>
+          <a:p>
+            <a:endParaRPr lang="en-US"/>
+          </a:p>
+        </p:txBody>
+      </p:sp>
+      <p:sp>
+        <p:nvSpPr>
+          <p:cNvPr id="3" name="Content Placeholder 2"/>
+          <p:cNvSpPr>
+            <a:spLocks noGrp="1"/>
+          </p:cNvSpPr>
+          <p:nvPr>
+            <p:ph idx="1"/>
+          </p:nvPr>
+        </p:nvSpPr>
+        <p:spPr/>
+        <p:txBody>
+          <a:bodyPr/>
+          <a:lstStyle/>
+          <a:p>
+            <a:endParaRPr lang="en-US"/>
+          </a:p>
+        </p:txBody>
+      </p:sp>
+      <p:pic>
+        <p:nvPicPr>
+          <p:cNvPr id="4" name="Picture 3"/>
+          <p:cNvPicPr>
+            <a:picLocks noChangeAspect="1"/>
+          </p:cNvPicPr>
+          <p:nvPr/>
+        </p:nvPicPr>
+        <p:blipFill>
+          <a:blip r:embed="rId2"/>
+          <a:stretch>
+            <a:fillRect/>
+          </a:stretch>
+        </p:blipFill>
+        <p:spPr>
+          <a:xfrm>
+            <a:off x="0" y="54591"/>
+            <a:ext cx="12091916" cy="6905767"/>
+          </a:xfrm>
+          <a:prstGeom prst="rect">
+            <a:avLst/>
+          </a:prstGeom>
+        </p:spPr>
+      </p:pic>
+    </p:spTree>
+    <p:extLst>
+      <p:ext uri="{BB962C8B-B14F-4D97-AF65-F5344CB8AC3E}">
+        <p14:creationId xmlns:p14="http://schemas.microsoft.com/office/powerpoint/2010/main" val="128175649"/>
+      </p:ext>
+    </p:extLst>
+  </p:cSld>
+  <p:clrMapOvr>
+    <a:masterClrMapping/>
+  </p:clrMapOvr>
+</p:sld>
+</file>
+
+<file path=ppt/slides/slide11.xml><?xml version="1.0" encoding="utf-8"?>
+<p:sld xmlns:a="http://schemas.openxmlformats.org/drawingml/2006/main" xmlns:r="http://schemas.openxmlformats.org/officeDocument/2006/relationships" xmlns:p="http://schemas.openxmlformats.org/presentationml/2006/main">
+  <p:cSld>
+    <p:spTree>
+      <p:nvGrpSpPr>
+        <p:cNvPr id="1" name=""/>
+        <p:cNvGrpSpPr/>
+        <p:nvPr/>
+      </p:nvGrpSpPr>
+      <p:grpSpPr>
+        <a:xfrm>
+          <a:off x="0" y="0"/>
+          <a:ext cx="0" cy="0"/>
+          <a:chOff x="0" y="0"/>
+          <a:chExt cx="0" cy="0"/>
+        </a:xfrm>
+      </p:grpSpPr>
+      <p:sp>
+        <p:nvSpPr>
+          <p:cNvPr id="2" name="Title 1"/>
+          <p:cNvSpPr>
+            <a:spLocks noGrp="1"/>
+          </p:cNvSpPr>
+          <p:nvPr>
+            <p:ph type="title"/>
+          </p:nvPr>
+        </p:nvSpPr>
+        <p:spPr/>
+        <p:txBody>
+          <a:bodyPr/>
+          <a:lstStyle/>
+          <a:p>
+            <a:endParaRPr lang="en-US" dirty="0"/>
+          </a:p>
+        </p:txBody>
+      </p:sp>
+      <p:sp>
+        <p:nvSpPr>
+          <p:cNvPr id="3" name="Content Placeholder 2"/>
+          <p:cNvSpPr>
+            <a:spLocks noGrp="1"/>
+          </p:cNvSpPr>
+          <p:nvPr>
+            <p:ph idx="1"/>
+          </p:nvPr>
+        </p:nvSpPr>
+        <p:spPr/>
+        <p:txBody>
+          <a:bodyPr/>
+          <a:lstStyle/>
+          <a:p>
+            <a:endParaRPr lang="en-US"/>
+          </a:p>
+        </p:txBody>
+      </p:sp>
+      <p:pic>
+        <p:nvPicPr>
+          <p:cNvPr id="4" name="Picture 3"/>
+          <p:cNvPicPr>
+            <a:picLocks noChangeAspect="1"/>
+          </p:cNvPicPr>
+          <p:nvPr/>
+        </p:nvPicPr>
+        <p:blipFill>
+          <a:blip r:embed="rId2"/>
+          <a:stretch>
+            <a:fillRect/>
+          </a:stretch>
+        </p:blipFill>
+        <p:spPr>
+          <a:xfrm>
+            <a:off x="709684" y="136478"/>
+            <a:ext cx="10945504" cy="6721522"/>
+          </a:xfrm>
+          <a:prstGeom prst="rect">
+            <a:avLst/>
+          </a:prstGeom>
+        </p:spPr>
+      </p:pic>
+    </p:spTree>
+    <p:extLst>
+      <p:ext uri="{BB962C8B-B14F-4D97-AF65-F5344CB8AC3E}">
+        <p14:creationId xmlns:p14="http://schemas.microsoft.com/office/powerpoint/2010/main" val="91554054"/>
+      </p:ext>
+    </p:extLst>
+  </p:cSld>
+  <p:clrMapOvr>
+    <a:masterClrMapping/>
+  </p:clrMapOvr>
+</p:sld>
+</file>
+
+<file path=ppt/slides/slide12.xml><?xml version="1.0" encoding="utf-8"?>
+<p:sld xmlns:a="http://schemas.openxmlformats.org/drawingml/2006/main" xmlns:r="http://schemas.openxmlformats.org/officeDocument/2006/relationships" xmlns:p="http://schemas.openxmlformats.org/presentationml/2006/main">
+  <p:cSld>
+    <p:spTree>
+      <p:nvGrpSpPr>
+        <p:cNvPr id="1" name=""/>
+        <p:cNvGrpSpPr/>
+        <p:nvPr/>
+      </p:nvGrpSpPr>
+      <p:grpSpPr>
+        <a:xfrm>
+          <a:off x="0" y="0"/>
+          <a:ext cx="0" cy="0"/>
+          <a:chOff x="0" y="0"/>
+          <a:chExt cx="0" cy="0"/>
+        </a:xfrm>
+      </p:grpSpPr>
+      <p:sp>
+        <p:nvSpPr>
+          <p:cNvPr id="2" name="Title 1"/>
+          <p:cNvSpPr>
+            <a:spLocks noGrp="1"/>
+          </p:cNvSpPr>
+          <p:nvPr>
+            <p:ph type="title"/>
+          </p:nvPr>
+        </p:nvSpPr>
+        <p:spPr/>
+        <p:txBody>
+          <a:bodyPr/>
+          <a:lstStyle/>
+          <a:p>
+            <a:endParaRPr lang="en-US"/>
+          </a:p>
+        </p:txBody>
+      </p:sp>
+      <p:sp>
+        <p:nvSpPr>
+          <p:cNvPr id="3" name="Content Placeholder 2"/>
+          <p:cNvSpPr>
+            <a:spLocks noGrp="1"/>
+          </p:cNvSpPr>
+          <p:nvPr>
+            <p:ph idx="1"/>
+          </p:nvPr>
+        </p:nvSpPr>
+        <p:spPr/>
+        <p:txBody>
+          <a:bodyPr/>
+          <a:lstStyle/>
+          <a:p>
+            <a:endParaRPr lang="en-US"/>
+          </a:p>
+        </p:txBody>
+      </p:sp>
+    </p:spTree>
+    <p:extLst>
+      <p:ext uri="{BB962C8B-B14F-4D97-AF65-F5344CB8AC3E}">
+        <p14:creationId xmlns:p14="http://schemas.microsoft.com/office/powerpoint/2010/main" val="3876495225"/>
+      </p:ext>
+    </p:extLst>
+  </p:cSld>
+  <p:clrMapOvr>
+    <a:masterClrMapping/>
+  </p:clrMapOvr>
+</p:sld>
+</file>
+
+<file path=ppt/slides/slide13.xml><?xml version="1.0" encoding="utf-8"?>
+<p:sld xmlns:a="http://schemas.openxmlformats.org/drawingml/2006/main" xmlns:r="http://schemas.openxmlformats.org/officeDocument/2006/relationships" xmlns:p="http://schemas.openxmlformats.org/presentationml/2006/main">
+  <p:cSld>
+    <p:spTree>
+      <p:nvGrpSpPr>
+        <p:cNvPr id="1" name=""/>
+        <p:cNvGrpSpPr/>
+        <p:nvPr/>
+      </p:nvGrpSpPr>
+      <p:grpSpPr>
+        <a:xfrm>
+          <a:off x="0" y="0"/>
+          <a:ext cx="0" cy="0"/>
+          <a:chOff x="0" y="0"/>
+          <a:chExt cx="0" cy="0"/>
+        </a:xfrm>
+      </p:grpSpPr>
+      <p:sp>
+        <p:nvSpPr>
+          <p:cNvPr id="2" name="Title 1"/>
+          <p:cNvSpPr>
+            <a:spLocks noGrp="1"/>
+          </p:cNvSpPr>
+          <p:nvPr>
+            <p:ph type="title"/>
+          </p:nvPr>
+        </p:nvSpPr>
+        <p:spPr/>
+        <p:txBody>
+          <a:bodyPr/>
+          <a:lstStyle/>
+          <a:p>
+            <a:endParaRPr lang="en-US"/>
+          </a:p>
+        </p:txBody>
+      </p:sp>
+      <p:sp>
+        <p:nvSpPr>
+          <p:cNvPr id="3" name="Content Placeholder 2"/>
+          <p:cNvSpPr>
+            <a:spLocks noGrp="1"/>
+          </p:cNvSpPr>
+          <p:nvPr>
+            <p:ph idx="1"/>
+          </p:nvPr>
+        </p:nvSpPr>
+        <p:spPr/>
+        <p:txBody>
+          <a:bodyPr/>
+          <a:lstStyle/>
+          <a:p>
+            <a:endParaRPr lang="en-US"/>
+          </a:p>
+        </p:txBody>
+      </p:sp>
+    </p:spTree>
+    <p:extLst>
+      <p:ext uri="{BB962C8B-B14F-4D97-AF65-F5344CB8AC3E}">
+        <p14:creationId xmlns:p14="http://schemas.microsoft.com/office/powerpoint/2010/main" val="1141104347"/>
+      </p:ext>
+    </p:extLst>
+  </p:cSld>
+  <p:clrMapOvr>
+    <a:masterClrMapping/>
+  </p:clrMapOvr>
+</p:sld>
+</file>
+
+<file path=ppt/slides/slide14.xml><?xml version="1.0" encoding="utf-8"?>
+<p:sld xmlns:a="http://schemas.openxmlformats.org/drawingml/2006/main" xmlns:r="http://schemas.openxmlformats.org/officeDocument/2006/relationships" xmlns:p="http://schemas.openxmlformats.org/presentationml/2006/main">
+  <p:cSld>
+    <p:spTree>
+      <p:nvGrpSpPr>
+        <p:cNvPr id="1" name=""/>
+        <p:cNvGrpSpPr/>
+        <p:nvPr/>
+      </p:nvGrpSpPr>
+      <p:grpSpPr>
+        <a:xfrm>
+          <a:off x="0" y="0"/>
+          <a:ext cx="0" cy="0"/>
+          <a:chOff x="0" y="0"/>
+          <a:chExt cx="0" cy="0"/>
+        </a:xfrm>
+      </p:grpSpPr>
+      <p:sp>
+        <p:nvSpPr>
+          <p:cNvPr id="2" name="Title 1"/>
+          <p:cNvSpPr>
+            <a:spLocks noGrp="1"/>
+          </p:cNvSpPr>
+          <p:nvPr>
+            <p:ph type="title"/>
+          </p:nvPr>
+        </p:nvSpPr>
+        <p:spPr/>
+        <p:txBody>
+          <a:bodyPr/>
+          <a:lstStyle/>
+          <a:p>
+            <a:endParaRPr lang="en-US"/>
+          </a:p>
+        </p:txBody>
+      </p:sp>
+      <p:sp>
+        <p:nvSpPr>
+          <p:cNvPr id="3" name="Content Placeholder 2"/>
+          <p:cNvSpPr>
+            <a:spLocks noGrp="1"/>
+          </p:cNvSpPr>
+          <p:nvPr>
+            <p:ph idx="1"/>
+          </p:nvPr>
+        </p:nvSpPr>
+        <p:spPr/>
+        <p:txBody>
+          <a:bodyPr/>
+          <a:lstStyle/>
+          <a:p>
+            <a:endParaRPr lang="en-US"/>
+          </a:p>
+        </p:txBody>
+      </p:sp>
+    </p:spTree>
+    <p:extLst>
+      <p:ext uri="{BB962C8B-B14F-4D97-AF65-F5344CB8AC3E}">
+        <p14:creationId xmlns:p14="http://schemas.microsoft.com/office/powerpoint/2010/main" val="1532713193"/>
+      </p:ext>
+    </p:extLst>
+  </p:cSld>
+  <p:clrMapOvr>
+    <a:masterClrMapping/>
+  </p:clrMapOvr>
+</p:sld>
+</file>
+
+<file path=ppt/slides/slide15.xml><?xml version="1.0" encoding="utf-8"?>
+<p:sld xmlns:a="http://schemas.openxmlformats.org/drawingml/2006/main" xmlns:r="http://schemas.openxmlformats.org/officeDocument/2006/relationships" xmlns:p="http://schemas.openxmlformats.org/presentationml/2006/main">
+  <p:cSld>
+    <p:spTree>
+      <p:nvGrpSpPr>
+        <p:cNvPr id="1" name=""/>
+        <p:cNvGrpSpPr/>
+        <p:nvPr/>
+      </p:nvGrpSpPr>
+      <p:grpSpPr>
+        <a:xfrm>
+          <a:off x="0" y="0"/>
+          <a:ext cx="0" cy="0"/>
+          <a:chOff x="0" y="0"/>
+          <a:chExt cx="0" cy="0"/>
+        </a:xfrm>
+      </p:grpSpPr>
+      <p:sp>
+        <p:nvSpPr>
+          <p:cNvPr id="2" name="Title 1"/>
+          <p:cNvSpPr>
+            <a:spLocks noGrp="1"/>
+          </p:cNvSpPr>
+          <p:nvPr>
+            <p:ph type="title"/>
+          </p:nvPr>
+        </p:nvSpPr>
+        <p:spPr/>
+        <p:txBody>
+          <a:bodyPr/>
+          <a:lstStyle/>
+          <a:p>
+            <a:endParaRPr lang="en-US"/>
+          </a:p>
+        </p:txBody>
+      </p:sp>
+      <p:sp>
+        <p:nvSpPr>
+          <p:cNvPr id="3" name="Content Placeholder 2"/>
+          <p:cNvSpPr>
+            <a:spLocks noGrp="1"/>
+          </p:cNvSpPr>
+          <p:nvPr>
+            <p:ph idx="1"/>
+          </p:nvPr>
+        </p:nvSpPr>
+        <p:spPr/>
+        <p:txBody>
+          <a:bodyPr/>
+          <a:lstStyle/>
+          <a:p>
+            <a:endParaRPr lang="en-US"/>
+          </a:p>
+        </p:txBody>
+      </p:sp>
+    </p:spTree>
+    <p:extLst>
+      <p:ext uri="{BB962C8B-B14F-4D97-AF65-F5344CB8AC3E}">
+        <p14:creationId xmlns:p14="http://schemas.microsoft.com/office/powerpoint/2010/main" val="424983537"/>
+      </p:ext>
+    </p:extLst>
+  </p:cSld>
+  <p:clrMapOvr>
+    <a:masterClrMapping/>
+  </p:clrMapOvr>
+</p:sld>
+</file>
+
+<file path=ppt/slides/slide16.xml><?xml version="1.0" encoding="utf-8"?>
+<p:sld xmlns:a="http://schemas.openxmlformats.org/drawingml/2006/main" xmlns:r="http://schemas.openxmlformats.org/officeDocument/2006/relationships" xmlns:p="http://schemas.openxmlformats.org/presentationml/2006/main">
+  <p:cSld>
+    <p:spTree>
+      <p:nvGrpSpPr>
+        <p:cNvPr id="1" name=""/>
+        <p:cNvGrpSpPr/>
+        <p:nvPr/>
+      </p:nvGrpSpPr>
+      <p:grpSpPr>
+        <a:xfrm>
+          <a:off x="0" y="0"/>
+          <a:ext cx="0" cy="0"/>
+          <a:chOff x="0" y="0"/>
+          <a:chExt cx="0" cy="0"/>
+        </a:xfrm>
+      </p:grpSpPr>
+      <p:sp>
+        <p:nvSpPr>
+          <p:cNvPr id="2" name="Title 1"/>
+          <p:cNvSpPr>
+            <a:spLocks noGrp="1"/>
+          </p:cNvSpPr>
+          <p:nvPr>
+            <p:ph type="title"/>
+          </p:nvPr>
+        </p:nvSpPr>
+        <p:spPr/>
+        <p:txBody>
+          <a:bodyPr/>
+          <a:lstStyle/>
+          <a:p>
+            <a:endParaRPr lang="en-US"/>
+          </a:p>
+        </p:txBody>
+      </p:sp>
+      <p:sp>
+        <p:nvSpPr>
+          <p:cNvPr id="3" name="Content Placeholder 2"/>
+          <p:cNvSpPr>
+            <a:spLocks noGrp="1"/>
+          </p:cNvSpPr>
+          <p:nvPr>
+            <p:ph idx="1"/>
+          </p:nvPr>
+        </p:nvSpPr>
+        <p:spPr/>
+        <p:txBody>
+          <a:bodyPr/>
+          <a:lstStyle/>
+          <a:p>
+            <a:endParaRPr lang="en-US"/>
+          </a:p>
+        </p:txBody>
+      </p:sp>
+    </p:spTree>
+    <p:extLst>
+      <p:ext uri="{BB962C8B-B14F-4D97-AF65-F5344CB8AC3E}">
+        <p14:creationId xmlns:p14="http://schemas.microsoft.com/office/powerpoint/2010/main" val="473034004"/>
+      </p:ext>
+    </p:extLst>
+  </p:cSld>
+  <p:clrMapOvr>
+    <a:masterClrMapping/>
+  </p:clrMapOvr>
+</p:sld>
+</file>
+
+<file path=ppt/slides/slide17.xml><?xml version="1.0" encoding="utf-8"?>
+<p:sld xmlns:a="http://schemas.openxmlformats.org/drawingml/2006/main" xmlns:r="http://schemas.openxmlformats.org/officeDocument/2006/relationships" xmlns:p="http://schemas.openxmlformats.org/presentationml/2006/main">
+  <p:cSld>
+    <p:spTree>
+      <p:nvGrpSpPr>
+        <p:cNvPr id="1" name=""/>
+        <p:cNvGrpSpPr/>
+        <p:nvPr/>
+      </p:nvGrpSpPr>
+      <p:grpSpPr>
+        <a:xfrm>
+          <a:off x="0" y="0"/>
+          <a:ext cx="0" cy="0"/>
+          <a:chOff x="0" y="0"/>
+          <a:chExt cx="0" cy="0"/>
+        </a:xfrm>
+      </p:grpSpPr>
+      <p:sp>
+        <p:nvSpPr>
+          <p:cNvPr id="2" name="Title 1"/>
+          <p:cNvSpPr>
+            <a:spLocks noGrp="1"/>
+          </p:cNvSpPr>
+          <p:nvPr>
+            <p:ph type="title"/>
+          </p:nvPr>
+        </p:nvSpPr>
+        <p:spPr/>
+        <p:txBody>
+          <a:bodyPr/>
+          <a:lstStyle/>
+          <a:p>
+            <a:endParaRPr lang="en-US"/>
+          </a:p>
+        </p:txBody>
+      </p:sp>
+      <p:sp>
+        <p:nvSpPr>
+          <p:cNvPr id="3" name="Content Placeholder 2"/>
+          <p:cNvSpPr>
+            <a:spLocks noGrp="1"/>
+          </p:cNvSpPr>
+          <p:nvPr>
+            <p:ph idx="1"/>
+          </p:nvPr>
+        </p:nvSpPr>
+        <p:spPr/>
+        <p:txBody>
+          <a:bodyPr/>
+          <a:lstStyle/>
+          <a:p>
+            <a:endParaRPr lang="en-US"/>
+          </a:p>
+        </p:txBody>
+      </p:sp>
+    </p:spTree>
+    <p:extLst>
+      <p:ext uri="{BB962C8B-B14F-4D97-AF65-F5344CB8AC3E}">
+        <p14:creationId xmlns:p14="http://schemas.microsoft.com/office/powerpoint/2010/main" val="2246433591"/>
+      </p:ext>
+    </p:extLst>
+  </p:cSld>
+  <p:clrMapOvr>
+    <a:masterClrMapping/>
+  </p:clrMapOvr>
+</p:sld>
+</file>
+
+<file path=ppt/slides/slide18.xml><?xml version="1.0" encoding="utf-8"?>
+<p:sld xmlns:a="http://schemas.openxmlformats.org/drawingml/2006/main" xmlns:r="http://schemas.openxmlformats.org/officeDocument/2006/relationships" xmlns:p="http://schemas.openxmlformats.org/presentationml/2006/main">
+  <p:cSld>
+    <p:spTree>
+      <p:nvGrpSpPr>
+        <p:cNvPr id="1" name=""/>
+        <p:cNvGrpSpPr/>
+        <p:nvPr/>
+      </p:nvGrpSpPr>
+      <p:grpSpPr>
+        <a:xfrm>
+          <a:off x="0" y="0"/>
+          <a:ext cx="0" cy="0"/>
+          <a:chOff x="0" y="0"/>
+          <a:chExt cx="0" cy="0"/>
+        </a:xfrm>
+      </p:grpSpPr>
+      <p:sp>
+        <p:nvSpPr>
+          <p:cNvPr id="2" name="Title 1"/>
+          <p:cNvSpPr>
+            <a:spLocks noGrp="1"/>
+          </p:cNvSpPr>
+          <p:nvPr>
+            <p:ph type="title"/>
+          </p:nvPr>
+        </p:nvSpPr>
+        <p:spPr/>
+        <p:txBody>
+          <a:bodyPr/>
+          <a:lstStyle/>
+          <a:p>
+            <a:endParaRPr lang="en-US"/>
+          </a:p>
+        </p:txBody>
+      </p:sp>
+      <p:sp>
+        <p:nvSpPr>
+          <p:cNvPr id="3" name="Content Placeholder 2"/>
+          <p:cNvSpPr>
+            <a:spLocks noGrp="1"/>
+          </p:cNvSpPr>
+          <p:nvPr>
+            <p:ph idx="1"/>
+          </p:nvPr>
+        </p:nvSpPr>
+        <p:spPr/>
+        <p:txBody>
+          <a:bodyPr/>
+          <a:lstStyle/>
+          <a:p>
+            <a:endParaRPr lang="en-US"/>
+          </a:p>
+        </p:txBody>
+      </p:sp>
+    </p:spTree>
+    <p:extLst>
+      <p:ext uri="{BB962C8B-B14F-4D97-AF65-F5344CB8AC3E}">
+        <p14:creationId xmlns:p14="http://schemas.microsoft.com/office/powerpoint/2010/main" val="4086509070"/>
+      </p:ext>
+    </p:extLst>
+  </p:cSld>
+  <p:clrMapOvr>
+    <a:masterClrMapping/>
+  </p:clrMapOvr>
+</p:sld>
+</file>
+
+<file path=ppt/slides/slide19.xml><?xml version="1.0" encoding="utf-8"?>
+<p:sld xmlns:a="http://schemas.openxmlformats.org/drawingml/2006/main" xmlns:r="http://schemas.openxmlformats.org/officeDocument/2006/relationships" xmlns:p="http://schemas.openxmlformats.org/presentationml/2006/main">
+  <p:cSld>
+    <p:spTree>
+      <p:nvGrpSpPr>
+        <p:cNvPr id="1" name=""/>
+        <p:cNvGrpSpPr/>
+        <p:nvPr/>
+      </p:nvGrpSpPr>
+      <p:grpSpPr>
+        <a:xfrm>
+          <a:off x="0" y="0"/>
+          <a:ext cx="0" cy="0"/>
+          <a:chOff x="0" y="0"/>
+          <a:chExt cx="0" cy="0"/>
+        </a:xfrm>
+      </p:grpSpPr>
+      <p:sp>
+        <p:nvSpPr>
+          <p:cNvPr id="2" name="Title 1"/>
+          <p:cNvSpPr>
+            <a:spLocks noGrp="1"/>
+          </p:cNvSpPr>
+          <p:nvPr>
+            <p:ph type="title"/>
+          </p:nvPr>
+        </p:nvSpPr>
+        <p:spPr/>
+        <p:txBody>
+          <a:bodyPr/>
+          <a:lstStyle/>
+          <a:p>
+            <a:endParaRPr lang="en-US"/>
+          </a:p>
+        </p:txBody>
+      </p:sp>
+      <p:sp>
+        <p:nvSpPr>
+          <p:cNvPr id="3" name="Content Placeholder 2"/>
+          <p:cNvSpPr>
+            <a:spLocks noGrp="1"/>
+          </p:cNvSpPr>
+          <p:nvPr>
+            <p:ph idx="1"/>
+          </p:nvPr>
+        </p:nvSpPr>
+        <p:spPr/>
+        <p:txBody>
+          <a:bodyPr/>
+          <a:lstStyle/>
+          <a:p>
+            <a:endParaRPr lang="en-US"/>
+          </a:p>
+        </p:txBody>
+      </p:sp>
+    </p:spTree>
+    <p:extLst>
+      <p:ext uri="{BB962C8B-B14F-4D97-AF65-F5344CB8AC3E}">
+        <p14:creationId xmlns:p14="http://schemas.microsoft.com/office/powerpoint/2010/main" val="233475084"/>
+      </p:ext>
+    </p:extLst>
+  </p:cSld>
+  <p:clrMapOvr>
+    <a:masterClrMapping/>
+  </p:clrMapOvr>
+</p:sld>
+</file>
+
 <file path=ppt/slides/slide2.xml><?xml version="1.0" encoding="utf-8"?>
 <p:sld xmlns:a="http://schemas.openxmlformats.org/drawingml/2006/main" xmlns:r="http://schemas.openxmlformats.org/officeDocument/2006/relationships" xmlns:p="http://schemas.openxmlformats.org/presentationml/2006/main">
   <p:cSld>
@@ -3034,169 +3776,36 @@
           <a:chExt cx="0" cy="0"/>
         </a:xfrm>
       </p:grpSpPr>
-      <p:sp>
-        <p:nvSpPr>
-          <p:cNvPr id="2" name="Title 1"/>
-          <p:cNvSpPr>
-            <a:spLocks noGrp="1"/>
-          </p:cNvSpPr>
-          <p:nvPr>
-            <p:ph type="title"/>
-          </p:nvPr>
-        </p:nvSpPr>
+      <p:pic>
+        <p:nvPicPr>
+          <p:cNvPr id="4" name="Content Placeholder 3"/>
+          <p:cNvPicPr>
+            <a:picLocks noGrp="1" noChangeAspect="1"/>
+          </p:cNvPicPr>
+          <p:nvPr>
+            <p:ph idx="1"/>
+          </p:nvPr>
+        </p:nvPicPr>
+        <p:blipFill>
+          <a:blip r:embed="rId2"/>
+          <a:stretch>
+            <a:fillRect/>
+          </a:stretch>
+        </p:blipFill>
         <p:spPr>
           <a:xfrm>
-            <a:off x="715371" y="404528"/>
-            <a:ext cx="10515600" cy="1325563"/>
+            <a:off x="232013" y="504967"/>
+            <a:ext cx="11723426" cy="6353033"/>
           </a:xfrm>
+          <a:prstGeom prst="rect">
+            <a:avLst/>
+          </a:prstGeom>
         </p:spPr>
-        <p:txBody>
-          <a:bodyPr/>
-          <a:lstStyle/>
-          <a:p>
-            <a:r>
-              <a:rPr lang="en-US" b="1" dirty="0" smtClean="0">
-                <a:solidFill>
-                  <a:schemeClr val="accent1"/>
-                </a:solidFill>
-              </a:rPr>
-              <a:t>How to clone a repo and work and push?</a:t>
-            </a:r>
-            <a:endParaRPr lang="en-US" b="1" dirty="0">
-              <a:solidFill>
-                <a:schemeClr val="accent1"/>
-              </a:solidFill>
-            </a:endParaRPr>
-          </a:p>
-        </p:txBody>
-      </p:sp>
-      <p:sp>
-        <p:nvSpPr>
-          <p:cNvPr id="3" name="Content Placeholder 2"/>
-          <p:cNvSpPr>
-            <a:spLocks noGrp="1"/>
-          </p:cNvSpPr>
-          <p:nvPr>
-            <p:ph idx="1"/>
-          </p:nvPr>
-        </p:nvSpPr>
-        <p:spPr/>
-        <p:txBody>
-          <a:bodyPr>
-            <a:normAutofit/>
-          </a:bodyPr>
-          <a:lstStyle/>
-          <a:p>
-            <a:r>
-              <a:rPr lang="en-US" dirty="0"/>
-              <a:t> </a:t>
-            </a:r>
-            <a:r>
-              <a:rPr lang="en-US" dirty="0" err="1" smtClean="0"/>
-              <a:t>git</a:t>
-            </a:r>
-            <a:r>
-              <a:rPr lang="en-US" dirty="0" smtClean="0"/>
-              <a:t> clone </a:t>
-            </a:r>
-            <a:r>
-              <a:rPr lang="en-US" dirty="0" err="1" smtClean="0"/>
-              <a:t>url_of_the_repo</a:t>
-            </a:r>
-            <a:endParaRPr lang="en-US" dirty="0" smtClean="0"/>
-          </a:p>
-          <a:p>
-            <a:pPr lvl="1"/>
-            <a:r>
-              <a:rPr lang="en-US" dirty="0" smtClean="0"/>
-              <a:t>It will  clone the repo into your current </a:t>
-            </a:r>
-            <a:r>
-              <a:rPr lang="en-US" dirty="0" err="1" smtClean="0"/>
-              <a:t>dir</a:t>
-            </a:r>
-            <a:endParaRPr lang="en-US" dirty="0" smtClean="0"/>
-          </a:p>
-          <a:p>
-            <a:r>
-              <a:rPr lang="en-US" dirty="0"/>
-              <a:t> </a:t>
-            </a:r>
-            <a:r>
-              <a:rPr lang="en-US" dirty="0" smtClean="0"/>
-              <a:t>cd </a:t>
-            </a:r>
-            <a:r>
-              <a:rPr lang="en-US" dirty="0" err="1" smtClean="0"/>
-              <a:t>repo_name</a:t>
-            </a:r>
-            <a:endParaRPr lang="en-US" dirty="0" smtClean="0"/>
-          </a:p>
-          <a:p>
-            <a:pPr lvl="1"/>
-            <a:r>
-              <a:rPr lang="en-US" dirty="0" smtClean="0"/>
-              <a:t>To move inside the cloned repo  folder</a:t>
-            </a:r>
-          </a:p>
-          <a:p>
-            <a:r>
-              <a:rPr lang="en-US" dirty="0" err="1" smtClean="0"/>
-              <a:t>git</a:t>
-            </a:r>
-            <a:r>
-              <a:rPr lang="en-US" dirty="0" smtClean="0"/>
-              <a:t> add .</a:t>
-            </a:r>
-          </a:p>
-          <a:p>
-            <a:pPr lvl="1"/>
-            <a:r>
-              <a:rPr lang="en-US" dirty="0" smtClean="0"/>
-              <a:t>To stage all the changes u made</a:t>
-            </a:r>
-          </a:p>
-          <a:p>
-            <a:r>
-              <a:rPr lang="en-US" dirty="0"/>
-              <a:t> </a:t>
-            </a:r>
-            <a:r>
-              <a:rPr lang="en-US" dirty="0" err="1" smtClean="0"/>
-              <a:t>git</a:t>
-            </a:r>
-            <a:r>
-              <a:rPr lang="en-US" dirty="0" smtClean="0"/>
-              <a:t> add </a:t>
-            </a:r>
-            <a:r>
-              <a:rPr lang="en-US" dirty="0" err="1" smtClean="0"/>
-              <a:t>finename</a:t>
-            </a:r>
-            <a:r>
-              <a:rPr lang="en-US" dirty="0" smtClean="0"/>
-              <a:t> </a:t>
-            </a:r>
-          </a:p>
-          <a:p>
-            <a:pPr lvl="1"/>
-            <a:r>
-              <a:rPr lang="en-US" dirty="0" smtClean="0"/>
-              <a:t>To stage specific file name</a:t>
-            </a:r>
-          </a:p>
-          <a:p>
-            <a:pPr marL="457200" lvl="1" indent="0">
-              <a:buNone/>
-            </a:pPr>
-            <a:endParaRPr lang="en-US" dirty="0" smtClean="0"/>
-          </a:p>
-        </p:txBody>
-      </p:sp>
+      </p:pic>
     </p:spTree>
     <p:extLst>
       <p:ext uri="{BB962C8B-B14F-4D97-AF65-F5344CB8AC3E}">
-        <p14:creationId xmlns:p14="http://schemas.microsoft.com/office/powerpoint/2010/main" val="3865894839"/>
+        <p14:creationId xmlns:p14="http://schemas.microsoft.com/office/powerpoint/2010/main" val="1719757755"/>
       </p:ext>
     </p:extLst>
   </p:cSld>
@@ -3233,6 +3842,195 @@
             <p:ph type="title"/>
           </p:nvPr>
         </p:nvSpPr>
+        <p:spPr>
+          <a:xfrm>
+            <a:off x="715371" y="404528"/>
+            <a:ext cx="10515600" cy="1325563"/>
+          </a:xfrm>
+        </p:spPr>
+        <p:txBody>
+          <a:bodyPr/>
+          <a:lstStyle/>
+          <a:p>
+            <a:r>
+              <a:rPr lang="en-US" b="1" dirty="0" smtClean="0">
+                <a:solidFill>
+                  <a:schemeClr val="accent1"/>
+                </a:solidFill>
+              </a:rPr>
+              <a:t>How to clone a repo and work and push?</a:t>
+            </a:r>
+            <a:endParaRPr lang="en-US" b="1" dirty="0">
+              <a:solidFill>
+                <a:schemeClr val="accent1"/>
+              </a:solidFill>
+            </a:endParaRPr>
+          </a:p>
+        </p:txBody>
+      </p:sp>
+      <p:sp>
+        <p:nvSpPr>
+          <p:cNvPr id="3" name="Content Placeholder 2"/>
+          <p:cNvSpPr>
+            <a:spLocks noGrp="1"/>
+          </p:cNvSpPr>
+          <p:nvPr>
+            <p:ph idx="1"/>
+          </p:nvPr>
+        </p:nvSpPr>
+        <p:spPr/>
+        <p:txBody>
+          <a:bodyPr>
+            <a:normAutofit/>
+          </a:bodyPr>
+          <a:lstStyle/>
+          <a:p>
+            <a:r>
+              <a:rPr lang="en-US" dirty="0"/>
+              <a:t> </a:t>
+            </a:r>
+            <a:r>
+              <a:rPr lang="en-US" dirty="0" err="1" smtClean="0"/>
+              <a:t>git</a:t>
+            </a:r>
+            <a:r>
+              <a:rPr lang="en-US" dirty="0" smtClean="0"/>
+              <a:t> clone </a:t>
+            </a:r>
+            <a:r>
+              <a:rPr lang="en-US" dirty="0" err="1" smtClean="0"/>
+              <a:t>url_of_the_repo</a:t>
+            </a:r>
+            <a:endParaRPr lang="en-US" dirty="0" smtClean="0"/>
+          </a:p>
+          <a:p>
+            <a:pPr lvl="1"/>
+            <a:r>
+              <a:rPr lang="en-US" dirty="0" smtClean="0"/>
+              <a:t>It will  clone the repo into your current </a:t>
+            </a:r>
+            <a:r>
+              <a:rPr lang="en-US" dirty="0" err="1" smtClean="0"/>
+              <a:t>dir</a:t>
+            </a:r>
+            <a:endParaRPr lang="en-US" dirty="0" smtClean="0"/>
+          </a:p>
+          <a:p>
+            <a:r>
+              <a:rPr lang="en-US" dirty="0"/>
+              <a:t> </a:t>
+            </a:r>
+            <a:r>
+              <a:rPr lang="en-US" dirty="0" smtClean="0"/>
+              <a:t>cd </a:t>
+            </a:r>
+            <a:r>
+              <a:rPr lang="en-US" dirty="0" err="1" smtClean="0"/>
+              <a:t>repo_name</a:t>
+            </a:r>
+            <a:endParaRPr lang="en-US" dirty="0" smtClean="0"/>
+          </a:p>
+          <a:p>
+            <a:pPr lvl="1"/>
+            <a:r>
+              <a:rPr lang="en-US" dirty="0" smtClean="0"/>
+              <a:t>To move inside the cloned repo  folder</a:t>
+            </a:r>
+          </a:p>
+          <a:p>
+            <a:r>
+              <a:rPr lang="en-US" dirty="0" err="1" smtClean="0"/>
+              <a:t>git</a:t>
+            </a:r>
+            <a:r>
+              <a:rPr lang="en-US" dirty="0" smtClean="0"/>
+              <a:t> add .</a:t>
+            </a:r>
+          </a:p>
+          <a:p>
+            <a:pPr lvl="1"/>
+            <a:r>
+              <a:rPr lang="en-US" dirty="0" smtClean="0"/>
+              <a:t>To stage all the changes u made</a:t>
+            </a:r>
+          </a:p>
+          <a:p>
+            <a:r>
+              <a:rPr lang="en-US" dirty="0"/>
+              <a:t> </a:t>
+            </a:r>
+            <a:r>
+              <a:rPr lang="en-US" dirty="0" err="1" smtClean="0"/>
+              <a:t>git</a:t>
+            </a:r>
+            <a:r>
+              <a:rPr lang="en-US" dirty="0" smtClean="0"/>
+              <a:t> add </a:t>
+            </a:r>
+            <a:r>
+              <a:rPr lang="en-US" dirty="0" err="1" smtClean="0"/>
+              <a:t>finename</a:t>
+            </a:r>
+            <a:r>
+              <a:rPr lang="en-US" dirty="0" smtClean="0"/>
+              <a:t> </a:t>
+            </a:r>
+          </a:p>
+          <a:p>
+            <a:pPr lvl="1"/>
+            <a:r>
+              <a:rPr lang="en-US" dirty="0" smtClean="0"/>
+              <a:t>To stage specific file name</a:t>
+            </a:r>
+          </a:p>
+          <a:p>
+            <a:pPr marL="457200" lvl="1" indent="0">
+              <a:buNone/>
+            </a:pPr>
+            <a:endParaRPr lang="en-US" dirty="0" smtClean="0"/>
+          </a:p>
+        </p:txBody>
+      </p:sp>
+    </p:spTree>
+    <p:extLst>
+      <p:ext uri="{BB962C8B-B14F-4D97-AF65-F5344CB8AC3E}">
+        <p14:creationId xmlns:p14="http://schemas.microsoft.com/office/powerpoint/2010/main" val="3865894839"/>
+      </p:ext>
+    </p:extLst>
+  </p:cSld>
+  <p:clrMapOvr>
+    <a:masterClrMapping/>
+  </p:clrMapOvr>
+</p:sld>
+</file>
+
+<file path=ppt/slides/slide4.xml><?xml version="1.0" encoding="utf-8"?>
+<p:sld xmlns:a="http://schemas.openxmlformats.org/drawingml/2006/main" xmlns:r="http://schemas.openxmlformats.org/officeDocument/2006/relationships" xmlns:p="http://schemas.openxmlformats.org/presentationml/2006/main">
+  <p:cSld>
+    <p:spTree>
+      <p:nvGrpSpPr>
+        <p:cNvPr id="1" name=""/>
+        <p:cNvGrpSpPr/>
+        <p:nvPr/>
+      </p:nvGrpSpPr>
+      <p:grpSpPr>
+        <a:xfrm>
+          <a:off x="0" y="0"/>
+          <a:ext cx="0" cy="0"/>
+          <a:chOff x="0" y="0"/>
+          <a:chExt cx="0" cy="0"/>
+        </a:xfrm>
+      </p:grpSpPr>
+      <p:sp>
+        <p:nvSpPr>
+          <p:cNvPr id="2" name="Title 1"/>
+          <p:cNvSpPr>
+            <a:spLocks noGrp="1"/>
+          </p:cNvSpPr>
+          <p:nvPr>
+            <p:ph type="title"/>
+          </p:nvPr>
+        </p:nvSpPr>
         <p:spPr/>
         <p:txBody>
           <a:bodyPr/>
@@ -3339,7 +4137,7 @@
 </p:sld>
 </file>
 
-<file path=ppt/slides/slide4.xml><?xml version="1.0" encoding="utf-8"?>
+<file path=ppt/slides/slide5.xml><?xml version="1.0" encoding="utf-8"?>
 <p:sld xmlns:a="http://schemas.openxmlformats.org/drawingml/2006/main" xmlns:r="http://schemas.openxmlformats.org/officeDocument/2006/relationships" xmlns:p="http://schemas.openxmlformats.org/presentationml/2006/main">
   <p:cSld>
     <p:spTree>
@@ -3434,7 +4232,7 @@
 </p:sld>
 </file>
 
-<file path=ppt/slides/slide5.xml><?xml version="1.0" encoding="utf-8"?>
+<file path=ppt/slides/slide6.xml><?xml version="1.0" encoding="utf-8"?>
 <p:sld xmlns:a="http://schemas.openxmlformats.org/drawingml/2006/main" xmlns:r="http://schemas.openxmlformats.org/officeDocument/2006/relationships" xmlns:p="http://schemas.openxmlformats.org/presentationml/2006/main">
   <p:cSld>
     <p:spTree>
@@ -3545,6 +4343,245 @@
     <p:extLst>
       <p:ext uri="{BB962C8B-B14F-4D97-AF65-F5344CB8AC3E}">
         <p14:creationId xmlns:p14="http://schemas.microsoft.com/office/powerpoint/2010/main" val="4278782829"/>
+      </p:ext>
+    </p:extLst>
+  </p:cSld>
+  <p:clrMapOvr>
+    <a:masterClrMapping/>
+  </p:clrMapOvr>
+</p:sld>
+</file>
+
+<file path=ppt/slides/slide7.xml><?xml version="1.0" encoding="utf-8"?>
+<p:sld xmlns:a="http://schemas.openxmlformats.org/drawingml/2006/main" xmlns:r="http://schemas.openxmlformats.org/officeDocument/2006/relationships" xmlns:p="http://schemas.openxmlformats.org/presentationml/2006/main">
+  <p:cSld>
+    <p:spTree>
+      <p:nvGrpSpPr>
+        <p:cNvPr id="1" name=""/>
+        <p:cNvGrpSpPr/>
+        <p:nvPr/>
+      </p:nvGrpSpPr>
+      <p:grpSpPr>
+        <a:xfrm>
+          <a:off x="0" y="0"/>
+          <a:ext cx="0" cy="0"/>
+          <a:chOff x="0" y="0"/>
+          <a:chExt cx="0" cy="0"/>
+        </a:xfrm>
+      </p:grpSpPr>
+      <p:sp>
+        <p:nvSpPr>
+          <p:cNvPr id="2" name="Title 1"/>
+          <p:cNvSpPr>
+            <a:spLocks noGrp="1"/>
+          </p:cNvSpPr>
+          <p:nvPr>
+            <p:ph type="title"/>
+          </p:nvPr>
+        </p:nvSpPr>
+        <p:spPr>
+          <a:xfrm>
+            <a:off x="1356815" y="2739835"/>
+            <a:ext cx="10515600" cy="1325563"/>
+          </a:xfrm>
+        </p:spPr>
+        <p:txBody>
+          <a:bodyPr>
+            <a:normAutofit/>
+          </a:bodyPr>
+          <a:lstStyle/>
+          <a:p>
+            <a:r>
+              <a:rPr lang="en-US" sz="6600" b="1" dirty="0" smtClean="0">
+                <a:solidFill>
+                  <a:schemeClr val="accent1">
+                    <a:lumMod val="75000"/>
+                  </a:schemeClr>
+                </a:solidFill>
+              </a:rPr>
+              <a:t>             Commands</a:t>
+            </a:r>
+            <a:endParaRPr lang="en-US" sz="6600" b="1" dirty="0">
+              <a:solidFill>
+                <a:schemeClr val="accent1">
+                  <a:lumMod val="75000"/>
+                </a:schemeClr>
+              </a:solidFill>
+            </a:endParaRPr>
+          </a:p>
+        </p:txBody>
+      </p:sp>
+    </p:spTree>
+    <p:extLst>
+      <p:ext uri="{BB962C8B-B14F-4D97-AF65-F5344CB8AC3E}">
+        <p14:creationId xmlns:p14="http://schemas.microsoft.com/office/powerpoint/2010/main" val="435083686"/>
+      </p:ext>
+    </p:extLst>
+  </p:cSld>
+  <p:clrMapOvr>
+    <a:masterClrMapping/>
+  </p:clrMapOvr>
+</p:sld>
+</file>
+
+<file path=ppt/slides/slide8.xml><?xml version="1.0" encoding="utf-8"?>
+<p:sld xmlns:a="http://schemas.openxmlformats.org/drawingml/2006/main" xmlns:r="http://schemas.openxmlformats.org/officeDocument/2006/relationships" xmlns:p="http://schemas.openxmlformats.org/presentationml/2006/main">
+  <p:cSld>
+    <p:spTree>
+      <p:nvGrpSpPr>
+        <p:cNvPr id="1" name=""/>
+        <p:cNvGrpSpPr/>
+        <p:nvPr/>
+      </p:nvGrpSpPr>
+      <p:grpSpPr>
+        <a:xfrm>
+          <a:off x="0" y="0"/>
+          <a:ext cx="0" cy="0"/>
+          <a:chOff x="0" y="0"/>
+          <a:chExt cx="0" cy="0"/>
+        </a:xfrm>
+      </p:grpSpPr>
+      <p:sp>
+        <p:nvSpPr>
+          <p:cNvPr id="3" name="Content Placeholder 2"/>
+          <p:cNvSpPr>
+            <a:spLocks noGrp="1"/>
+          </p:cNvSpPr>
+          <p:nvPr>
+            <p:ph idx="1"/>
+          </p:nvPr>
+        </p:nvSpPr>
+        <p:spPr>
+          <a:xfrm>
+            <a:off x="838200" y="450376"/>
+            <a:ext cx="10515600" cy="5726587"/>
+          </a:xfrm>
+        </p:spPr>
+        <p:txBody>
+          <a:bodyPr/>
+          <a:lstStyle/>
+          <a:p>
+            <a:r>
+              <a:rPr lang="en-US" dirty="0"/>
+              <a:t> </a:t>
+            </a:r>
+            <a:r>
+              <a:rPr lang="en-US" dirty="0" err="1" smtClean="0"/>
+              <a:t>git</a:t>
+            </a:r>
+            <a:r>
+              <a:rPr lang="en-US" dirty="0" smtClean="0"/>
+              <a:t>  --version</a:t>
+            </a:r>
+          </a:p>
+        </p:txBody>
+      </p:sp>
+      <p:pic>
+        <p:nvPicPr>
+          <p:cNvPr id="5" name="Picture 4"/>
+          <p:cNvPicPr>
+            <a:picLocks noChangeAspect="1"/>
+          </p:cNvPicPr>
+          <p:nvPr/>
+        </p:nvPicPr>
+        <p:blipFill>
+          <a:blip r:embed="rId2"/>
+          <a:stretch>
+            <a:fillRect/>
+          </a:stretch>
+        </p:blipFill>
+        <p:spPr>
+          <a:xfrm>
+            <a:off x="518615" y="1364775"/>
+            <a:ext cx="8523483" cy="5616054"/>
+          </a:xfrm>
+          <a:prstGeom prst="rect">
+            <a:avLst/>
+          </a:prstGeom>
+        </p:spPr>
+      </p:pic>
+    </p:spTree>
+    <p:extLst>
+      <p:ext uri="{BB962C8B-B14F-4D97-AF65-F5344CB8AC3E}">
+        <p14:creationId xmlns:p14="http://schemas.microsoft.com/office/powerpoint/2010/main" val="674771836"/>
+      </p:ext>
+    </p:extLst>
+  </p:cSld>
+  <p:clrMapOvr>
+    <a:masterClrMapping/>
+  </p:clrMapOvr>
+</p:sld>
+</file>
+
+<file path=ppt/slides/slide9.xml><?xml version="1.0" encoding="utf-8"?>
+<p:sld xmlns:a="http://schemas.openxmlformats.org/drawingml/2006/main" xmlns:r="http://schemas.openxmlformats.org/officeDocument/2006/relationships" xmlns:p="http://schemas.openxmlformats.org/presentationml/2006/main">
+  <p:cSld>
+    <p:spTree>
+      <p:nvGrpSpPr>
+        <p:cNvPr id="1" name=""/>
+        <p:cNvGrpSpPr/>
+        <p:nvPr/>
+      </p:nvGrpSpPr>
+      <p:grpSpPr>
+        <a:xfrm>
+          <a:off x="0" y="0"/>
+          <a:ext cx="0" cy="0"/>
+          <a:chOff x="0" y="0"/>
+          <a:chExt cx="0" cy="0"/>
+        </a:xfrm>
+      </p:grpSpPr>
+      <p:sp>
+        <p:nvSpPr>
+          <p:cNvPr id="3" name="Content Placeholder 2"/>
+          <p:cNvSpPr>
+            <a:spLocks noGrp="1"/>
+          </p:cNvSpPr>
+          <p:nvPr>
+            <p:ph idx="1"/>
+          </p:nvPr>
+        </p:nvSpPr>
+        <p:spPr>
+          <a:xfrm>
+            <a:off x="838200" y="232012"/>
+            <a:ext cx="10515600" cy="6625988"/>
+          </a:xfrm>
+        </p:spPr>
+        <p:txBody>
+          <a:bodyPr/>
+          <a:lstStyle/>
+          <a:p>
+            <a:endParaRPr lang="en-US" dirty="0"/>
+          </a:p>
+        </p:txBody>
+      </p:sp>
+      <p:pic>
+        <p:nvPicPr>
+          <p:cNvPr id="4" name="Picture 3"/>
+          <p:cNvPicPr>
+            <a:picLocks noChangeAspect="1"/>
+          </p:cNvPicPr>
+          <p:nvPr/>
+        </p:nvPicPr>
+        <p:blipFill>
+          <a:blip r:embed="rId2"/>
+          <a:stretch>
+            <a:fillRect/>
+          </a:stretch>
+        </p:blipFill>
+        <p:spPr>
+          <a:xfrm>
+            <a:off x="838200" y="232012"/>
+            <a:ext cx="10515600" cy="6086901"/>
+          </a:xfrm>
+          <a:prstGeom prst="rect">
+            <a:avLst/>
+          </a:prstGeom>
+        </p:spPr>
+      </p:pic>
+    </p:spTree>
+    <p:extLst>
+      <p:ext uri="{BB962C8B-B14F-4D97-AF65-F5344CB8AC3E}">
+        <p14:creationId xmlns:p14="http://schemas.microsoft.com/office/powerpoint/2010/main" val="3818672493"/>
       </p:ext>
     </p:extLst>
   </p:cSld>

</xml_diff>

<commit_message>
notes updated and progit marked upto 41 page
</commit_message>
<xml_diff>
--- a/My_Notes.pptx
+++ b/My_Notes.pptx
@@ -3270,6 +3270,54 @@
           </a:p>
         </p:txBody>
       </p:sp>
+      <p:pic>
+        <p:nvPicPr>
+          <p:cNvPr id="4" name="Picture 3"/>
+          <p:cNvPicPr>
+            <a:picLocks noChangeAspect="1"/>
+          </p:cNvPicPr>
+          <p:nvPr/>
+        </p:nvPicPr>
+        <p:blipFill>
+          <a:blip r:embed="rId2"/>
+          <a:stretch>
+            <a:fillRect/>
+          </a:stretch>
+        </p:blipFill>
+        <p:spPr>
+          <a:xfrm>
+            <a:off x="838200" y="163772"/>
+            <a:ext cx="10515600" cy="6694227"/>
+          </a:xfrm>
+          <a:prstGeom prst="rect">
+            <a:avLst/>
+          </a:prstGeom>
+        </p:spPr>
+      </p:pic>
+      <p:pic>
+        <p:nvPicPr>
+          <p:cNvPr id="5" name="Picture 4"/>
+          <p:cNvPicPr>
+            <a:picLocks noChangeAspect="1"/>
+          </p:cNvPicPr>
+          <p:nvPr/>
+        </p:nvPicPr>
+        <p:blipFill>
+          <a:blip r:embed="rId3"/>
+          <a:stretch>
+            <a:fillRect/>
+          </a:stretch>
+        </p:blipFill>
+        <p:spPr>
+          <a:xfrm>
+            <a:off x="838200" y="4558352"/>
+            <a:ext cx="10515600" cy="805219"/>
+          </a:xfrm>
+          <a:prstGeom prst="rect">
+            <a:avLst/>
+          </a:prstGeom>
+        </p:spPr>
+      </p:pic>
     </p:spTree>
     <p:extLst>
       <p:ext uri="{BB962C8B-B14F-4D97-AF65-F5344CB8AC3E}">
@@ -3338,6 +3386,54 @@
           </a:p>
         </p:txBody>
       </p:sp>
+      <p:pic>
+        <p:nvPicPr>
+          <p:cNvPr id="4" name="Picture 3"/>
+          <p:cNvPicPr>
+            <a:picLocks noChangeAspect="1"/>
+          </p:cNvPicPr>
+          <p:nvPr/>
+        </p:nvPicPr>
+        <p:blipFill>
+          <a:blip r:embed="rId2"/>
+          <a:stretch>
+            <a:fillRect/>
+          </a:stretch>
+        </p:blipFill>
+        <p:spPr>
+          <a:xfrm>
+            <a:off x="838200" y="187704"/>
+            <a:ext cx="10515600" cy="3161470"/>
+          </a:xfrm>
+          <a:prstGeom prst="rect">
+            <a:avLst/>
+          </a:prstGeom>
+        </p:spPr>
+      </p:pic>
+      <p:pic>
+        <p:nvPicPr>
+          <p:cNvPr id="5" name="Picture 4"/>
+          <p:cNvPicPr>
+            <a:picLocks noChangeAspect="1"/>
+          </p:cNvPicPr>
+          <p:nvPr/>
+        </p:nvPicPr>
+        <p:blipFill>
+          <a:blip r:embed="rId3"/>
+          <a:stretch>
+            <a:fillRect/>
+          </a:stretch>
+        </p:blipFill>
+        <p:spPr>
+          <a:xfrm>
+            <a:off x="708759" y="3575714"/>
+            <a:ext cx="10850895" cy="2374709"/>
+          </a:xfrm>
+          <a:prstGeom prst="rect">
+            <a:avLst/>
+          </a:prstGeom>
+        </p:spPr>
+      </p:pic>
     </p:spTree>
     <p:extLst>
       <p:ext uri="{BB962C8B-B14F-4D97-AF65-F5344CB8AC3E}">
@@ -3402,10 +3498,34 @@
           <a:bodyPr/>
           <a:lstStyle/>
           <a:p>
-            <a:endParaRPr lang="en-US"/>
-          </a:p>
-        </p:txBody>
-      </p:sp>
+            <a:endParaRPr lang="en-US" dirty="0"/>
+          </a:p>
+        </p:txBody>
+      </p:sp>
+      <p:pic>
+        <p:nvPicPr>
+          <p:cNvPr id="4" name="Picture 3"/>
+          <p:cNvPicPr>
+            <a:picLocks noChangeAspect="1"/>
+          </p:cNvPicPr>
+          <p:nvPr/>
+        </p:nvPicPr>
+        <p:blipFill>
+          <a:blip r:embed="rId2"/>
+          <a:stretch>
+            <a:fillRect/>
+          </a:stretch>
+        </p:blipFill>
+        <p:spPr>
+          <a:xfrm>
+            <a:off x="838200" y="365125"/>
+            <a:ext cx="10515600" cy="6308630"/>
+          </a:xfrm>
+          <a:prstGeom prst="rect">
+            <a:avLst/>
+          </a:prstGeom>
+        </p:spPr>
+      </p:pic>
     </p:spTree>
     <p:extLst>
       <p:ext uri="{BB962C8B-B14F-4D97-AF65-F5344CB8AC3E}">
@@ -3474,6 +3594,30 @@
           </a:p>
         </p:txBody>
       </p:sp>
+      <p:pic>
+        <p:nvPicPr>
+          <p:cNvPr id="4" name="Picture 3"/>
+          <p:cNvPicPr>
+            <a:picLocks noChangeAspect="1"/>
+          </p:cNvPicPr>
+          <p:nvPr/>
+        </p:nvPicPr>
+        <p:blipFill>
+          <a:blip r:embed="rId2"/>
+          <a:stretch>
+            <a:fillRect/>
+          </a:stretch>
+        </p:blipFill>
+        <p:spPr>
+          <a:xfrm>
+            <a:off x="696036" y="150125"/>
+            <a:ext cx="10795379" cy="6707875"/>
+          </a:xfrm>
+          <a:prstGeom prst="rect">
+            <a:avLst/>
+          </a:prstGeom>
+        </p:spPr>
+      </p:pic>
     </p:spTree>
     <p:extLst>
       <p:ext uri="{BB962C8B-B14F-4D97-AF65-F5344CB8AC3E}">
@@ -3542,6 +3686,30 @@
           </a:p>
         </p:txBody>
       </p:sp>
+      <p:pic>
+        <p:nvPicPr>
+          <p:cNvPr id="4" name="Picture 3"/>
+          <p:cNvPicPr>
+            <a:picLocks noChangeAspect="1"/>
+          </p:cNvPicPr>
+          <p:nvPr/>
+        </p:nvPicPr>
+        <p:blipFill>
+          <a:blip r:embed="rId2"/>
+          <a:stretch>
+            <a:fillRect/>
+          </a:stretch>
+        </p:blipFill>
+        <p:spPr>
+          <a:xfrm>
+            <a:off x="838200" y="163774"/>
+            <a:ext cx="10515600" cy="6694226"/>
+          </a:xfrm>
+          <a:prstGeom prst="rect">
+            <a:avLst/>
+          </a:prstGeom>
+        </p:spPr>
+      </p:pic>
     </p:spTree>
     <p:extLst>
       <p:ext uri="{BB962C8B-B14F-4D97-AF65-F5344CB8AC3E}">

</xml_diff>

<commit_message>
branching added to ppt
</commit_message>
<xml_diff>
--- a/My_Notes.pptx
+++ b/My_Notes.pptx
@@ -10,21 +10,22 @@
     <p:sldId id="257" r:id="rId4"/>
     <p:sldId id="258" r:id="rId5"/>
     <p:sldId id="275" r:id="rId6"/>
-    <p:sldId id="259" r:id="rId7"/>
-    <p:sldId id="260" r:id="rId8"/>
-    <p:sldId id="263" r:id="rId9"/>
-    <p:sldId id="261" r:id="rId10"/>
-    <p:sldId id="264" r:id="rId11"/>
-    <p:sldId id="265" r:id="rId12"/>
-    <p:sldId id="266" r:id="rId13"/>
-    <p:sldId id="267" r:id="rId14"/>
-    <p:sldId id="268" r:id="rId15"/>
-    <p:sldId id="269" r:id="rId16"/>
-    <p:sldId id="270" r:id="rId17"/>
-    <p:sldId id="271" r:id="rId18"/>
-    <p:sldId id="272" r:id="rId19"/>
-    <p:sldId id="273" r:id="rId20"/>
-    <p:sldId id="274" r:id="rId21"/>
+    <p:sldId id="276" r:id="rId7"/>
+    <p:sldId id="259" r:id="rId8"/>
+    <p:sldId id="260" r:id="rId9"/>
+    <p:sldId id="263" r:id="rId10"/>
+    <p:sldId id="261" r:id="rId11"/>
+    <p:sldId id="264" r:id="rId12"/>
+    <p:sldId id="265" r:id="rId13"/>
+    <p:sldId id="266" r:id="rId14"/>
+    <p:sldId id="267" r:id="rId15"/>
+    <p:sldId id="268" r:id="rId16"/>
+    <p:sldId id="269" r:id="rId17"/>
+    <p:sldId id="270" r:id="rId18"/>
+    <p:sldId id="271" r:id="rId19"/>
+    <p:sldId id="272" r:id="rId20"/>
+    <p:sldId id="273" r:id="rId21"/>
+    <p:sldId id="274" r:id="rId22"/>
   </p:sldIdLst>
   <p:sldSz cx="12192000" cy="6858000"/>
   <p:notesSz cx="6858000" cy="9144000"/>
@@ -3061,6 +3062,95 @@
         </p:nvSpPr>
         <p:spPr>
           <a:xfrm>
+            <a:off x="838200" y="450376"/>
+            <a:ext cx="10515600" cy="5726587"/>
+          </a:xfrm>
+        </p:spPr>
+        <p:txBody>
+          <a:bodyPr/>
+          <a:lstStyle/>
+          <a:p>
+            <a:r>
+              <a:rPr lang="en-US" dirty="0"/>
+              <a:t> </a:t>
+            </a:r>
+            <a:r>
+              <a:rPr lang="en-US" dirty="0" err="1" smtClean="0"/>
+              <a:t>git</a:t>
+            </a:r>
+            <a:r>
+              <a:rPr lang="en-US" dirty="0" smtClean="0"/>
+              <a:t>  --version</a:t>
+            </a:r>
+          </a:p>
+        </p:txBody>
+      </p:sp>
+      <p:pic>
+        <p:nvPicPr>
+          <p:cNvPr id="5" name="Picture 4"/>
+          <p:cNvPicPr>
+            <a:picLocks noChangeAspect="1"/>
+          </p:cNvPicPr>
+          <p:nvPr/>
+        </p:nvPicPr>
+        <p:blipFill>
+          <a:blip r:embed="rId2"/>
+          <a:stretch>
+            <a:fillRect/>
+          </a:stretch>
+        </p:blipFill>
+        <p:spPr>
+          <a:xfrm>
+            <a:off x="518615" y="1364775"/>
+            <a:ext cx="8523483" cy="5616054"/>
+          </a:xfrm>
+          <a:prstGeom prst="rect">
+            <a:avLst/>
+          </a:prstGeom>
+        </p:spPr>
+      </p:pic>
+    </p:spTree>
+    <p:extLst>
+      <p:ext uri="{BB962C8B-B14F-4D97-AF65-F5344CB8AC3E}">
+        <p14:creationId xmlns:p14="http://schemas.microsoft.com/office/powerpoint/2010/main" val="674771836"/>
+      </p:ext>
+    </p:extLst>
+  </p:cSld>
+  <p:clrMapOvr>
+    <a:masterClrMapping/>
+  </p:clrMapOvr>
+</p:sld>
+</file>
+
+<file path=ppt/slides/slide11.xml><?xml version="1.0" encoding="utf-8"?>
+<p:sld xmlns:a="http://schemas.openxmlformats.org/drawingml/2006/main" xmlns:r="http://schemas.openxmlformats.org/officeDocument/2006/relationships" xmlns:p="http://schemas.openxmlformats.org/presentationml/2006/main">
+  <p:cSld>
+    <p:spTree>
+      <p:nvGrpSpPr>
+        <p:cNvPr id="1" name=""/>
+        <p:cNvGrpSpPr/>
+        <p:nvPr/>
+      </p:nvGrpSpPr>
+      <p:grpSpPr>
+        <a:xfrm>
+          <a:off x="0" y="0"/>
+          <a:ext cx="0" cy="0"/>
+          <a:chOff x="0" y="0"/>
+          <a:chExt cx="0" cy="0"/>
+        </a:xfrm>
+      </p:grpSpPr>
+      <p:sp>
+        <p:nvSpPr>
+          <p:cNvPr id="3" name="Content Placeholder 2"/>
+          <p:cNvSpPr>
+            <a:spLocks noGrp="1"/>
+          </p:cNvSpPr>
+          <p:nvPr>
+            <p:ph idx="1"/>
+          </p:nvPr>
+        </p:nvSpPr>
+        <p:spPr>
+          <a:xfrm>
             <a:off x="838200" y="232012"/>
             <a:ext cx="10515600" cy="6625988"/>
           </a:xfrm>
@@ -3110,7 +3200,7 @@
 </p:sld>
 </file>
 
-<file path=ppt/slides/slide11.xml><?xml version="1.0" encoding="utf-8"?>
+<file path=ppt/slides/slide12.xml><?xml version="1.0" encoding="utf-8"?>
 <p:sld xmlns:a="http://schemas.openxmlformats.org/drawingml/2006/main" xmlns:r="http://schemas.openxmlformats.org/officeDocument/2006/relationships" xmlns:p="http://schemas.openxmlformats.org/presentationml/2006/main">
   <p:cSld>
     <p:spTree>
@@ -3202,7 +3292,7 @@
 </p:sld>
 </file>
 
-<file path=ppt/slides/slide12.xml><?xml version="1.0" encoding="utf-8"?>
+<file path=ppt/slides/slide13.xml><?xml version="1.0" encoding="utf-8"?>
 <p:sld xmlns:a="http://schemas.openxmlformats.org/drawingml/2006/main" xmlns:r="http://schemas.openxmlformats.org/officeDocument/2006/relationships" xmlns:p="http://schemas.openxmlformats.org/presentationml/2006/main">
   <p:cSld>
     <p:spTree>
@@ -3294,7 +3384,7 @@
 </p:sld>
 </file>
 
-<file path=ppt/slides/slide13.xml><?xml version="1.0" encoding="utf-8"?>
+<file path=ppt/slides/slide14.xml><?xml version="1.0" encoding="utf-8"?>
 <p:sld xmlns:a="http://schemas.openxmlformats.org/drawingml/2006/main" xmlns:r="http://schemas.openxmlformats.org/officeDocument/2006/relationships" xmlns:p="http://schemas.openxmlformats.org/presentationml/2006/main">
   <p:cSld>
     <p:spTree>
@@ -3410,7 +3500,7 @@
 </p:sld>
 </file>
 
-<file path=ppt/slides/slide14.xml><?xml version="1.0" encoding="utf-8"?>
+<file path=ppt/slides/slide15.xml><?xml version="1.0" encoding="utf-8"?>
 <p:sld xmlns:a="http://schemas.openxmlformats.org/drawingml/2006/main" xmlns:r="http://schemas.openxmlformats.org/officeDocument/2006/relationships" xmlns:p="http://schemas.openxmlformats.org/presentationml/2006/main">
   <p:cSld>
     <p:spTree>
@@ -3526,7 +3616,7 @@
 </p:sld>
 </file>
 
-<file path=ppt/slides/slide15.xml><?xml version="1.0" encoding="utf-8"?>
+<file path=ppt/slides/slide16.xml><?xml version="1.0" encoding="utf-8"?>
 <p:sld xmlns:a="http://schemas.openxmlformats.org/drawingml/2006/main" xmlns:r="http://schemas.openxmlformats.org/officeDocument/2006/relationships" xmlns:p="http://schemas.openxmlformats.org/presentationml/2006/main">
   <p:cSld>
     <p:spTree>
@@ -3618,7 +3708,7 @@
 </p:sld>
 </file>
 
-<file path=ppt/slides/slide16.xml><?xml version="1.0" encoding="utf-8"?>
+<file path=ppt/slides/slide17.xml><?xml version="1.0" encoding="utf-8"?>
 <p:sld xmlns:a="http://schemas.openxmlformats.org/drawingml/2006/main" xmlns:r="http://schemas.openxmlformats.org/officeDocument/2006/relationships" xmlns:p="http://schemas.openxmlformats.org/presentationml/2006/main">
   <p:cSld>
     <p:spTree>
@@ -3710,7 +3800,7 @@
 </p:sld>
 </file>
 
-<file path=ppt/slides/slide17.xml><?xml version="1.0" encoding="utf-8"?>
+<file path=ppt/slides/slide18.xml><?xml version="1.0" encoding="utf-8"?>
 <p:sld xmlns:a="http://schemas.openxmlformats.org/drawingml/2006/main" xmlns:r="http://schemas.openxmlformats.org/officeDocument/2006/relationships" xmlns:p="http://schemas.openxmlformats.org/presentationml/2006/main">
   <p:cSld>
     <p:spTree>
@@ -3802,7 +3892,7 @@
 </p:sld>
 </file>
 
-<file path=ppt/slides/slide18.xml><?xml version="1.0" encoding="utf-8"?>
+<file path=ppt/slides/slide19.xml><?xml version="1.0" encoding="utf-8"?>
 <p:sld xmlns:a="http://schemas.openxmlformats.org/drawingml/2006/main" xmlns:r="http://schemas.openxmlformats.org/officeDocument/2006/relationships" xmlns:p="http://schemas.openxmlformats.org/presentationml/2006/main">
   <p:cSld>
     <p:spTree>
@@ -3885,98 +3975,6 @@
     <p:extLst>
       <p:ext uri="{BB962C8B-B14F-4D97-AF65-F5344CB8AC3E}">
         <p14:creationId xmlns:p14="http://schemas.microsoft.com/office/powerpoint/2010/main" val="2246433591"/>
-      </p:ext>
-    </p:extLst>
-  </p:cSld>
-  <p:clrMapOvr>
-    <a:masterClrMapping/>
-  </p:clrMapOvr>
-</p:sld>
-</file>
-
-<file path=ppt/slides/slide19.xml><?xml version="1.0" encoding="utf-8"?>
-<p:sld xmlns:a="http://schemas.openxmlformats.org/drawingml/2006/main" xmlns:r="http://schemas.openxmlformats.org/officeDocument/2006/relationships" xmlns:p="http://schemas.openxmlformats.org/presentationml/2006/main">
-  <p:cSld>
-    <p:spTree>
-      <p:nvGrpSpPr>
-        <p:cNvPr id="1" name=""/>
-        <p:cNvGrpSpPr/>
-        <p:nvPr/>
-      </p:nvGrpSpPr>
-      <p:grpSpPr>
-        <a:xfrm>
-          <a:off x="0" y="0"/>
-          <a:ext cx="0" cy="0"/>
-          <a:chOff x="0" y="0"/>
-          <a:chExt cx="0" cy="0"/>
-        </a:xfrm>
-      </p:grpSpPr>
-      <p:sp>
-        <p:nvSpPr>
-          <p:cNvPr id="2" name="Title 1"/>
-          <p:cNvSpPr>
-            <a:spLocks noGrp="1"/>
-          </p:cNvSpPr>
-          <p:nvPr>
-            <p:ph type="title"/>
-          </p:nvPr>
-        </p:nvSpPr>
-        <p:spPr/>
-        <p:txBody>
-          <a:bodyPr/>
-          <a:lstStyle/>
-          <a:p>
-            <a:endParaRPr lang="en-US"/>
-          </a:p>
-        </p:txBody>
-      </p:sp>
-      <p:sp>
-        <p:nvSpPr>
-          <p:cNvPr id="3" name="Content Placeholder 2"/>
-          <p:cNvSpPr>
-            <a:spLocks noGrp="1"/>
-          </p:cNvSpPr>
-          <p:nvPr>
-            <p:ph idx="1"/>
-          </p:nvPr>
-        </p:nvSpPr>
-        <p:spPr/>
-        <p:txBody>
-          <a:bodyPr/>
-          <a:lstStyle/>
-          <a:p>
-            <a:endParaRPr lang="en-US"/>
-          </a:p>
-        </p:txBody>
-      </p:sp>
-      <p:pic>
-        <p:nvPicPr>
-          <p:cNvPr id="4" name="Picture 3"/>
-          <p:cNvPicPr>
-            <a:picLocks noChangeAspect="1"/>
-          </p:cNvPicPr>
-          <p:nvPr/>
-        </p:nvPicPr>
-        <p:blipFill>
-          <a:blip r:embed="rId2"/>
-          <a:stretch>
-            <a:fillRect/>
-          </a:stretch>
-        </p:blipFill>
-        <p:spPr>
-          <a:xfrm>
-            <a:off x="736979" y="365126"/>
-            <a:ext cx="10822675" cy="6144856"/>
-          </a:xfrm>
-          <a:prstGeom prst="rect">
-            <a:avLst/>
-          </a:prstGeom>
-        </p:spPr>
-      </p:pic>
-    </p:spTree>
-    <p:extLst>
-      <p:ext uri="{BB962C8B-B14F-4D97-AF65-F5344CB8AC3E}">
-        <p14:creationId xmlns:p14="http://schemas.microsoft.com/office/powerpoint/2010/main" val="4086509070"/>
       </p:ext>
     </p:extLst>
   </p:cSld>
@@ -4097,6 +4095,98 @@
           </a:p>
         </p:txBody>
       </p:sp>
+      <p:pic>
+        <p:nvPicPr>
+          <p:cNvPr id="4" name="Picture 3"/>
+          <p:cNvPicPr>
+            <a:picLocks noChangeAspect="1"/>
+          </p:cNvPicPr>
+          <p:nvPr/>
+        </p:nvPicPr>
+        <p:blipFill>
+          <a:blip r:embed="rId2"/>
+          <a:stretch>
+            <a:fillRect/>
+          </a:stretch>
+        </p:blipFill>
+        <p:spPr>
+          <a:xfrm>
+            <a:off x="736979" y="365126"/>
+            <a:ext cx="10822675" cy="6144856"/>
+          </a:xfrm>
+          <a:prstGeom prst="rect">
+            <a:avLst/>
+          </a:prstGeom>
+        </p:spPr>
+      </p:pic>
+    </p:spTree>
+    <p:extLst>
+      <p:ext uri="{BB962C8B-B14F-4D97-AF65-F5344CB8AC3E}">
+        <p14:creationId xmlns:p14="http://schemas.microsoft.com/office/powerpoint/2010/main" val="4086509070"/>
+      </p:ext>
+    </p:extLst>
+  </p:cSld>
+  <p:clrMapOvr>
+    <a:masterClrMapping/>
+  </p:clrMapOvr>
+</p:sld>
+</file>
+
+<file path=ppt/slides/slide21.xml><?xml version="1.0" encoding="utf-8"?>
+<p:sld xmlns:a="http://schemas.openxmlformats.org/drawingml/2006/main" xmlns:r="http://schemas.openxmlformats.org/officeDocument/2006/relationships" xmlns:p="http://schemas.openxmlformats.org/presentationml/2006/main">
+  <p:cSld>
+    <p:spTree>
+      <p:nvGrpSpPr>
+        <p:cNvPr id="1" name=""/>
+        <p:cNvGrpSpPr/>
+        <p:nvPr/>
+      </p:nvGrpSpPr>
+      <p:grpSpPr>
+        <a:xfrm>
+          <a:off x="0" y="0"/>
+          <a:ext cx="0" cy="0"/>
+          <a:chOff x="0" y="0"/>
+          <a:chExt cx="0" cy="0"/>
+        </a:xfrm>
+      </p:grpSpPr>
+      <p:sp>
+        <p:nvSpPr>
+          <p:cNvPr id="2" name="Title 1"/>
+          <p:cNvSpPr>
+            <a:spLocks noGrp="1"/>
+          </p:cNvSpPr>
+          <p:nvPr>
+            <p:ph type="title"/>
+          </p:nvPr>
+        </p:nvSpPr>
+        <p:spPr/>
+        <p:txBody>
+          <a:bodyPr/>
+          <a:lstStyle/>
+          <a:p>
+            <a:endParaRPr lang="en-US"/>
+          </a:p>
+        </p:txBody>
+      </p:sp>
+      <p:sp>
+        <p:nvSpPr>
+          <p:cNvPr id="3" name="Content Placeholder 2"/>
+          <p:cNvSpPr>
+            <a:spLocks noGrp="1"/>
+          </p:cNvSpPr>
+          <p:nvPr>
+            <p:ph idx="1"/>
+          </p:nvPr>
+        </p:nvSpPr>
+        <p:spPr/>
+        <p:txBody>
+          <a:bodyPr/>
+          <a:lstStyle/>
+          <a:p>
+            <a:endParaRPr lang="en-US"/>
+          </a:p>
+        </p:txBody>
+      </p:sp>
     </p:spTree>
     <p:extLst>
       <p:ext uri="{BB962C8B-B14F-4D97-AF65-F5344CB8AC3E}">
@@ -4529,104 +4619,44 @@
           </a:xfrm>
         </p:spPr>
         <p:txBody>
-          <a:bodyPr/>
+          <a:bodyPr>
+            <a:normAutofit/>
+          </a:bodyPr>
           <a:lstStyle/>
           <a:p>
             <a:r>
               <a:rPr lang="en-US" dirty="0" smtClean="0"/>
-              <a:t>Creating a branch : </a:t>
+              <a:t>How it works?</a:t>
             </a:r>
           </a:p>
           <a:p>
             <a:pPr lvl="1"/>
             <a:r>
+              <a:rPr lang="en-US" dirty="0" smtClean="0"/>
+              <a:t>When we create a new branch, a new copy of the repo is created. Whatever changes we make in this branch stays in that copy until we commit the branch and merge it to the master branch</a:t>
+            </a:r>
+          </a:p>
+          <a:p>
+            <a:pPr lvl="1"/>
+            <a:r>
+              <a:rPr lang="en-US" dirty="0" smtClean="0"/>
+              <a:t>Suppose, </a:t>
+            </a:r>
+            <a:r>
               <a:rPr lang="en-US" dirty="0" err="1" smtClean="0"/>
-              <a:t>git</a:t>
+              <a:t>alice</a:t>
             </a:r>
             <a:r>
               <a:rPr lang="en-US" dirty="0" smtClean="0"/>
-              <a:t> checkout –b “</a:t>
-            </a:r>
-            <a:r>
-              <a:rPr lang="en-US" dirty="0" err="1" smtClean="0"/>
-              <a:t>branch_name</a:t>
-            </a:r>
+              <a:t> and bob are working on a same project. Alice wants to add feature A and bob wants to add feature B to the project. Now what they will do is they both create a branch and add their feature to that branch, then finally merge the branches to master (main project)</a:t>
+            </a:r>
+          </a:p>
+          <a:p>
+            <a:pPr lvl="1"/>
             <a:r>
               <a:rPr lang="en-US" dirty="0" smtClean="0"/>
-              <a:t>”</a:t>
-            </a:r>
-          </a:p>
-          <a:p>
-            <a:pPr lvl="1"/>
-            <a:r>
-              <a:rPr lang="en-US" dirty="0" smtClean="0"/>
-              <a:t>Example : </a:t>
-            </a:r>
-            <a:r>
-              <a:rPr lang="en-US" dirty="0" err="1" smtClean="0"/>
-              <a:t>git</a:t>
-            </a:r>
-            <a:r>
-              <a:rPr lang="en-US" dirty="0" smtClean="0"/>
-              <a:t> checkout –b “new-branch”</a:t>
-            </a:r>
-          </a:p>
-          <a:p>
-            <a:pPr lvl="1"/>
-            <a:r>
-              <a:rPr lang="en-US" dirty="0" smtClean="0"/>
-              <a:t>Checkout meaning you will move to new branch that you just created </a:t>
-            </a:r>
-          </a:p>
-          <a:p>
-            <a:pPr marL="457200" lvl="1" indent="0">
-              <a:buNone/>
-            </a:pPr>
-            <a:endParaRPr lang="en-US" dirty="0" smtClean="0"/>
-          </a:p>
-          <a:p>
-            <a:r>
-              <a:rPr lang="en-US" dirty="0" smtClean="0"/>
-              <a:t>Switching between branch:</a:t>
-            </a:r>
-          </a:p>
-          <a:p>
-            <a:pPr lvl="1"/>
-            <a:r>
-              <a:rPr lang="en-US" dirty="0"/>
-              <a:t> </a:t>
-            </a:r>
-            <a:r>
-              <a:rPr lang="en-US" dirty="0" err="1" smtClean="0"/>
-              <a:t>git</a:t>
-            </a:r>
-            <a:r>
-              <a:rPr lang="en-US" dirty="0" smtClean="0"/>
-              <a:t> checkout </a:t>
-            </a:r>
-            <a:r>
-              <a:rPr lang="en-US" dirty="0" err="1" smtClean="0"/>
-              <a:t>branch_name</a:t>
-            </a:r>
-            <a:endParaRPr lang="en-US" dirty="0" smtClean="0"/>
-          </a:p>
-          <a:p>
-            <a:pPr lvl="1"/>
-            <a:r>
-              <a:rPr lang="en-US" dirty="0" smtClean="0"/>
-              <a:t>Example : </a:t>
-            </a:r>
-            <a:r>
-              <a:rPr lang="en-US" dirty="0" err="1" smtClean="0"/>
-              <a:t>git</a:t>
-            </a:r>
-            <a:r>
-              <a:rPr lang="en-US" dirty="0" smtClean="0"/>
-              <a:t> checkout master</a:t>
-            </a:r>
-          </a:p>
-          <a:p>
-            <a:endParaRPr lang="en-US" dirty="0"/>
+              <a:t>Usually branches are deleted after merging to the master branch</a:t>
+            </a:r>
           </a:p>
         </p:txBody>
       </p:sp>
@@ -4670,6 +4700,200 @@
             <p:ph type="title"/>
           </p:nvPr>
         </p:nvSpPr>
+        <p:spPr>
+          <a:xfrm>
+            <a:off x="838200" y="0"/>
+            <a:ext cx="10515600" cy="1325563"/>
+          </a:xfrm>
+        </p:spPr>
+        <p:txBody>
+          <a:bodyPr/>
+          <a:lstStyle/>
+          <a:p>
+            <a:r>
+              <a:rPr lang="en-US" b="1" dirty="0" smtClean="0">
+                <a:solidFill>
+                  <a:schemeClr val="accent1">
+                    <a:lumMod val="75000"/>
+                  </a:schemeClr>
+                </a:solidFill>
+              </a:rPr>
+              <a:t>Branching</a:t>
+            </a:r>
+            <a:r>
+              <a:rPr lang="en-US" b="1" dirty="0" smtClean="0"/>
+              <a:t> </a:t>
+            </a:r>
+            <a:endParaRPr lang="en-US" b="1" dirty="0"/>
+          </a:p>
+        </p:txBody>
+      </p:sp>
+      <p:sp>
+        <p:nvSpPr>
+          <p:cNvPr id="3" name="Content Placeholder 2"/>
+          <p:cNvSpPr>
+            <a:spLocks noGrp="1"/>
+          </p:cNvSpPr>
+          <p:nvPr>
+            <p:ph idx="1"/>
+          </p:nvPr>
+        </p:nvSpPr>
+        <p:spPr>
+          <a:xfrm>
+            <a:off x="838200" y="1325563"/>
+            <a:ext cx="10515600" cy="4851400"/>
+          </a:xfrm>
+        </p:spPr>
+        <p:txBody>
+          <a:bodyPr>
+            <a:normAutofit/>
+          </a:bodyPr>
+          <a:lstStyle/>
+          <a:p>
+            <a:pPr marL="457200" lvl="1" indent="0">
+              <a:buNone/>
+            </a:pPr>
+            <a:endParaRPr lang="en-US" dirty="0" smtClean="0"/>
+          </a:p>
+          <a:p>
+            <a:r>
+              <a:rPr lang="en-US" dirty="0" smtClean="0"/>
+              <a:t>Creating a branch : </a:t>
+            </a:r>
+          </a:p>
+          <a:p>
+            <a:pPr lvl="1"/>
+            <a:r>
+              <a:rPr lang="en-US" dirty="0" err="1" smtClean="0"/>
+              <a:t>git</a:t>
+            </a:r>
+            <a:r>
+              <a:rPr lang="en-US" dirty="0" smtClean="0"/>
+              <a:t> checkout –b “</a:t>
+            </a:r>
+            <a:r>
+              <a:rPr lang="en-US" dirty="0" err="1" smtClean="0"/>
+              <a:t>branch_name</a:t>
+            </a:r>
+            <a:r>
+              <a:rPr lang="en-US" dirty="0" smtClean="0"/>
+              <a:t>”</a:t>
+            </a:r>
+          </a:p>
+          <a:p>
+            <a:pPr lvl="1"/>
+            <a:r>
+              <a:rPr lang="en-US" dirty="0" smtClean="0"/>
+              <a:t>Example : </a:t>
+            </a:r>
+            <a:r>
+              <a:rPr lang="en-US" dirty="0" err="1" smtClean="0"/>
+              <a:t>git</a:t>
+            </a:r>
+            <a:r>
+              <a:rPr lang="en-US" dirty="0" smtClean="0"/>
+              <a:t> checkout –b “new-branch”</a:t>
+            </a:r>
+          </a:p>
+          <a:p>
+            <a:pPr lvl="1"/>
+            <a:r>
+              <a:rPr lang="en-US" dirty="0" smtClean="0"/>
+              <a:t>Checkout meaning you will move to new branch that you just created </a:t>
+            </a:r>
+          </a:p>
+          <a:p>
+            <a:pPr marL="457200" lvl="1" indent="0">
+              <a:buNone/>
+            </a:pPr>
+            <a:endParaRPr lang="en-US" dirty="0" smtClean="0"/>
+          </a:p>
+          <a:p>
+            <a:r>
+              <a:rPr lang="en-US" dirty="0" smtClean="0"/>
+              <a:t>Switching between branches:</a:t>
+            </a:r>
+          </a:p>
+          <a:p>
+            <a:pPr lvl="1"/>
+            <a:r>
+              <a:rPr lang="en-US" dirty="0"/>
+              <a:t> </a:t>
+            </a:r>
+            <a:r>
+              <a:rPr lang="en-US" dirty="0" err="1" smtClean="0"/>
+              <a:t>git</a:t>
+            </a:r>
+            <a:r>
+              <a:rPr lang="en-US" dirty="0" smtClean="0"/>
+              <a:t> checkout </a:t>
+            </a:r>
+            <a:r>
+              <a:rPr lang="en-US" dirty="0" err="1" smtClean="0"/>
+              <a:t>branch_name</a:t>
+            </a:r>
+            <a:endParaRPr lang="en-US" dirty="0" smtClean="0"/>
+          </a:p>
+          <a:p>
+            <a:pPr lvl="1"/>
+            <a:r>
+              <a:rPr lang="en-US" dirty="0" smtClean="0"/>
+              <a:t>Example : </a:t>
+            </a:r>
+            <a:r>
+              <a:rPr lang="en-US" dirty="0" err="1" smtClean="0"/>
+              <a:t>git</a:t>
+            </a:r>
+            <a:r>
+              <a:rPr lang="en-US" dirty="0" smtClean="0"/>
+              <a:t> checkout master</a:t>
+            </a:r>
+          </a:p>
+          <a:p>
+            <a:endParaRPr lang="en-US" dirty="0"/>
+          </a:p>
+        </p:txBody>
+      </p:sp>
+    </p:spTree>
+    <p:extLst>
+      <p:ext uri="{BB962C8B-B14F-4D97-AF65-F5344CB8AC3E}">
+        <p14:creationId xmlns:p14="http://schemas.microsoft.com/office/powerpoint/2010/main" val="3846389809"/>
+      </p:ext>
+    </p:extLst>
+  </p:cSld>
+  <p:clrMapOvr>
+    <a:masterClrMapping/>
+  </p:clrMapOvr>
+</p:sld>
+</file>
+
+<file path=ppt/slides/slide7.xml><?xml version="1.0" encoding="utf-8"?>
+<p:sld xmlns:a="http://schemas.openxmlformats.org/drawingml/2006/main" xmlns:r="http://schemas.openxmlformats.org/officeDocument/2006/relationships" xmlns:p="http://schemas.openxmlformats.org/presentationml/2006/main">
+  <p:cSld>
+    <p:spTree>
+      <p:nvGrpSpPr>
+        <p:cNvPr id="1" name=""/>
+        <p:cNvGrpSpPr/>
+        <p:nvPr/>
+      </p:nvGrpSpPr>
+      <p:grpSpPr>
+        <a:xfrm>
+          <a:off x="0" y="0"/>
+          <a:ext cx="0" cy="0"/>
+          <a:chOff x="0" y="0"/>
+          <a:chExt cx="0" cy="0"/>
+        </a:xfrm>
+      </p:grpSpPr>
+      <p:sp>
+        <p:nvSpPr>
+          <p:cNvPr id="2" name="Title 1"/>
+          <p:cNvSpPr>
+            <a:spLocks noGrp="1"/>
+          </p:cNvSpPr>
+          <p:nvPr>
+            <p:ph type="title"/>
+          </p:nvPr>
+        </p:nvSpPr>
         <p:spPr/>
         <p:txBody>
           <a:bodyPr/>
@@ -4738,7 +4962,7 @@
 </p:sld>
 </file>
 
-<file path=ppt/slides/slide7.xml><?xml version="1.0" encoding="utf-8"?>
+<file path=ppt/slides/slide8.xml><?xml version="1.0" encoding="utf-8"?>
 <p:sld xmlns:a="http://schemas.openxmlformats.org/drawingml/2006/main" xmlns:r="http://schemas.openxmlformats.org/officeDocument/2006/relationships" xmlns:p="http://schemas.openxmlformats.org/presentationml/2006/main">
   <p:cSld>
     <p:spTree>
@@ -4858,78 +5082,6 @@
 </p:sld>
 </file>
 
-<file path=ppt/slides/slide8.xml><?xml version="1.0" encoding="utf-8"?>
-<p:sld xmlns:a="http://schemas.openxmlformats.org/drawingml/2006/main" xmlns:r="http://schemas.openxmlformats.org/officeDocument/2006/relationships" xmlns:p="http://schemas.openxmlformats.org/presentationml/2006/main">
-  <p:cSld>
-    <p:spTree>
-      <p:nvGrpSpPr>
-        <p:cNvPr id="1" name=""/>
-        <p:cNvGrpSpPr/>
-        <p:nvPr/>
-      </p:nvGrpSpPr>
-      <p:grpSpPr>
-        <a:xfrm>
-          <a:off x="0" y="0"/>
-          <a:ext cx="0" cy="0"/>
-          <a:chOff x="0" y="0"/>
-          <a:chExt cx="0" cy="0"/>
-        </a:xfrm>
-      </p:grpSpPr>
-      <p:sp>
-        <p:nvSpPr>
-          <p:cNvPr id="2" name="Title 1"/>
-          <p:cNvSpPr>
-            <a:spLocks noGrp="1"/>
-          </p:cNvSpPr>
-          <p:nvPr>
-            <p:ph type="title"/>
-          </p:nvPr>
-        </p:nvSpPr>
-        <p:spPr>
-          <a:xfrm>
-            <a:off x="1356815" y="2739835"/>
-            <a:ext cx="10515600" cy="1325563"/>
-          </a:xfrm>
-        </p:spPr>
-        <p:txBody>
-          <a:bodyPr>
-            <a:normAutofit/>
-          </a:bodyPr>
-          <a:lstStyle/>
-          <a:p>
-            <a:r>
-              <a:rPr lang="en-US" sz="6600" b="1" dirty="0" smtClean="0">
-                <a:solidFill>
-                  <a:schemeClr val="accent1">
-                    <a:lumMod val="75000"/>
-                  </a:schemeClr>
-                </a:solidFill>
-              </a:rPr>
-              <a:t>             Commands</a:t>
-            </a:r>
-            <a:endParaRPr lang="en-US" sz="6600" b="1" dirty="0">
-              <a:solidFill>
-                <a:schemeClr val="accent1">
-                  <a:lumMod val="75000"/>
-                </a:schemeClr>
-              </a:solidFill>
-            </a:endParaRPr>
-          </a:p>
-        </p:txBody>
-      </p:sp>
-    </p:spTree>
-    <p:extLst>
-      <p:ext uri="{BB962C8B-B14F-4D97-AF65-F5344CB8AC3E}">
-        <p14:creationId xmlns:p14="http://schemas.microsoft.com/office/powerpoint/2010/main" val="435083686"/>
-      </p:ext>
-    </p:extLst>
-  </p:cSld>
-  <p:clrMapOvr>
-    <a:masterClrMapping/>
-  </p:clrMapOvr>
-</p:sld>
-</file>
-
 <file path=ppt/slides/slide9.xml><?xml version="1.0" encoding="utf-8"?>
 <p:sld xmlns:a="http://schemas.openxmlformats.org/drawingml/2006/main" xmlns:r="http://schemas.openxmlformats.org/officeDocument/2006/relationships" xmlns:p="http://schemas.openxmlformats.org/presentationml/2006/main">
   <p:cSld>
@@ -4949,67 +5101,50 @@
       </p:grpSpPr>
       <p:sp>
         <p:nvSpPr>
-          <p:cNvPr id="3" name="Content Placeholder 2"/>
-          <p:cNvSpPr>
-            <a:spLocks noGrp="1"/>
-          </p:cNvSpPr>
-          <p:nvPr>
-            <p:ph idx="1"/>
+          <p:cNvPr id="2" name="Title 1"/>
+          <p:cNvSpPr>
+            <a:spLocks noGrp="1"/>
+          </p:cNvSpPr>
+          <p:nvPr>
+            <p:ph type="title"/>
           </p:nvPr>
         </p:nvSpPr>
         <p:spPr>
           <a:xfrm>
-            <a:off x="838200" y="450376"/>
-            <a:ext cx="10515600" cy="5726587"/>
+            <a:off x="1356815" y="2739835"/>
+            <a:ext cx="10515600" cy="1325563"/>
           </a:xfrm>
         </p:spPr>
         <p:txBody>
-          <a:bodyPr/>
-          <a:lstStyle/>
-          <a:p>
-            <a:r>
-              <a:rPr lang="en-US" dirty="0"/>
-              <a:t> </a:t>
-            </a:r>
-            <a:r>
-              <a:rPr lang="en-US" dirty="0" err="1" smtClean="0"/>
-              <a:t>git</a:t>
-            </a:r>
-            <a:r>
-              <a:rPr lang="en-US" dirty="0" smtClean="0"/>
-              <a:t>  --version</a:t>
-            </a:r>
-          </a:p>
-        </p:txBody>
-      </p:sp>
-      <p:pic>
-        <p:nvPicPr>
-          <p:cNvPr id="5" name="Picture 4"/>
-          <p:cNvPicPr>
-            <a:picLocks noChangeAspect="1"/>
-          </p:cNvPicPr>
-          <p:nvPr/>
-        </p:nvPicPr>
-        <p:blipFill>
-          <a:blip r:embed="rId2"/>
-          <a:stretch>
-            <a:fillRect/>
-          </a:stretch>
-        </p:blipFill>
-        <p:spPr>
-          <a:xfrm>
-            <a:off x="518615" y="1364775"/>
-            <a:ext cx="8523483" cy="5616054"/>
-          </a:xfrm>
-          <a:prstGeom prst="rect">
-            <a:avLst/>
-          </a:prstGeom>
-        </p:spPr>
-      </p:pic>
+          <a:bodyPr>
+            <a:normAutofit/>
+          </a:bodyPr>
+          <a:lstStyle/>
+          <a:p>
+            <a:r>
+              <a:rPr lang="en-US" sz="6600" b="1" dirty="0" smtClean="0">
+                <a:solidFill>
+                  <a:schemeClr val="accent1">
+                    <a:lumMod val="75000"/>
+                  </a:schemeClr>
+                </a:solidFill>
+              </a:rPr>
+              <a:t>             Commands</a:t>
+            </a:r>
+            <a:endParaRPr lang="en-US" sz="6600" b="1" dirty="0">
+              <a:solidFill>
+                <a:schemeClr val="accent1">
+                  <a:lumMod val="75000"/>
+                </a:schemeClr>
+              </a:solidFill>
+            </a:endParaRPr>
+          </a:p>
+        </p:txBody>
+      </p:sp>
     </p:spTree>
     <p:extLst>
       <p:ext uri="{BB962C8B-B14F-4D97-AF65-F5344CB8AC3E}">
-        <p14:creationId xmlns:p14="http://schemas.microsoft.com/office/powerpoint/2010/main" val="674771836"/>
+        <p14:creationId xmlns:p14="http://schemas.microsoft.com/office/powerpoint/2010/main" val="435083686"/>
       </p:ext>
     </p:extLst>
   </p:cSld>

</xml_diff>

<commit_message>
my_notes updated with brancing
</commit_message>
<xml_diff>
--- a/My_Notes.pptx
+++ b/My_Notes.pptx
@@ -4730,8 +4730,8 @@
         </p:nvSpPr>
         <p:spPr>
           <a:xfrm>
-            <a:off x="838200" y="1325563"/>
-            <a:ext cx="10515600" cy="4851400"/>
+            <a:off x="838200" y="1325562"/>
+            <a:ext cx="10515600" cy="5307249"/>
           </a:xfrm>
         </p:spPr>
         <p:txBody>
@@ -4836,8 +4836,62 @@
             </a:r>
             <a:r>
               <a:rPr lang="en-US" dirty="0" smtClean="0"/>
-              <a:t> checkout master</a:t>
-            </a:r>
+              <a:t> checkout </a:t>
+            </a:r>
+            <a:r>
+              <a:rPr lang="en-US" dirty="0" smtClean="0"/>
+              <a:t>master</a:t>
+            </a:r>
+          </a:p>
+          <a:p>
+            <a:r>
+              <a:rPr lang="en-US" dirty="0" smtClean="0"/>
+              <a:t>Delete a branch </a:t>
+            </a:r>
+          </a:p>
+          <a:p>
+            <a:pPr lvl="1"/>
+            <a:r>
+              <a:rPr lang="en-US" dirty="0"/>
+              <a:t> </a:t>
+            </a:r>
+            <a:r>
+              <a:rPr lang="en-US" dirty="0" err="1" smtClean="0"/>
+              <a:t>git</a:t>
+            </a:r>
+            <a:r>
+              <a:rPr lang="en-US" dirty="0" smtClean="0"/>
+              <a:t> branch –d </a:t>
+            </a:r>
+            <a:r>
+              <a:rPr lang="en-US" dirty="0" err="1" smtClean="0"/>
+              <a:t>branch_name</a:t>
+            </a:r>
+            <a:endParaRPr lang="en-US" dirty="0" smtClean="0"/>
+          </a:p>
+          <a:p>
+            <a:pPr lvl="1"/>
+            <a:r>
+              <a:rPr lang="en-US" dirty="0"/>
+              <a:t> </a:t>
+            </a:r>
+            <a:r>
+              <a:rPr lang="en-US" dirty="0" err="1" smtClean="0"/>
+              <a:t>git</a:t>
+            </a:r>
+            <a:r>
+              <a:rPr lang="en-US" dirty="0" smtClean="0"/>
+              <a:t> branch –D </a:t>
+            </a:r>
+            <a:r>
+              <a:rPr lang="en-US" dirty="0" err="1" smtClean="0"/>
+              <a:t>branch_name</a:t>
+            </a:r>
+            <a:r>
+              <a:rPr lang="en-US" dirty="0" smtClean="0"/>
+              <a:t> (incase you are deleting a unmerged branch)</a:t>
+            </a:r>
+            <a:endParaRPr lang="en-US" dirty="0" smtClean="0"/>
           </a:p>
           <a:p>
             <a:endParaRPr lang="en-US" dirty="0"/>

</xml_diff>

<commit_message>
merge-conflict added in notes
</commit_message>
<xml_diff>
--- a/My_Notes.pptx
+++ b/My_Notes.pptx
@@ -11,21 +11,23 @@
     <p:sldId id="258" r:id="rId5"/>
     <p:sldId id="275" r:id="rId6"/>
     <p:sldId id="276" r:id="rId7"/>
-    <p:sldId id="259" r:id="rId8"/>
-    <p:sldId id="260" r:id="rId9"/>
-    <p:sldId id="263" r:id="rId10"/>
-    <p:sldId id="261" r:id="rId11"/>
-    <p:sldId id="264" r:id="rId12"/>
-    <p:sldId id="265" r:id="rId13"/>
-    <p:sldId id="266" r:id="rId14"/>
-    <p:sldId id="267" r:id="rId15"/>
-    <p:sldId id="268" r:id="rId16"/>
-    <p:sldId id="269" r:id="rId17"/>
-    <p:sldId id="270" r:id="rId18"/>
-    <p:sldId id="271" r:id="rId19"/>
-    <p:sldId id="272" r:id="rId20"/>
-    <p:sldId id="273" r:id="rId21"/>
-    <p:sldId id="274" r:id="rId22"/>
+    <p:sldId id="277" r:id="rId8"/>
+    <p:sldId id="279" r:id="rId9"/>
+    <p:sldId id="259" r:id="rId10"/>
+    <p:sldId id="260" r:id="rId11"/>
+    <p:sldId id="263" r:id="rId12"/>
+    <p:sldId id="261" r:id="rId13"/>
+    <p:sldId id="264" r:id="rId14"/>
+    <p:sldId id="265" r:id="rId15"/>
+    <p:sldId id="266" r:id="rId16"/>
+    <p:sldId id="267" r:id="rId17"/>
+    <p:sldId id="268" r:id="rId18"/>
+    <p:sldId id="269" r:id="rId19"/>
+    <p:sldId id="270" r:id="rId20"/>
+    <p:sldId id="271" r:id="rId21"/>
+    <p:sldId id="272" r:id="rId22"/>
+    <p:sldId id="273" r:id="rId23"/>
+    <p:sldId id="278" r:id="rId24"/>
   </p:sldIdLst>
   <p:sldSz cx="12192000" cy="6858000"/>
   <p:notesSz cx="6858000" cy="9144000"/>
@@ -3052,6 +3054,198 @@
       </p:grpSpPr>
       <p:sp>
         <p:nvSpPr>
+          <p:cNvPr id="2" name="Title 1"/>
+          <p:cNvSpPr>
+            <a:spLocks noGrp="1"/>
+          </p:cNvSpPr>
+          <p:nvPr>
+            <p:ph type="title"/>
+          </p:nvPr>
+        </p:nvSpPr>
+        <p:spPr/>
+        <p:txBody>
+          <a:bodyPr/>
+          <a:lstStyle/>
+          <a:p>
+            <a:r>
+              <a:rPr lang="en-US" b="1" dirty="0" smtClean="0">
+                <a:solidFill>
+                  <a:schemeClr val="accent1"/>
+                </a:solidFill>
+              </a:rPr>
+              <a:t>.</a:t>
+            </a:r>
+            <a:r>
+              <a:rPr lang="en-US" b="1" dirty="0" err="1" smtClean="0">
+                <a:solidFill>
+                  <a:schemeClr val="accent1"/>
+                </a:solidFill>
+              </a:rPr>
+              <a:t>gitignore</a:t>
+            </a:r>
+            <a:r>
+              <a:rPr lang="en-US" b="1" dirty="0" smtClean="0">
+                <a:solidFill>
+                  <a:schemeClr val="accent1"/>
+                </a:solidFill>
+              </a:rPr>
+              <a:t> (cont’d)</a:t>
+            </a:r>
+            <a:endParaRPr lang="en-US" b="1" dirty="0">
+              <a:solidFill>
+                <a:schemeClr val="accent1"/>
+              </a:solidFill>
+            </a:endParaRPr>
+          </a:p>
+        </p:txBody>
+      </p:sp>
+      <p:sp>
+        <p:nvSpPr>
+          <p:cNvPr id="3" name="Content Placeholder 2"/>
+          <p:cNvSpPr>
+            <a:spLocks noGrp="1"/>
+          </p:cNvSpPr>
+          <p:nvPr>
+            <p:ph idx="1"/>
+          </p:nvPr>
+        </p:nvSpPr>
+        <p:spPr/>
+        <p:txBody>
+          <a:bodyPr/>
+          <a:lstStyle/>
+          <a:p>
+            <a:endParaRPr lang="en-US" dirty="0"/>
+          </a:p>
+        </p:txBody>
+      </p:sp>
+      <p:pic>
+        <p:nvPicPr>
+          <p:cNvPr id="4" name="Picture 3"/>
+          <p:cNvPicPr>
+            <a:picLocks noChangeAspect="1"/>
+          </p:cNvPicPr>
+          <p:nvPr/>
+        </p:nvPicPr>
+        <p:blipFill>
+          <a:blip r:embed="rId2"/>
+          <a:stretch>
+            <a:fillRect/>
+          </a:stretch>
+        </p:blipFill>
+        <p:spPr>
+          <a:xfrm>
+            <a:off x="838200" y="1825625"/>
+            <a:ext cx="10515600" cy="5032375"/>
+          </a:xfrm>
+          <a:prstGeom prst="rect">
+            <a:avLst/>
+          </a:prstGeom>
+        </p:spPr>
+      </p:pic>
+    </p:spTree>
+    <p:extLst>
+      <p:ext uri="{BB962C8B-B14F-4D97-AF65-F5344CB8AC3E}">
+        <p14:creationId xmlns:p14="http://schemas.microsoft.com/office/powerpoint/2010/main" val="4278782829"/>
+      </p:ext>
+    </p:extLst>
+  </p:cSld>
+  <p:clrMapOvr>
+    <a:masterClrMapping/>
+  </p:clrMapOvr>
+</p:sld>
+</file>
+
+<file path=ppt/slides/slide11.xml><?xml version="1.0" encoding="utf-8"?>
+<p:sld xmlns:a="http://schemas.openxmlformats.org/drawingml/2006/main" xmlns:r="http://schemas.openxmlformats.org/officeDocument/2006/relationships" xmlns:p="http://schemas.openxmlformats.org/presentationml/2006/main">
+  <p:cSld>
+    <p:spTree>
+      <p:nvGrpSpPr>
+        <p:cNvPr id="1" name=""/>
+        <p:cNvGrpSpPr/>
+        <p:nvPr/>
+      </p:nvGrpSpPr>
+      <p:grpSpPr>
+        <a:xfrm>
+          <a:off x="0" y="0"/>
+          <a:ext cx="0" cy="0"/>
+          <a:chOff x="0" y="0"/>
+          <a:chExt cx="0" cy="0"/>
+        </a:xfrm>
+      </p:grpSpPr>
+      <p:sp>
+        <p:nvSpPr>
+          <p:cNvPr id="2" name="Title 1"/>
+          <p:cNvSpPr>
+            <a:spLocks noGrp="1"/>
+          </p:cNvSpPr>
+          <p:nvPr>
+            <p:ph type="title"/>
+          </p:nvPr>
+        </p:nvSpPr>
+        <p:spPr>
+          <a:xfrm>
+            <a:off x="1356815" y="2739835"/>
+            <a:ext cx="10515600" cy="1325563"/>
+          </a:xfrm>
+        </p:spPr>
+        <p:txBody>
+          <a:bodyPr>
+            <a:normAutofit/>
+          </a:bodyPr>
+          <a:lstStyle/>
+          <a:p>
+            <a:r>
+              <a:rPr lang="en-US" sz="6600" b="1" dirty="0" smtClean="0">
+                <a:solidFill>
+                  <a:schemeClr val="accent1">
+                    <a:lumMod val="75000"/>
+                  </a:schemeClr>
+                </a:solidFill>
+              </a:rPr>
+              <a:t>             Commands</a:t>
+            </a:r>
+            <a:endParaRPr lang="en-US" sz="6600" b="1" dirty="0">
+              <a:solidFill>
+                <a:schemeClr val="accent1">
+                  <a:lumMod val="75000"/>
+                </a:schemeClr>
+              </a:solidFill>
+            </a:endParaRPr>
+          </a:p>
+        </p:txBody>
+      </p:sp>
+    </p:spTree>
+    <p:extLst>
+      <p:ext uri="{BB962C8B-B14F-4D97-AF65-F5344CB8AC3E}">
+        <p14:creationId xmlns:p14="http://schemas.microsoft.com/office/powerpoint/2010/main" val="435083686"/>
+      </p:ext>
+    </p:extLst>
+  </p:cSld>
+  <p:clrMapOvr>
+    <a:masterClrMapping/>
+  </p:clrMapOvr>
+</p:sld>
+</file>
+
+<file path=ppt/slides/slide12.xml><?xml version="1.0" encoding="utf-8"?>
+<p:sld xmlns:a="http://schemas.openxmlformats.org/drawingml/2006/main" xmlns:r="http://schemas.openxmlformats.org/officeDocument/2006/relationships" xmlns:p="http://schemas.openxmlformats.org/presentationml/2006/main">
+  <p:cSld>
+    <p:spTree>
+      <p:nvGrpSpPr>
+        <p:cNvPr id="1" name=""/>
+        <p:cNvGrpSpPr/>
+        <p:nvPr/>
+      </p:nvGrpSpPr>
+      <p:grpSpPr>
+        <a:xfrm>
+          <a:off x="0" y="0"/>
+          <a:ext cx="0" cy="0"/>
+          <a:chOff x="0" y="0"/>
+          <a:chExt cx="0" cy="0"/>
+        </a:xfrm>
+      </p:grpSpPr>
+      <p:sp>
+        <p:nvSpPr>
           <p:cNvPr id="3" name="Content Placeholder 2"/>
           <p:cNvSpPr>
             <a:spLocks noGrp="1"/>
@@ -3122,7 +3316,7 @@
 </p:sld>
 </file>
 
-<file path=ppt/slides/slide11.xml><?xml version="1.0" encoding="utf-8"?>
+<file path=ppt/slides/slide13.xml><?xml version="1.0" encoding="utf-8"?>
 <p:sld xmlns:a="http://schemas.openxmlformats.org/drawingml/2006/main" xmlns:r="http://schemas.openxmlformats.org/officeDocument/2006/relationships" xmlns:p="http://schemas.openxmlformats.org/presentationml/2006/main">
   <p:cSld>
     <p:spTree>
@@ -3200,7 +3394,7 @@
 </p:sld>
 </file>
 
-<file path=ppt/slides/slide12.xml><?xml version="1.0" encoding="utf-8"?>
+<file path=ppt/slides/slide14.xml><?xml version="1.0" encoding="utf-8"?>
 <p:sld xmlns:a="http://schemas.openxmlformats.org/drawingml/2006/main" xmlns:r="http://schemas.openxmlformats.org/officeDocument/2006/relationships" xmlns:p="http://schemas.openxmlformats.org/presentationml/2006/main">
   <p:cSld>
     <p:spTree>
@@ -3292,7 +3486,7 @@
 </p:sld>
 </file>
 
-<file path=ppt/slides/slide13.xml><?xml version="1.0" encoding="utf-8"?>
+<file path=ppt/slides/slide15.xml><?xml version="1.0" encoding="utf-8"?>
 <p:sld xmlns:a="http://schemas.openxmlformats.org/drawingml/2006/main" xmlns:r="http://schemas.openxmlformats.org/officeDocument/2006/relationships" xmlns:p="http://schemas.openxmlformats.org/presentationml/2006/main">
   <p:cSld>
     <p:spTree>
@@ -3384,7 +3578,7 @@
 </p:sld>
 </file>
 
-<file path=ppt/slides/slide14.xml><?xml version="1.0" encoding="utf-8"?>
+<file path=ppt/slides/slide16.xml><?xml version="1.0" encoding="utf-8"?>
 <p:sld xmlns:a="http://schemas.openxmlformats.org/drawingml/2006/main" xmlns:r="http://schemas.openxmlformats.org/officeDocument/2006/relationships" xmlns:p="http://schemas.openxmlformats.org/presentationml/2006/main">
   <p:cSld>
     <p:spTree>
@@ -3500,7 +3694,7 @@
 </p:sld>
 </file>
 
-<file path=ppt/slides/slide15.xml><?xml version="1.0" encoding="utf-8"?>
+<file path=ppt/slides/slide17.xml><?xml version="1.0" encoding="utf-8"?>
 <p:sld xmlns:a="http://schemas.openxmlformats.org/drawingml/2006/main" xmlns:r="http://schemas.openxmlformats.org/officeDocument/2006/relationships" xmlns:p="http://schemas.openxmlformats.org/presentationml/2006/main">
   <p:cSld>
     <p:spTree>
@@ -3616,7 +3810,7 @@
 </p:sld>
 </file>
 
-<file path=ppt/slides/slide16.xml><?xml version="1.0" encoding="utf-8"?>
+<file path=ppt/slides/slide18.xml><?xml version="1.0" encoding="utf-8"?>
 <p:sld xmlns:a="http://schemas.openxmlformats.org/drawingml/2006/main" xmlns:r="http://schemas.openxmlformats.org/officeDocument/2006/relationships" xmlns:p="http://schemas.openxmlformats.org/presentationml/2006/main">
   <p:cSld>
     <p:spTree>
@@ -3708,7 +3902,7 @@
 </p:sld>
 </file>
 
-<file path=ppt/slides/slide17.xml><?xml version="1.0" encoding="utf-8"?>
+<file path=ppt/slides/slide19.xml><?xml version="1.0" encoding="utf-8"?>
 <p:sld xmlns:a="http://schemas.openxmlformats.org/drawingml/2006/main" xmlns:r="http://schemas.openxmlformats.org/officeDocument/2006/relationships" xmlns:p="http://schemas.openxmlformats.org/presentationml/2006/main">
   <p:cSld>
     <p:spTree>
@@ -3791,190 +3985,6 @@
     <p:extLst>
       <p:ext uri="{BB962C8B-B14F-4D97-AF65-F5344CB8AC3E}">
         <p14:creationId xmlns:p14="http://schemas.microsoft.com/office/powerpoint/2010/main" val="424983537"/>
-      </p:ext>
-    </p:extLst>
-  </p:cSld>
-  <p:clrMapOvr>
-    <a:masterClrMapping/>
-  </p:clrMapOvr>
-</p:sld>
-</file>
-
-<file path=ppt/slides/slide18.xml><?xml version="1.0" encoding="utf-8"?>
-<p:sld xmlns:a="http://schemas.openxmlformats.org/drawingml/2006/main" xmlns:r="http://schemas.openxmlformats.org/officeDocument/2006/relationships" xmlns:p="http://schemas.openxmlformats.org/presentationml/2006/main">
-  <p:cSld>
-    <p:spTree>
-      <p:nvGrpSpPr>
-        <p:cNvPr id="1" name=""/>
-        <p:cNvGrpSpPr/>
-        <p:nvPr/>
-      </p:nvGrpSpPr>
-      <p:grpSpPr>
-        <a:xfrm>
-          <a:off x="0" y="0"/>
-          <a:ext cx="0" cy="0"/>
-          <a:chOff x="0" y="0"/>
-          <a:chExt cx="0" cy="0"/>
-        </a:xfrm>
-      </p:grpSpPr>
-      <p:sp>
-        <p:nvSpPr>
-          <p:cNvPr id="2" name="Title 1"/>
-          <p:cNvSpPr>
-            <a:spLocks noGrp="1"/>
-          </p:cNvSpPr>
-          <p:nvPr>
-            <p:ph type="title"/>
-          </p:nvPr>
-        </p:nvSpPr>
-        <p:spPr/>
-        <p:txBody>
-          <a:bodyPr/>
-          <a:lstStyle/>
-          <a:p>
-            <a:endParaRPr lang="en-US"/>
-          </a:p>
-        </p:txBody>
-      </p:sp>
-      <p:sp>
-        <p:nvSpPr>
-          <p:cNvPr id="3" name="Content Placeholder 2"/>
-          <p:cNvSpPr>
-            <a:spLocks noGrp="1"/>
-          </p:cNvSpPr>
-          <p:nvPr>
-            <p:ph idx="1"/>
-          </p:nvPr>
-        </p:nvSpPr>
-        <p:spPr/>
-        <p:txBody>
-          <a:bodyPr/>
-          <a:lstStyle/>
-          <a:p>
-            <a:endParaRPr lang="en-US"/>
-          </a:p>
-        </p:txBody>
-      </p:sp>
-      <p:pic>
-        <p:nvPicPr>
-          <p:cNvPr id="4" name="Picture 3"/>
-          <p:cNvPicPr>
-            <a:picLocks noChangeAspect="1"/>
-          </p:cNvPicPr>
-          <p:nvPr/>
-        </p:nvPicPr>
-        <p:blipFill>
-          <a:blip r:embed="rId2"/>
-          <a:stretch>
-            <a:fillRect/>
-          </a:stretch>
-        </p:blipFill>
-        <p:spPr>
-          <a:xfrm>
-            <a:off x="838200" y="163774"/>
-            <a:ext cx="10515600" cy="6694226"/>
-          </a:xfrm>
-          <a:prstGeom prst="rect">
-            <a:avLst/>
-          </a:prstGeom>
-        </p:spPr>
-      </p:pic>
-    </p:spTree>
-    <p:extLst>
-      <p:ext uri="{BB962C8B-B14F-4D97-AF65-F5344CB8AC3E}">
-        <p14:creationId xmlns:p14="http://schemas.microsoft.com/office/powerpoint/2010/main" val="473034004"/>
-      </p:ext>
-    </p:extLst>
-  </p:cSld>
-  <p:clrMapOvr>
-    <a:masterClrMapping/>
-  </p:clrMapOvr>
-</p:sld>
-</file>
-
-<file path=ppt/slides/slide19.xml><?xml version="1.0" encoding="utf-8"?>
-<p:sld xmlns:a="http://schemas.openxmlformats.org/drawingml/2006/main" xmlns:r="http://schemas.openxmlformats.org/officeDocument/2006/relationships" xmlns:p="http://schemas.openxmlformats.org/presentationml/2006/main">
-  <p:cSld>
-    <p:spTree>
-      <p:nvGrpSpPr>
-        <p:cNvPr id="1" name=""/>
-        <p:cNvGrpSpPr/>
-        <p:nvPr/>
-      </p:nvGrpSpPr>
-      <p:grpSpPr>
-        <a:xfrm>
-          <a:off x="0" y="0"/>
-          <a:ext cx="0" cy="0"/>
-          <a:chOff x="0" y="0"/>
-          <a:chExt cx="0" cy="0"/>
-        </a:xfrm>
-      </p:grpSpPr>
-      <p:sp>
-        <p:nvSpPr>
-          <p:cNvPr id="2" name="Title 1"/>
-          <p:cNvSpPr>
-            <a:spLocks noGrp="1"/>
-          </p:cNvSpPr>
-          <p:nvPr>
-            <p:ph type="title"/>
-          </p:nvPr>
-        </p:nvSpPr>
-        <p:spPr/>
-        <p:txBody>
-          <a:bodyPr/>
-          <a:lstStyle/>
-          <a:p>
-            <a:endParaRPr lang="en-US"/>
-          </a:p>
-        </p:txBody>
-      </p:sp>
-      <p:sp>
-        <p:nvSpPr>
-          <p:cNvPr id="3" name="Content Placeholder 2"/>
-          <p:cNvSpPr>
-            <a:spLocks noGrp="1"/>
-          </p:cNvSpPr>
-          <p:nvPr>
-            <p:ph idx="1"/>
-          </p:nvPr>
-        </p:nvSpPr>
-        <p:spPr/>
-        <p:txBody>
-          <a:bodyPr/>
-          <a:lstStyle/>
-          <a:p>
-            <a:endParaRPr lang="en-US"/>
-          </a:p>
-        </p:txBody>
-      </p:sp>
-      <p:pic>
-        <p:nvPicPr>
-          <p:cNvPr id="4" name="Picture 3"/>
-          <p:cNvPicPr>
-            <a:picLocks noChangeAspect="1"/>
-          </p:cNvPicPr>
-          <p:nvPr/>
-        </p:nvPicPr>
-        <p:blipFill>
-          <a:blip r:embed="rId2"/>
-          <a:stretch>
-            <a:fillRect/>
-          </a:stretch>
-        </p:blipFill>
-        <p:spPr>
-          <a:xfrm>
-            <a:off x="652605" y="267409"/>
-            <a:ext cx="10701195" cy="6242573"/>
-          </a:xfrm>
-          <a:prstGeom prst="rect">
-            <a:avLst/>
-          </a:prstGeom>
-        </p:spPr>
-      </p:pic>
-    </p:spTree>
-    <p:extLst>
-      <p:ext uri="{BB962C8B-B14F-4D97-AF65-F5344CB8AC3E}">
-        <p14:creationId xmlns:p14="http://schemas.microsoft.com/office/powerpoint/2010/main" val="2246433591"/>
       </p:ext>
     </p:extLst>
   </p:cSld>
@@ -4111,8 +4121,8 @@
         </p:blipFill>
         <p:spPr>
           <a:xfrm>
-            <a:off x="736979" y="365126"/>
-            <a:ext cx="10822675" cy="6144856"/>
+            <a:off x="838200" y="163774"/>
+            <a:ext cx="10515600" cy="6694226"/>
           </a:xfrm>
           <a:prstGeom prst="rect">
             <a:avLst/>
@@ -4122,7 +4132,7 @@
     </p:spTree>
     <p:extLst>
       <p:ext uri="{BB962C8B-B14F-4D97-AF65-F5344CB8AC3E}">
-        <p14:creationId xmlns:p14="http://schemas.microsoft.com/office/powerpoint/2010/main" val="4086509070"/>
+        <p14:creationId xmlns:p14="http://schemas.microsoft.com/office/powerpoint/2010/main" val="473034004"/>
       </p:ext>
     </p:extLst>
   </p:cSld>
@@ -4187,10 +4197,194 @@
           </a:p>
         </p:txBody>
       </p:sp>
+      <p:pic>
+        <p:nvPicPr>
+          <p:cNvPr id="4" name="Picture 3"/>
+          <p:cNvPicPr>
+            <a:picLocks noChangeAspect="1"/>
+          </p:cNvPicPr>
+          <p:nvPr/>
+        </p:nvPicPr>
+        <p:blipFill>
+          <a:blip r:embed="rId2"/>
+          <a:stretch>
+            <a:fillRect/>
+          </a:stretch>
+        </p:blipFill>
+        <p:spPr>
+          <a:xfrm>
+            <a:off x="652605" y="267409"/>
+            <a:ext cx="10701195" cy="6242573"/>
+          </a:xfrm>
+          <a:prstGeom prst="rect">
+            <a:avLst/>
+          </a:prstGeom>
+        </p:spPr>
+      </p:pic>
     </p:spTree>
     <p:extLst>
       <p:ext uri="{BB962C8B-B14F-4D97-AF65-F5344CB8AC3E}">
-        <p14:creationId xmlns:p14="http://schemas.microsoft.com/office/powerpoint/2010/main" val="233475084"/>
+        <p14:creationId xmlns:p14="http://schemas.microsoft.com/office/powerpoint/2010/main" val="2246433591"/>
+      </p:ext>
+    </p:extLst>
+  </p:cSld>
+  <p:clrMapOvr>
+    <a:masterClrMapping/>
+  </p:clrMapOvr>
+</p:sld>
+</file>
+
+<file path=ppt/slides/slide22.xml><?xml version="1.0" encoding="utf-8"?>
+<p:sld xmlns:a="http://schemas.openxmlformats.org/drawingml/2006/main" xmlns:r="http://schemas.openxmlformats.org/officeDocument/2006/relationships" xmlns:p="http://schemas.openxmlformats.org/presentationml/2006/main">
+  <p:cSld>
+    <p:spTree>
+      <p:nvGrpSpPr>
+        <p:cNvPr id="1" name=""/>
+        <p:cNvGrpSpPr/>
+        <p:nvPr/>
+      </p:nvGrpSpPr>
+      <p:grpSpPr>
+        <a:xfrm>
+          <a:off x="0" y="0"/>
+          <a:ext cx="0" cy="0"/>
+          <a:chOff x="0" y="0"/>
+          <a:chExt cx="0" cy="0"/>
+        </a:xfrm>
+      </p:grpSpPr>
+      <p:sp>
+        <p:nvSpPr>
+          <p:cNvPr id="2" name="Title 1"/>
+          <p:cNvSpPr>
+            <a:spLocks noGrp="1"/>
+          </p:cNvSpPr>
+          <p:nvPr>
+            <p:ph type="title"/>
+          </p:nvPr>
+        </p:nvSpPr>
+        <p:spPr/>
+        <p:txBody>
+          <a:bodyPr/>
+          <a:lstStyle/>
+          <a:p>
+            <a:endParaRPr lang="en-US"/>
+          </a:p>
+        </p:txBody>
+      </p:sp>
+      <p:sp>
+        <p:nvSpPr>
+          <p:cNvPr id="3" name="Content Placeholder 2"/>
+          <p:cNvSpPr>
+            <a:spLocks noGrp="1"/>
+          </p:cNvSpPr>
+          <p:nvPr>
+            <p:ph idx="1"/>
+          </p:nvPr>
+        </p:nvSpPr>
+        <p:spPr/>
+        <p:txBody>
+          <a:bodyPr/>
+          <a:lstStyle/>
+          <a:p>
+            <a:endParaRPr lang="en-US"/>
+          </a:p>
+        </p:txBody>
+      </p:sp>
+      <p:pic>
+        <p:nvPicPr>
+          <p:cNvPr id="4" name="Picture 3"/>
+          <p:cNvPicPr>
+            <a:picLocks noChangeAspect="1"/>
+          </p:cNvPicPr>
+          <p:nvPr/>
+        </p:nvPicPr>
+        <p:blipFill>
+          <a:blip r:embed="rId2"/>
+          <a:stretch>
+            <a:fillRect/>
+          </a:stretch>
+        </p:blipFill>
+        <p:spPr>
+          <a:xfrm>
+            <a:off x="736979" y="365126"/>
+            <a:ext cx="10822675" cy="6144856"/>
+          </a:xfrm>
+          <a:prstGeom prst="rect">
+            <a:avLst/>
+          </a:prstGeom>
+        </p:spPr>
+      </p:pic>
+    </p:spTree>
+    <p:extLst>
+      <p:ext uri="{BB962C8B-B14F-4D97-AF65-F5344CB8AC3E}">
+        <p14:creationId xmlns:p14="http://schemas.microsoft.com/office/powerpoint/2010/main" val="4086509070"/>
+      </p:ext>
+    </p:extLst>
+  </p:cSld>
+  <p:clrMapOvr>
+    <a:masterClrMapping/>
+  </p:clrMapOvr>
+</p:sld>
+</file>
+
+<file path=ppt/slides/slide23.xml><?xml version="1.0" encoding="utf-8"?>
+<p:sld xmlns:a="http://schemas.openxmlformats.org/drawingml/2006/main" xmlns:r="http://schemas.openxmlformats.org/officeDocument/2006/relationships" xmlns:p="http://schemas.openxmlformats.org/presentationml/2006/main">
+  <p:cSld>
+    <p:spTree>
+      <p:nvGrpSpPr>
+        <p:cNvPr id="1" name=""/>
+        <p:cNvGrpSpPr/>
+        <p:nvPr/>
+      </p:nvGrpSpPr>
+      <p:grpSpPr>
+        <a:xfrm>
+          <a:off x="0" y="0"/>
+          <a:ext cx="0" cy="0"/>
+          <a:chOff x="0" y="0"/>
+          <a:chExt cx="0" cy="0"/>
+        </a:xfrm>
+      </p:grpSpPr>
+      <p:sp>
+        <p:nvSpPr>
+          <p:cNvPr id="2" name="Title 1"/>
+          <p:cNvSpPr>
+            <a:spLocks noGrp="1"/>
+          </p:cNvSpPr>
+          <p:nvPr>
+            <p:ph type="title"/>
+          </p:nvPr>
+        </p:nvSpPr>
+        <p:spPr/>
+        <p:txBody>
+          <a:bodyPr/>
+          <a:lstStyle/>
+          <a:p>
+            <a:endParaRPr lang="en-US"/>
+          </a:p>
+        </p:txBody>
+      </p:sp>
+      <p:sp>
+        <p:nvSpPr>
+          <p:cNvPr id="3" name="Content Placeholder 2"/>
+          <p:cNvSpPr>
+            <a:spLocks noGrp="1"/>
+          </p:cNvSpPr>
+          <p:nvPr>
+            <p:ph idx="1"/>
+          </p:nvPr>
+        </p:nvSpPr>
+        <p:spPr/>
+        <p:txBody>
+          <a:bodyPr/>
+          <a:lstStyle/>
+          <a:p>
+            <a:endParaRPr lang="en-US"/>
+          </a:p>
+        </p:txBody>
+      </p:sp>
+    </p:spTree>
+    <p:extLst>
+      <p:ext uri="{BB962C8B-B14F-4D97-AF65-F5344CB8AC3E}">
+        <p14:creationId xmlns:p14="http://schemas.microsoft.com/office/powerpoint/2010/main" val="972865193"/>
       </p:ext>
     </p:extLst>
   </p:cSld>
@@ -4730,8 +4924,8 @@
         </p:nvSpPr>
         <p:spPr>
           <a:xfrm>
-            <a:off x="838200" y="1325562"/>
-            <a:ext cx="10515600" cy="5307249"/>
+            <a:off x="838200" y="968992"/>
+            <a:ext cx="10515600" cy="5889008"/>
           </a:xfrm>
         </p:spPr>
         <p:txBody>
@@ -4844,6 +5038,12 @@
             </a:r>
           </a:p>
           <a:p>
+            <a:pPr marL="457200" lvl="1" indent="0">
+              <a:buNone/>
+            </a:pPr>
+            <a:endParaRPr lang="en-US" dirty="0" smtClean="0"/>
+          </a:p>
+          <a:p>
             <a:r>
               <a:rPr lang="en-US" dirty="0" smtClean="0"/>
               <a:t>Delete a branch </a:t>
@@ -4891,7 +5091,6 @@
               <a:rPr lang="en-US" dirty="0" smtClean="0"/>
               <a:t> (incase you are deleting a unmerged branch)</a:t>
             </a:r>
-            <a:endParaRPr lang="en-US" dirty="0" smtClean="0"/>
           </a:p>
           <a:p>
             <a:endParaRPr lang="en-US" dirty="0"/>
@@ -4938,7 +5137,12 @@
             <p:ph type="title"/>
           </p:nvPr>
         </p:nvSpPr>
-        <p:spPr/>
+        <p:spPr>
+          <a:xfrm>
+            <a:off x="838200" y="0"/>
+            <a:ext cx="10515600" cy="1325563"/>
+          </a:xfrm>
+        </p:spPr>
         <p:txBody>
           <a:bodyPr/>
           <a:lstStyle/>
@@ -4946,57 +5150,200 @@
             <a:r>
               <a:rPr lang="en-US" b="1" dirty="0" smtClean="0">
                 <a:solidFill>
-                  <a:schemeClr val="accent1"/>
+                  <a:schemeClr val="accent1">
+                    <a:lumMod val="75000"/>
+                  </a:schemeClr>
                 </a:solidFill>
               </a:rPr>
-              <a:t>Everything about .</a:t>
-            </a:r>
-            <a:r>
-              <a:rPr lang="en-US" b="1" dirty="0" err="1" smtClean="0">
-                <a:solidFill>
-                  <a:schemeClr val="accent1"/>
-                </a:solidFill>
-              </a:rPr>
-              <a:t>gitignore</a:t>
-            </a:r>
-            <a:endParaRPr lang="en-US" b="1" dirty="0">
-              <a:solidFill>
-                <a:schemeClr val="accent1"/>
-              </a:solidFill>
-            </a:endParaRPr>
-          </a:p>
-        </p:txBody>
-      </p:sp>
-      <p:pic>
-        <p:nvPicPr>
-          <p:cNvPr id="4" name="Content Placeholder 3"/>
-          <p:cNvPicPr>
-            <a:picLocks noGrp="1" noChangeAspect="1"/>
-          </p:cNvPicPr>
+              <a:t>Branching</a:t>
+            </a:r>
+            <a:r>
+              <a:rPr lang="en-US" b="1" dirty="0" smtClean="0"/>
+              <a:t> </a:t>
+            </a:r>
+            <a:endParaRPr lang="en-US" b="1" dirty="0"/>
+          </a:p>
+        </p:txBody>
+      </p:sp>
+      <p:sp>
+        <p:nvSpPr>
+          <p:cNvPr id="3" name="Content Placeholder 2"/>
+          <p:cNvSpPr>
+            <a:spLocks noGrp="1"/>
+          </p:cNvSpPr>
           <p:nvPr>
             <p:ph idx="1"/>
           </p:nvPr>
-        </p:nvPicPr>
-        <p:blipFill>
-          <a:blip r:embed="rId2"/>
-          <a:stretch>
-            <a:fillRect/>
-          </a:stretch>
-        </p:blipFill>
+        </p:nvSpPr>
         <p:spPr>
           <a:xfrm>
-            <a:off x="489258" y="1501254"/>
-            <a:ext cx="10801990" cy="5356746"/>
+            <a:off x="838200" y="968992"/>
+            <a:ext cx="10515600" cy="5889008"/>
           </a:xfrm>
-          <a:prstGeom prst="rect">
-            <a:avLst/>
-          </a:prstGeom>
         </p:spPr>
-      </p:pic>
+        <p:txBody>
+          <a:bodyPr>
+            <a:normAutofit/>
+          </a:bodyPr>
+          <a:lstStyle/>
+          <a:p>
+            <a:pPr marL="457200" lvl="1" indent="0">
+              <a:buNone/>
+            </a:pPr>
+            <a:endParaRPr lang="en-US" dirty="0" smtClean="0"/>
+          </a:p>
+          <a:p>
+            <a:r>
+              <a:rPr lang="en-US" dirty="0" smtClean="0"/>
+              <a:t>Merging two branches: </a:t>
+            </a:r>
+            <a:endParaRPr lang="en-US" dirty="0"/>
+          </a:p>
+          <a:p>
+            <a:pPr lvl="1"/>
+            <a:r>
+              <a:rPr lang="en-US" dirty="0" smtClean="0"/>
+              <a:t> command : </a:t>
+            </a:r>
+            <a:r>
+              <a:rPr lang="en-US" dirty="0" err="1" smtClean="0"/>
+              <a:t>git</a:t>
+            </a:r>
+            <a:r>
+              <a:rPr lang="en-US" dirty="0" smtClean="0"/>
+              <a:t> merge </a:t>
+            </a:r>
+            <a:r>
+              <a:rPr lang="en-US" dirty="0" err="1" smtClean="0"/>
+              <a:t>branch_name</a:t>
+            </a:r>
+            <a:endParaRPr lang="en-US" dirty="0" smtClean="0"/>
+          </a:p>
+          <a:p>
+            <a:pPr lvl="2"/>
+            <a:r>
+              <a:rPr lang="en-US" dirty="0" smtClean="0"/>
+              <a:t>Updates as “</a:t>
+            </a:r>
+            <a:r>
+              <a:rPr lang="en-US" dirty="0" err="1" smtClean="0"/>
+              <a:t>current_branch</a:t>
+            </a:r>
+            <a:r>
+              <a:rPr lang="en-US" dirty="0" smtClean="0"/>
+              <a:t> = </a:t>
+            </a:r>
+            <a:r>
+              <a:rPr lang="en-US" dirty="0" err="1" smtClean="0"/>
+              <a:t>current_branch</a:t>
+            </a:r>
+            <a:r>
+              <a:rPr lang="en-US" dirty="0" smtClean="0"/>
+              <a:t> U </a:t>
+            </a:r>
+            <a:r>
+              <a:rPr lang="en-US" dirty="0" err="1" smtClean="0"/>
+              <a:t>branch_name</a:t>
+            </a:r>
+            <a:r>
+              <a:rPr lang="en-US" dirty="0" smtClean="0"/>
+              <a:t>”</a:t>
+            </a:r>
+            <a:endParaRPr lang="en-US" dirty="0"/>
+          </a:p>
+          <a:p>
+            <a:pPr lvl="1"/>
+            <a:r>
+              <a:rPr lang="en-US" dirty="0" smtClean="0"/>
+              <a:t>Example : </a:t>
+            </a:r>
+            <a:r>
+              <a:rPr lang="en-US" dirty="0" err="1" smtClean="0"/>
+              <a:t>git</a:t>
+            </a:r>
+            <a:r>
+              <a:rPr lang="en-US" dirty="0" smtClean="0"/>
+              <a:t> merge main</a:t>
+            </a:r>
+          </a:p>
+          <a:p>
+            <a:pPr lvl="2"/>
+            <a:r>
+              <a:rPr lang="en-US" dirty="0" smtClean="0"/>
+              <a:t>Say, you are in branch “b”,</a:t>
+            </a:r>
+          </a:p>
+          <a:p>
+            <a:pPr lvl="2"/>
+            <a:r>
+              <a:rPr lang="en-US" dirty="0" smtClean="0"/>
+              <a:t>Above command will change b to  b = b U main ; </a:t>
+            </a:r>
+          </a:p>
+          <a:p>
+            <a:pPr lvl="2"/>
+            <a:r>
+              <a:rPr lang="en-US" dirty="0" smtClean="0"/>
+              <a:t> but main branch  will remain unchanged</a:t>
+            </a:r>
+          </a:p>
+          <a:p>
+            <a:r>
+              <a:rPr lang="en-US" dirty="0" smtClean="0"/>
+              <a:t>Merge conflict </a:t>
+            </a:r>
+          </a:p>
+          <a:p>
+            <a:pPr lvl="1"/>
+            <a:r>
+              <a:rPr lang="en-US" dirty="0" smtClean="0"/>
+              <a:t>What if two branches change the same file, </a:t>
+            </a:r>
+            <a:r>
+              <a:rPr lang="en-US" dirty="0" err="1" smtClean="0"/>
+              <a:t>git</a:t>
+            </a:r>
+            <a:r>
+              <a:rPr lang="en-US" dirty="0" smtClean="0"/>
+              <a:t> doesn’t know how to merge </a:t>
+            </a:r>
+          </a:p>
+          <a:p>
+            <a:pPr lvl="1"/>
+            <a:r>
+              <a:rPr lang="en-US" dirty="0" smtClean="0"/>
+              <a:t>Easy way : fix manually inside the file. </a:t>
+            </a:r>
+          </a:p>
+          <a:p>
+            <a:pPr lvl="1"/>
+            <a:r>
+              <a:rPr lang="en-US" dirty="0" smtClean="0"/>
+              <a:t>After showing merge conflict error, </a:t>
+            </a:r>
+            <a:r>
+              <a:rPr lang="en-US" dirty="0" err="1" smtClean="0"/>
+              <a:t>git</a:t>
+            </a:r>
+            <a:r>
+              <a:rPr lang="en-US" dirty="0" smtClean="0"/>
+              <a:t> adds some indicator inside the file to help manual conflict removal </a:t>
+            </a:r>
+          </a:p>
+          <a:p>
+            <a:pPr lvl="1"/>
+            <a:endParaRPr lang="en-US" dirty="0" smtClean="0"/>
+          </a:p>
+          <a:p>
+            <a:pPr lvl="1"/>
+            <a:endParaRPr lang="en-US" dirty="0" smtClean="0"/>
+          </a:p>
+        </p:txBody>
+      </p:sp>
     </p:spTree>
     <p:extLst>
       <p:ext uri="{BB962C8B-B14F-4D97-AF65-F5344CB8AC3E}">
-        <p14:creationId xmlns:p14="http://schemas.microsoft.com/office/powerpoint/2010/main" val="2626990070"/>
+        <p14:creationId xmlns:p14="http://schemas.microsoft.com/office/powerpoint/2010/main" val="3981289694"/>
       </p:ext>
     </p:extLst>
   </p:cSld>
@@ -5023,75 +5370,9 @@
           <a:chExt cx="0" cy="0"/>
         </a:xfrm>
       </p:grpSpPr>
-      <p:sp>
-        <p:nvSpPr>
-          <p:cNvPr id="2" name="Title 1"/>
-          <p:cNvSpPr>
-            <a:spLocks noGrp="1"/>
-          </p:cNvSpPr>
-          <p:nvPr>
-            <p:ph type="title"/>
-          </p:nvPr>
-        </p:nvSpPr>
-        <p:spPr/>
-        <p:txBody>
-          <a:bodyPr/>
-          <a:lstStyle/>
-          <a:p>
-            <a:r>
-              <a:rPr lang="en-US" b="1" dirty="0" smtClean="0">
-                <a:solidFill>
-                  <a:schemeClr val="accent1"/>
-                </a:solidFill>
-              </a:rPr>
-              <a:t>.</a:t>
-            </a:r>
-            <a:r>
-              <a:rPr lang="en-US" b="1" dirty="0" err="1" smtClean="0">
-                <a:solidFill>
-                  <a:schemeClr val="accent1"/>
-                </a:solidFill>
-              </a:rPr>
-              <a:t>gitignore</a:t>
-            </a:r>
-            <a:r>
-              <a:rPr lang="en-US" b="1" dirty="0" smtClean="0">
-                <a:solidFill>
-                  <a:schemeClr val="accent1"/>
-                </a:solidFill>
-              </a:rPr>
-              <a:t> (cont’d)</a:t>
-            </a:r>
-            <a:endParaRPr lang="en-US" b="1" dirty="0">
-              <a:solidFill>
-                <a:schemeClr val="accent1"/>
-              </a:solidFill>
-            </a:endParaRPr>
-          </a:p>
-        </p:txBody>
-      </p:sp>
-      <p:sp>
-        <p:nvSpPr>
-          <p:cNvPr id="3" name="Content Placeholder 2"/>
-          <p:cNvSpPr>
-            <a:spLocks noGrp="1"/>
-          </p:cNvSpPr>
-          <p:nvPr>
-            <p:ph idx="1"/>
-          </p:nvPr>
-        </p:nvSpPr>
-        <p:spPr/>
-        <p:txBody>
-          <a:bodyPr/>
-          <a:lstStyle/>
-          <a:p>
-            <a:endParaRPr lang="en-US" dirty="0"/>
-          </a:p>
-        </p:txBody>
-      </p:sp>
       <p:pic>
         <p:nvPicPr>
-          <p:cNvPr id="4" name="Picture 3"/>
+          <p:cNvPr id="5" name="Picture 4"/>
           <p:cNvPicPr>
             <a:picLocks noChangeAspect="1"/>
           </p:cNvPicPr>
@@ -5105,8 +5386,8 @@
         </p:blipFill>
         <p:spPr>
           <a:xfrm>
-            <a:off x="838200" y="1825625"/>
-            <a:ext cx="10515600" cy="5032375"/>
+            <a:off x="0" y="95742"/>
+            <a:ext cx="12192000" cy="6762258"/>
           </a:xfrm>
           <a:prstGeom prst="rect">
             <a:avLst/>
@@ -5116,7 +5397,7 @@
     </p:spTree>
     <p:extLst>
       <p:ext uri="{BB962C8B-B14F-4D97-AF65-F5344CB8AC3E}">
-        <p14:creationId xmlns:p14="http://schemas.microsoft.com/office/powerpoint/2010/main" val="4278782829"/>
+        <p14:creationId xmlns:p14="http://schemas.microsoft.com/office/powerpoint/2010/main" val="2975933807"/>
       </p:ext>
     </p:extLst>
   </p:cSld>
@@ -5153,42 +5434,65 @@
             <p:ph type="title"/>
           </p:nvPr>
         </p:nvSpPr>
+        <p:spPr/>
+        <p:txBody>
+          <a:bodyPr/>
+          <a:lstStyle/>
+          <a:p>
+            <a:r>
+              <a:rPr lang="en-US" b="1" dirty="0" smtClean="0">
+                <a:solidFill>
+                  <a:schemeClr val="accent1"/>
+                </a:solidFill>
+              </a:rPr>
+              <a:t>Everything about .</a:t>
+            </a:r>
+            <a:r>
+              <a:rPr lang="en-US" b="1" dirty="0" err="1" smtClean="0">
+                <a:solidFill>
+                  <a:schemeClr val="accent1"/>
+                </a:solidFill>
+              </a:rPr>
+              <a:t>gitignore</a:t>
+            </a:r>
+            <a:endParaRPr lang="en-US" b="1" dirty="0">
+              <a:solidFill>
+                <a:schemeClr val="accent1"/>
+              </a:solidFill>
+            </a:endParaRPr>
+          </a:p>
+        </p:txBody>
+      </p:sp>
+      <p:pic>
+        <p:nvPicPr>
+          <p:cNvPr id="4" name="Content Placeholder 3"/>
+          <p:cNvPicPr>
+            <a:picLocks noGrp="1" noChangeAspect="1"/>
+          </p:cNvPicPr>
+          <p:nvPr>
+            <p:ph idx="1"/>
+          </p:nvPr>
+        </p:nvPicPr>
+        <p:blipFill>
+          <a:blip r:embed="rId2"/>
+          <a:stretch>
+            <a:fillRect/>
+          </a:stretch>
+        </p:blipFill>
         <p:spPr>
           <a:xfrm>
-            <a:off x="1356815" y="2739835"/>
-            <a:ext cx="10515600" cy="1325563"/>
+            <a:off x="489258" y="1501254"/>
+            <a:ext cx="10801990" cy="5356746"/>
           </a:xfrm>
+          <a:prstGeom prst="rect">
+            <a:avLst/>
+          </a:prstGeom>
         </p:spPr>
-        <p:txBody>
-          <a:bodyPr>
-            <a:normAutofit/>
-          </a:bodyPr>
-          <a:lstStyle/>
-          <a:p>
-            <a:r>
-              <a:rPr lang="en-US" sz="6600" b="1" dirty="0" smtClean="0">
-                <a:solidFill>
-                  <a:schemeClr val="accent1">
-                    <a:lumMod val="75000"/>
-                  </a:schemeClr>
-                </a:solidFill>
-              </a:rPr>
-              <a:t>             Commands</a:t>
-            </a:r>
-            <a:endParaRPr lang="en-US" sz="6600" b="1" dirty="0">
-              <a:solidFill>
-                <a:schemeClr val="accent1">
-                  <a:lumMod val="75000"/>
-                </a:schemeClr>
-              </a:solidFill>
-            </a:endParaRPr>
-          </a:p>
-        </p:txBody>
-      </p:sp>
+      </p:pic>
     </p:spTree>
     <p:extLst>
       <p:ext uri="{BB962C8B-B14F-4D97-AF65-F5344CB8AC3E}">
-        <p14:creationId xmlns:p14="http://schemas.microsoft.com/office/powerpoint/2010/main" val="435083686"/>
+        <p14:creationId xmlns:p14="http://schemas.microsoft.com/office/powerpoint/2010/main" val="2626990070"/>
       </p:ext>
     </p:extLst>
   </p:cSld>

</xml_diff>

<commit_message>
fork and pull added to notes
</commit_message>
<xml_diff>
--- a/My_Notes.pptx
+++ b/My_Notes.pptx
@@ -13,21 +13,23 @@
     <p:sldId id="276" r:id="rId7"/>
     <p:sldId id="277" r:id="rId8"/>
     <p:sldId id="279" r:id="rId9"/>
-    <p:sldId id="259" r:id="rId10"/>
-    <p:sldId id="260" r:id="rId11"/>
-    <p:sldId id="263" r:id="rId12"/>
-    <p:sldId id="261" r:id="rId13"/>
-    <p:sldId id="264" r:id="rId14"/>
-    <p:sldId id="265" r:id="rId15"/>
-    <p:sldId id="266" r:id="rId16"/>
-    <p:sldId id="267" r:id="rId17"/>
-    <p:sldId id="268" r:id="rId18"/>
-    <p:sldId id="269" r:id="rId19"/>
-    <p:sldId id="270" r:id="rId20"/>
-    <p:sldId id="271" r:id="rId21"/>
-    <p:sldId id="272" r:id="rId22"/>
-    <p:sldId id="273" r:id="rId23"/>
-    <p:sldId id="278" r:id="rId24"/>
+    <p:sldId id="280" r:id="rId10"/>
+    <p:sldId id="281" r:id="rId11"/>
+    <p:sldId id="259" r:id="rId12"/>
+    <p:sldId id="260" r:id="rId13"/>
+    <p:sldId id="263" r:id="rId14"/>
+    <p:sldId id="261" r:id="rId15"/>
+    <p:sldId id="264" r:id="rId16"/>
+    <p:sldId id="265" r:id="rId17"/>
+    <p:sldId id="266" r:id="rId18"/>
+    <p:sldId id="267" r:id="rId19"/>
+    <p:sldId id="268" r:id="rId20"/>
+    <p:sldId id="269" r:id="rId21"/>
+    <p:sldId id="270" r:id="rId22"/>
+    <p:sldId id="271" r:id="rId23"/>
+    <p:sldId id="272" r:id="rId24"/>
+    <p:sldId id="273" r:id="rId25"/>
+    <p:sldId id="278" r:id="rId26"/>
   </p:sldIdLst>
   <p:sldSz cx="12192000" cy="6858000"/>
   <p:notesSz cx="6858000" cy="9144000"/>
@@ -265,7 +267,7 @@
           <a:p>
             <a:fld id="{7E78085B-F18A-4A1F-99A8-25ED8654ADA2}" type="datetimeFigureOut">
               <a:rPr lang="en-US" smtClean="0"/>
-              <a:t>1/27/2021</a:t>
+              <a:t>1/28/2021</a:t>
             </a:fld>
             <a:endParaRPr lang="en-US"/>
           </a:p>
@@ -435,7 +437,7 @@
           <a:p>
             <a:fld id="{7E78085B-F18A-4A1F-99A8-25ED8654ADA2}" type="datetimeFigureOut">
               <a:rPr lang="en-US" smtClean="0"/>
-              <a:t>1/27/2021</a:t>
+              <a:t>1/28/2021</a:t>
             </a:fld>
             <a:endParaRPr lang="en-US"/>
           </a:p>
@@ -615,7 +617,7 @@
           <a:p>
             <a:fld id="{7E78085B-F18A-4A1F-99A8-25ED8654ADA2}" type="datetimeFigureOut">
               <a:rPr lang="en-US" smtClean="0"/>
-              <a:t>1/27/2021</a:t>
+              <a:t>1/28/2021</a:t>
             </a:fld>
             <a:endParaRPr lang="en-US"/>
           </a:p>
@@ -785,7 +787,7 @@
           <a:p>
             <a:fld id="{7E78085B-F18A-4A1F-99A8-25ED8654ADA2}" type="datetimeFigureOut">
               <a:rPr lang="en-US" smtClean="0"/>
-              <a:t>1/27/2021</a:t>
+              <a:t>1/28/2021</a:t>
             </a:fld>
             <a:endParaRPr lang="en-US"/>
           </a:p>
@@ -1031,7 +1033,7 @@
           <a:p>
             <a:fld id="{7E78085B-F18A-4A1F-99A8-25ED8654ADA2}" type="datetimeFigureOut">
               <a:rPr lang="en-US" smtClean="0"/>
-              <a:t>1/27/2021</a:t>
+              <a:t>1/28/2021</a:t>
             </a:fld>
             <a:endParaRPr lang="en-US"/>
           </a:p>
@@ -1263,7 +1265,7 @@
           <a:p>
             <a:fld id="{7E78085B-F18A-4A1F-99A8-25ED8654ADA2}" type="datetimeFigureOut">
               <a:rPr lang="en-US" smtClean="0"/>
-              <a:t>1/27/2021</a:t>
+              <a:t>1/28/2021</a:t>
             </a:fld>
             <a:endParaRPr lang="en-US"/>
           </a:p>
@@ -1630,7 +1632,7 @@
           <a:p>
             <a:fld id="{7E78085B-F18A-4A1F-99A8-25ED8654ADA2}" type="datetimeFigureOut">
               <a:rPr lang="en-US" smtClean="0"/>
-              <a:t>1/27/2021</a:t>
+              <a:t>1/28/2021</a:t>
             </a:fld>
             <a:endParaRPr lang="en-US"/>
           </a:p>
@@ -1748,7 +1750,7 @@
           <a:p>
             <a:fld id="{7E78085B-F18A-4A1F-99A8-25ED8654ADA2}" type="datetimeFigureOut">
               <a:rPr lang="en-US" smtClean="0"/>
-              <a:t>1/27/2021</a:t>
+              <a:t>1/28/2021</a:t>
             </a:fld>
             <a:endParaRPr lang="en-US"/>
           </a:p>
@@ -1843,7 +1845,7 @@
           <a:p>
             <a:fld id="{7E78085B-F18A-4A1F-99A8-25ED8654ADA2}" type="datetimeFigureOut">
               <a:rPr lang="en-US" smtClean="0"/>
-              <a:t>1/27/2021</a:t>
+              <a:t>1/28/2021</a:t>
             </a:fld>
             <a:endParaRPr lang="en-US"/>
           </a:p>
@@ -2120,7 +2122,7 @@
           <a:p>
             <a:fld id="{7E78085B-F18A-4A1F-99A8-25ED8654ADA2}" type="datetimeFigureOut">
               <a:rPr lang="en-US" smtClean="0"/>
-              <a:t>1/27/2021</a:t>
+              <a:t>1/28/2021</a:t>
             </a:fld>
             <a:endParaRPr lang="en-US"/>
           </a:p>
@@ -2373,7 +2375,7 @@
           <a:p>
             <a:fld id="{7E78085B-F18A-4A1F-99A8-25ED8654ADA2}" type="datetimeFigureOut">
               <a:rPr lang="en-US" smtClean="0"/>
-              <a:t>1/27/2021</a:t>
+              <a:t>1/28/2021</a:t>
             </a:fld>
             <a:endParaRPr lang="en-US"/>
           </a:p>
@@ -2586,7 +2588,7 @@
           <a:p>
             <a:fld id="{7E78085B-F18A-4A1F-99A8-25ED8654ADA2}" type="datetimeFigureOut">
               <a:rPr lang="en-US" smtClean="0"/>
-              <a:t>1/27/2021</a:t>
+              <a:t>1/28/2021</a:t>
             </a:fld>
             <a:endParaRPr lang="en-US"/>
           </a:p>
@@ -3070,6 +3072,250 @@
             <a:r>
               <a:rPr lang="en-US" b="1" dirty="0" smtClean="0">
                 <a:solidFill>
+                  <a:srgbClr val="00B0F0"/>
+                </a:solidFill>
+              </a:rPr>
+              <a:t>Pull </a:t>
+            </a:r>
+            <a:endParaRPr lang="en-US" b="1" dirty="0">
+              <a:solidFill>
+                <a:srgbClr val="00B0F0"/>
+              </a:solidFill>
+            </a:endParaRPr>
+          </a:p>
+        </p:txBody>
+      </p:sp>
+      <p:sp>
+        <p:nvSpPr>
+          <p:cNvPr id="3" name="Content Placeholder 2"/>
+          <p:cNvSpPr>
+            <a:spLocks noGrp="1"/>
+          </p:cNvSpPr>
+          <p:nvPr>
+            <p:ph idx="1"/>
+          </p:nvPr>
+        </p:nvSpPr>
+        <p:spPr/>
+        <p:txBody>
+          <a:bodyPr/>
+          <a:lstStyle/>
+          <a:p>
+            <a:r>
+              <a:rPr lang="en-US" dirty="0" smtClean="0"/>
+              <a:t>You found a bug in </a:t>
+            </a:r>
+            <a:r>
+              <a:rPr lang="en-US" dirty="0"/>
+              <a:t>“github.com/</a:t>
+            </a:r>
+            <a:r>
+              <a:rPr lang="en-US" dirty="0" err="1"/>
+              <a:t>spondon</a:t>
+            </a:r>
+            <a:r>
+              <a:rPr lang="en-US" dirty="0"/>
+              <a:t>/offline</a:t>
+            </a:r>
+            <a:r>
+              <a:rPr lang="en-US" dirty="0" smtClean="0"/>
+              <a:t>” repo. You forked it. Fixed the bug. And you want </a:t>
+            </a:r>
+            <a:r>
+              <a:rPr lang="en-US" dirty="0" err="1" smtClean="0"/>
+              <a:t>spodon</a:t>
+            </a:r>
+            <a:r>
+              <a:rPr lang="en-US" dirty="0" smtClean="0"/>
+              <a:t> to adopt the fix into his repo. So what you will do is make a pull request to </a:t>
+            </a:r>
+            <a:r>
+              <a:rPr lang="en-US" dirty="0" err="1" smtClean="0"/>
+              <a:t>spondon’s</a:t>
+            </a:r>
+            <a:r>
+              <a:rPr lang="en-US" dirty="0" smtClean="0"/>
+              <a:t> repo. Now </a:t>
+            </a:r>
+            <a:r>
+              <a:rPr lang="en-US" dirty="0" err="1" smtClean="0"/>
+              <a:t>spondon</a:t>
+            </a:r>
+            <a:r>
+              <a:rPr lang="en-US" dirty="0" smtClean="0"/>
+              <a:t> will be notified with the request and can response anyway.</a:t>
+            </a:r>
+          </a:p>
+          <a:p>
+            <a:endParaRPr lang="en-US" dirty="0"/>
+          </a:p>
+          <a:p>
+            <a:r>
+              <a:rPr lang="en-US" dirty="0" err="1"/>
+              <a:t>git</a:t>
+            </a:r>
+            <a:r>
+              <a:rPr lang="en-US" dirty="0"/>
+              <a:t> pull demo : </a:t>
+            </a:r>
+            <a:r>
+              <a:rPr lang="en-US" dirty="0">
+                <a:hlinkClick r:id="rId2"/>
+              </a:rPr>
+              <a:t>https://youtu.be/rgbCcBNZcdQ</a:t>
+            </a:r>
+            <a:endParaRPr lang="en-US" dirty="0"/>
+          </a:p>
+          <a:p>
+            <a:pPr marL="0" indent="0">
+              <a:buNone/>
+            </a:pPr>
+            <a:endParaRPr lang="en-US" dirty="0"/>
+          </a:p>
+        </p:txBody>
+      </p:sp>
+    </p:spTree>
+    <p:extLst>
+      <p:ext uri="{BB962C8B-B14F-4D97-AF65-F5344CB8AC3E}">
+        <p14:creationId xmlns:p14="http://schemas.microsoft.com/office/powerpoint/2010/main" val="68830615"/>
+      </p:ext>
+    </p:extLst>
+  </p:cSld>
+  <p:clrMapOvr>
+    <a:masterClrMapping/>
+  </p:clrMapOvr>
+</p:sld>
+</file>
+
+<file path=ppt/slides/slide11.xml><?xml version="1.0" encoding="utf-8"?>
+<p:sld xmlns:a="http://schemas.openxmlformats.org/drawingml/2006/main" xmlns:r="http://schemas.openxmlformats.org/officeDocument/2006/relationships" xmlns:p="http://schemas.openxmlformats.org/presentationml/2006/main">
+  <p:cSld>
+    <p:spTree>
+      <p:nvGrpSpPr>
+        <p:cNvPr id="1" name=""/>
+        <p:cNvGrpSpPr/>
+        <p:nvPr/>
+      </p:nvGrpSpPr>
+      <p:grpSpPr>
+        <a:xfrm>
+          <a:off x="0" y="0"/>
+          <a:ext cx="0" cy="0"/>
+          <a:chOff x="0" y="0"/>
+          <a:chExt cx="0" cy="0"/>
+        </a:xfrm>
+      </p:grpSpPr>
+      <p:sp>
+        <p:nvSpPr>
+          <p:cNvPr id="2" name="Title 1"/>
+          <p:cNvSpPr>
+            <a:spLocks noGrp="1"/>
+          </p:cNvSpPr>
+          <p:nvPr>
+            <p:ph type="title"/>
+          </p:nvPr>
+        </p:nvSpPr>
+        <p:spPr/>
+        <p:txBody>
+          <a:bodyPr/>
+          <a:lstStyle/>
+          <a:p>
+            <a:r>
+              <a:rPr lang="en-US" b="1" dirty="0" smtClean="0">
+                <a:solidFill>
+                  <a:schemeClr val="accent1"/>
+                </a:solidFill>
+              </a:rPr>
+              <a:t>Everything about .</a:t>
+            </a:r>
+            <a:r>
+              <a:rPr lang="en-US" b="1" dirty="0" err="1" smtClean="0">
+                <a:solidFill>
+                  <a:schemeClr val="accent1"/>
+                </a:solidFill>
+              </a:rPr>
+              <a:t>gitignore</a:t>
+            </a:r>
+            <a:endParaRPr lang="en-US" b="1" dirty="0">
+              <a:solidFill>
+                <a:schemeClr val="accent1"/>
+              </a:solidFill>
+            </a:endParaRPr>
+          </a:p>
+        </p:txBody>
+      </p:sp>
+      <p:pic>
+        <p:nvPicPr>
+          <p:cNvPr id="4" name="Content Placeholder 3"/>
+          <p:cNvPicPr>
+            <a:picLocks noGrp="1" noChangeAspect="1"/>
+          </p:cNvPicPr>
+          <p:nvPr>
+            <p:ph idx="1"/>
+          </p:nvPr>
+        </p:nvPicPr>
+        <p:blipFill>
+          <a:blip r:embed="rId2"/>
+          <a:stretch>
+            <a:fillRect/>
+          </a:stretch>
+        </p:blipFill>
+        <p:spPr>
+          <a:xfrm>
+            <a:off x="489258" y="1501254"/>
+            <a:ext cx="10801990" cy="5356746"/>
+          </a:xfrm>
+          <a:prstGeom prst="rect">
+            <a:avLst/>
+          </a:prstGeom>
+        </p:spPr>
+      </p:pic>
+    </p:spTree>
+    <p:extLst>
+      <p:ext uri="{BB962C8B-B14F-4D97-AF65-F5344CB8AC3E}">
+        <p14:creationId xmlns:p14="http://schemas.microsoft.com/office/powerpoint/2010/main" val="2626990070"/>
+      </p:ext>
+    </p:extLst>
+  </p:cSld>
+  <p:clrMapOvr>
+    <a:masterClrMapping/>
+  </p:clrMapOvr>
+</p:sld>
+</file>
+
+<file path=ppt/slides/slide12.xml><?xml version="1.0" encoding="utf-8"?>
+<p:sld xmlns:a="http://schemas.openxmlformats.org/drawingml/2006/main" xmlns:r="http://schemas.openxmlformats.org/officeDocument/2006/relationships" xmlns:p="http://schemas.openxmlformats.org/presentationml/2006/main">
+  <p:cSld>
+    <p:spTree>
+      <p:nvGrpSpPr>
+        <p:cNvPr id="1" name=""/>
+        <p:cNvGrpSpPr/>
+        <p:nvPr/>
+      </p:nvGrpSpPr>
+      <p:grpSpPr>
+        <a:xfrm>
+          <a:off x="0" y="0"/>
+          <a:ext cx="0" cy="0"/>
+          <a:chOff x="0" y="0"/>
+          <a:chExt cx="0" cy="0"/>
+        </a:xfrm>
+      </p:grpSpPr>
+      <p:sp>
+        <p:nvSpPr>
+          <p:cNvPr id="2" name="Title 1"/>
+          <p:cNvSpPr>
+            <a:spLocks noGrp="1"/>
+          </p:cNvSpPr>
+          <p:nvPr>
+            <p:ph type="title"/>
+          </p:nvPr>
+        </p:nvSpPr>
+        <p:spPr/>
+        <p:txBody>
+          <a:bodyPr/>
+          <a:lstStyle/>
+          <a:p>
+            <a:r>
+              <a:rPr lang="en-US" b="1" dirty="0" smtClean="0">
+                <a:solidFill>
                   <a:schemeClr val="accent1"/>
                 </a:solidFill>
               </a:rPr>
@@ -3155,7 +3401,7 @@
 </p:sld>
 </file>
 
-<file path=ppt/slides/slide11.xml><?xml version="1.0" encoding="utf-8"?>
+<file path=ppt/slides/slide13.xml><?xml version="1.0" encoding="utf-8"?>
 <p:sld xmlns:a="http://schemas.openxmlformats.org/drawingml/2006/main" xmlns:r="http://schemas.openxmlformats.org/officeDocument/2006/relationships" xmlns:p="http://schemas.openxmlformats.org/presentationml/2006/main">
   <p:cSld>
     <p:spTree>
@@ -3227,7 +3473,7 @@
 </p:sld>
 </file>
 
-<file path=ppt/slides/slide12.xml><?xml version="1.0" encoding="utf-8"?>
+<file path=ppt/slides/slide14.xml><?xml version="1.0" encoding="utf-8"?>
 <p:sld xmlns:a="http://schemas.openxmlformats.org/drawingml/2006/main" xmlns:r="http://schemas.openxmlformats.org/officeDocument/2006/relationships" xmlns:p="http://schemas.openxmlformats.org/presentationml/2006/main">
   <p:cSld>
     <p:spTree>
@@ -3316,7 +3562,7 @@
 </p:sld>
 </file>
 
-<file path=ppt/slides/slide13.xml><?xml version="1.0" encoding="utf-8"?>
+<file path=ppt/slides/slide15.xml><?xml version="1.0" encoding="utf-8"?>
 <p:sld xmlns:a="http://schemas.openxmlformats.org/drawingml/2006/main" xmlns:r="http://schemas.openxmlformats.org/officeDocument/2006/relationships" xmlns:p="http://schemas.openxmlformats.org/presentationml/2006/main">
   <p:cSld>
     <p:spTree>
@@ -3394,7 +3640,7 @@
 </p:sld>
 </file>
 
-<file path=ppt/slides/slide14.xml><?xml version="1.0" encoding="utf-8"?>
+<file path=ppt/slides/slide16.xml><?xml version="1.0" encoding="utf-8"?>
 <p:sld xmlns:a="http://schemas.openxmlformats.org/drawingml/2006/main" xmlns:r="http://schemas.openxmlformats.org/officeDocument/2006/relationships" xmlns:p="http://schemas.openxmlformats.org/presentationml/2006/main">
   <p:cSld>
     <p:spTree>
@@ -3486,7 +3732,7 @@
 </p:sld>
 </file>
 
-<file path=ppt/slides/slide15.xml><?xml version="1.0" encoding="utf-8"?>
+<file path=ppt/slides/slide17.xml><?xml version="1.0" encoding="utf-8"?>
 <p:sld xmlns:a="http://schemas.openxmlformats.org/drawingml/2006/main" xmlns:r="http://schemas.openxmlformats.org/officeDocument/2006/relationships" xmlns:p="http://schemas.openxmlformats.org/presentationml/2006/main">
   <p:cSld>
     <p:spTree>
@@ -3578,7 +3824,7 @@
 </p:sld>
 </file>
 
-<file path=ppt/slides/slide16.xml><?xml version="1.0" encoding="utf-8"?>
+<file path=ppt/slides/slide18.xml><?xml version="1.0" encoding="utf-8"?>
 <p:sld xmlns:a="http://schemas.openxmlformats.org/drawingml/2006/main" xmlns:r="http://schemas.openxmlformats.org/officeDocument/2006/relationships" xmlns:p="http://schemas.openxmlformats.org/presentationml/2006/main">
   <p:cSld>
     <p:spTree>
@@ -3694,7 +3940,7 @@
 </p:sld>
 </file>
 
-<file path=ppt/slides/slide17.xml><?xml version="1.0" encoding="utf-8"?>
+<file path=ppt/slides/slide19.xml><?xml version="1.0" encoding="utf-8"?>
 <p:sld xmlns:a="http://schemas.openxmlformats.org/drawingml/2006/main" xmlns:r="http://schemas.openxmlformats.org/officeDocument/2006/relationships" xmlns:p="http://schemas.openxmlformats.org/presentationml/2006/main">
   <p:cSld>
     <p:spTree>
@@ -3810,190 +4056,6 @@
 </p:sld>
 </file>
 
-<file path=ppt/slides/slide18.xml><?xml version="1.0" encoding="utf-8"?>
-<p:sld xmlns:a="http://schemas.openxmlformats.org/drawingml/2006/main" xmlns:r="http://schemas.openxmlformats.org/officeDocument/2006/relationships" xmlns:p="http://schemas.openxmlformats.org/presentationml/2006/main">
-  <p:cSld>
-    <p:spTree>
-      <p:nvGrpSpPr>
-        <p:cNvPr id="1" name=""/>
-        <p:cNvGrpSpPr/>
-        <p:nvPr/>
-      </p:nvGrpSpPr>
-      <p:grpSpPr>
-        <a:xfrm>
-          <a:off x="0" y="0"/>
-          <a:ext cx="0" cy="0"/>
-          <a:chOff x="0" y="0"/>
-          <a:chExt cx="0" cy="0"/>
-        </a:xfrm>
-      </p:grpSpPr>
-      <p:sp>
-        <p:nvSpPr>
-          <p:cNvPr id="2" name="Title 1"/>
-          <p:cNvSpPr>
-            <a:spLocks noGrp="1"/>
-          </p:cNvSpPr>
-          <p:nvPr>
-            <p:ph type="title"/>
-          </p:nvPr>
-        </p:nvSpPr>
-        <p:spPr/>
-        <p:txBody>
-          <a:bodyPr/>
-          <a:lstStyle/>
-          <a:p>
-            <a:endParaRPr lang="en-US"/>
-          </a:p>
-        </p:txBody>
-      </p:sp>
-      <p:sp>
-        <p:nvSpPr>
-          <p:cNvPr id="3" name="Content Placeholder 2"/>
-          <p:cNvSpPr>
-            <a:spLocks noGrp="1"/>
-          </p:cNvSpPr>
-          <p:nvPr>
-            <p:ph idx="1"/>
-          </p:nvPr>
-        </p:nvSpPr>
-        <p:spPr/>
-        <p:txBody>
-          <a:bodyPr/>
-          <a:lstStyle/>
-          <a:p>
-            <a:endParaRPr lang="en-US" dirty="0"/>
-          </a:p>
-        </p:txBody>
-      </p:sp>
-      <p:pic>
-        <p:nvPicPr>
-          <p:cNvPr id="4" name="Picture 3"/>
-          <p:cNvPicPr>
-            <a:picLocks noChangeAspect="1"/>
-          </p:cNvPicPr>
-          <p:nvPr/>
-        </p:nvPicPr>
-        <p:blipFill>
-          <a:blip r:embed="rId2"/>
-          <a:stretch>
-            <a:fillRect/>
-          </a:stretch>
-        </p:blipFill>
-        <p:spPr>
-          <a:xfrm>
-            <a:off x="838200" y="365125"/>
-            <a:ext cx="10515600" cy="6308630"/>
-          </a:xfrm>
-          <a:prstGeom prst="rect">
-            <a:avLst/>
-          </a:prstGeom>
-        </p:spPr>
-      </p:pic>
-    </p:spTree>
-    <p:extLst>
-      <p:ext uri="{BB962C8B-B14F-4D97-AF65-F5344CB8AC3E}">
-        <p14:creationId xmlns:p14="http://schemas.microsoft.com/office/powerpoint/2010/main" val="1532713193"/>
-      </p:ext>
-    </p:extLst>
-  </p:cSld>
-  <p:clrMapOvr>
-    <a:masterClrMapping/>
-  </p:clrMapOvr>
-</p:sld>
-</file>
-
-<file path=ppt/slides/slide19.xml><?xml version="1.0" encoding="utf-8"?>
-<p:sld xmlns:a="http://schemas.openxmlformats.org/drawingml/2006/main" xmlns:r="http://schemas.openxmlformats.org/officeDocument/2006/relationships" xmlns:p="http://schemas.openxmlformats.org/presentationml/2006/main">
-  <p:cSld>
-    <p:spTree>
-      <p:nvGrpSpPr>
-        <p:cNvPr id="1" name=""/>
-        <p:cNvGrpSpPr/>
-        <p:nvPr/>
-      </p:nvGrpSpPr>
-      <p:grpSpPr>
-        <a:xfrm>
-          <a:off x="0" y="0"/>
-          <a:ext cx="0" cy="0"/>
-          <a:chOff x="0" y="0"/>
-          <a:chExt cx="0" cy="0"/>
-        </a:xfrm>
-      </p:grpSpPr>
-      <p:sp>
-        <p:nvSpPr>
-          <p:cNvPr id="2" name="Title 1"/>
-          <p:cNvSpPr>
-            <a:spLocks noGrp="1"/>
-          </p:cNvSpPr>
-          <p:nvPr>
-            <p:ph type="title"/>
-          </p:nvPr>
-        </p:nvSpPr>
-        <p:spPr/>
-        <p:txBody>
-          <a:bodyPr/>
-          <a:lstStyle/>
-          <a:p>
-            <a:endParaRPr lang="en-US"/>
-          </a:p>
-        </p:txBody>
-      </p:sp>
-      <p:sp>
-        <p:nvSpPr>
-          <p:cNvPr id="3" name="Content Placeholder 2"/>
-          <p:cNvSpPr>
-            <a:spLocks noGrp="1"/>
-          </p:cNvSpPr>
-          <p:nvPr>
-            <p:ph idx="1"/>
-          </p:nvPr>
-        </p:nvSpPr>
-        <p:spPr/>
-        <p:txBody>
-          <a:bodyPr/>
-          <a:lstStyle/>
-          <a:p>
-            <a:endParaRPr lang="en-US"/>
-          </a:p>
-        </p:txBody>
-      </p:sp>
-      <p:pic>
-        <p:nvPicPr>
-          <p:cNvPr id="4" name="Picture 3"/>
-          <p:cNvPicPr>
-            <a:picLocks noChangeAspect="1"/>
-          </p:cNvPicPr>
-          <p:nvPr/>
-        </p:nvPicPr>
-        <p:blipFill>
-          <a:blip r:embed="rId2"/>
-          <a:stretch>
-            <a:fillRect/>
-          </a:stretch>
-        </p:blipFill>
-        <p:spPr>
-          <a:xfrm>
-            <a:off x="696036" y="150125"/>
-            <a:ext cx="10795379" cy="6707875"/>
-          </a:xfrm>
-          <a:prstGeom prst="rect">
-            <a:avLst/>
-          </a:prstGeom>
-        </p:spPr>
-      </p:pic>
-    </p:spTree>
-    <p:extLst>
-      <p:ext uri="{BB962C8B-B14F-4D97-AF65-F5344CB8AC3E}">
-        <p14:creationId xmlns:p14="http://schemas.microsoft.com/office/powerpoint/2010/main" val="424983537"/>
-      </p:ext>
-    </p:extLst>
-  </p:cSld>
-  <p:clrMapOvr>
-    <a:masterClrMapping/>
-  </p:clrMapOvr>
-</p:sld>
-</file>
-
 <file path=ppt/slides/slide2.xml><?xml version="1.0" encoding="utf-8"?>
 <p:sld xmlns:a="http://schemas.openxmlformats.org/drawingml/2006/main" xmlns:r="http://schemas.openxmlformats.org/officeDocument/2006/relationships" xmlns:p="http://schemas.openxmlformats.org/presentationml/2006/main">
   <p:cSld>
@@ -4101,6 +4163,190 @@
           <a:bodyPr/>
           <a:lstStyle/>
           <a:p>
+            <a:endParaRPr lang="en-US" dirty="0"/>
+          </a:p>
+        </p:txBody>
+      </p:sp>
+      <p:pic>
+        <p:nvPicPr>
+          <p:cNvPr id="4" name="Picture 3"/>
+          <p:cNvPicPr>
+            <a:picLocks noChangeAspect="1"/>
+          </p:cNvPicPr>
+          <p:nvPr/>
+        </p:nvPicPr>
+        <p:blipFill>
+          <a:blip r:embed="rId2"/>
+          <a:stretch>
+            <a:fillRect/>
+          </a:stretch>
+        </p:blipFill>
+        <p:spPr>
+          <a:xfrm>
+            <a:off x="838200" y="365125"/>
+            <a:ext cx="10515600" cy="6308630"/>
+          </a:xfrm>
+          <a:prstGeom prst="rect">
+            <a:avLst/>
+          </a:prstGeom>
+        </p:spPr>
+      </p:pic>
+    </p:spTree>
+    <p:extLst>
+      <p:ext uri="{BB962C8B-B14F-4D97-AF65-F5344CB8AC3E}">
+        <p14:creationId xmlns:p14="http://schemas.microsoft.com/office/powerpoint/2010/main" val="1532713193"/>
+      </p:ext>
+    </p:extLst>
+  </p:cSld>
+  <p:clrMapOvr>
+    <a:masterClrMapping/>
+  </p:clrMapOvr>
+</p:sld>
+</file>
+
+<file path=ppt/slides/slide21.xml><?xml version="1.0" encoding="utf-8"?>
+<p:sld xmlns:a="http://schemas.openxmlformats.org/drawingml/2006/main" xmlns:r="http://schemas.openxmlformats.org/officeDocument/2006/relationships" xmlns:p="http://schemas.openxmlformats.org/presentationml/2006/main">
+  <p:cSld>
+    <p:spTree>
+      <p:nvGrpSpPr>
+        <p:cNvPr id="1" name=""/>
+        <p:cNvGrpSpPr/>
+        <p:nvPr/>
+      </p:nvGrpSpPr>
+      <p:grpSpPr>
+        <a:xfrm>
+          <a:off x="0" y="0"/>
+          <a:ext cx="0" cy="0"/>
+          <a:chOff x="0" y="0"/>
+          <a:chExt cx="0" cy="0"/>
+        </a:xfrm>
+      </p:grpSpPr>
+      <p:sp>
+        <p:nvSpPr>
+          <p:cNvPr id="2" name="Title 1"/>
+          <p:cNvSpPr>
+            <a:spLocks noGrp="1"/>
+          </p:cNvSpPr>
+          <p:nvPr>
+            <p:ph type="title"/>
+          </p:nvPr>
+        </p:nvSpPr>
+        <p:spPr/>
+        <p:txBody>
+          <a:bodyPr/>
+          <a:lstStyle/>
+          <a:p>
+            <a:endParaRPr lang="en-US"/>
+          </a:p>
+        </p:txBody>
+      </p:sp>
+      <p:sp>
+        <p:nvSpPr>
+          <p:cNvPr id="3" name="Content Placeholder 2"/>
+          <p:cNvSpPr>
+            <a:spLocks noGrp="1"/>
+          </p:cNvSpPr>
+          <p:nvPr>
+            <p:ph idx="1"/>
+          </p:nvPr>
+        </p:nvSpPr>
+        <p:spPr/>
+        <p:txBody>
+          <a:bodyPr/>
+          <a:lstStyle/>
+          <a:p>
+            <a:endParaRPr lang="en-US"/>
+          </a:p>
+        </p:txBody>
+      </p:sp>
+      <p:pic>
+        <p:nvPicPr>
+          <p:cNvPr id="4" name="Picture 3"/>
+          <p:cNvPicPr>
+            <a:picLocks noChangeAspect="1"/>
+          </p:cNvPicPr>
+          <p:nvPr/>
+        </p:nvPicPr>
+        <p:blipFill>
+          <a:blip r:embed="rId2"/>
+          <a:stretch>
+            <a:fillRect/>
+          </a:stretch>
+        </p:blipFill>
+        <p:spPr>
+          <a:xfrm>
+            <a:off x="696036" y="150125"/>
+            <a:ext cx="10795379" cy="6707875"/>
+          </a:xfrm>
+          <a:prstGeom prst="rect">
+            <a:avLst/>
+          </a:prstGeom>
+        </p:spPr>
+      </p:pic>
+    </p:spTree>
+    <p:extLst>
+      <p:ext uri="{BB962C8B-B14F-4D97-AF65-F5344CB8AC3E}">
+        <p14:creationId xmlns:p14="http://schemas.microsoft.com/office/powerpoint/2010/main" val="424983537"/>
+      </p:ext>
+    </p:extLst>
+  </p:cSld>
+  <p:clrMapOvr>
+    <a:masterClrMapping/>
+  </p:clrMapOvr>
+</p:sld>
+</file>
+
+<file path=ppt/slides/slide22.xml><?xml version="1.0" encoding="utf-8"?>
+<p:sld xmlns:a="http://schemas.openxmlformats.org/drawingml/2006/main" xmlns:r="http://schemas.openxmlformats.org/officeDocument/2006/relationships" xmlns:p="http://schemas.openxmlformats.org/presentationml/2006/main">
+  <p:cSld>
+    <p:spTree>
+      <p:nvGrpSpPr>
+        <p:cNvPr id="1" name=""/>
+        <p:cNvGrpSpPr/>
+        <p:nvPr/>
+      </p:nvGrpSpPr>
+      <p:grpSpPr>
+        <a:xfrm>
+          <a:off x="0" y="0"/>
+          <a:ext cx="0" cy="0"/>
+          <a:chOff x="0" y="0"/>
+          <a:chExt cx="0" cy="0"/>
+        </a:xfrm>
+      </p:grpSpPr>
+      <p:sp>
+        <p:nvSpPr>
+          <p:cNvPr id="2" name="Title 1"/>
+          <p:cNvSpPr>
+            <a:spLocks noGrp="1"/>
+          </p:cNvSpPr>
+          <p:nvPr>
+            <p:ph type="title"/>
+          </p:nvPr>
+        </p:nvSpPr>
+        <p:spPr/>
+        <p:txBody>
+          <a:bodyPr/>
+          <a:lstStyle/>
+          <a:p>
+            <a:endParaRPr lang="en-US"/>
+          </a:p>
+        </p:txBody>
+      </p:sp>
+      <p:sp>
+        <p:nvSpPr>
+          <p:cNvPr id="3" name="Content Placeholder 2"/>
+          <p:cNvSpPr>
+            <a:spLocks noGrp="1"/>
+          </p:cNvSpPr>
+          <p:nvPr>
+            <p:ph idx="1"/>
+          </p:nvPr>
+        </p:nvSpPr>
+        <p:spPr/>
+        <p:txBody>
+          <a:bodyPr/>
+          <a:lstStyle/>
+          <a:p>
             <a:endParaRPr lang="en-US"/>
           </a:p>
         </p:txBody>
@@ -4142,7 +4388,7 @@
 </p:sld>
 </file>
 
-<file path=ppt/slides/slide21.xml><?xml version="1.0" encoding="utf-8"?>
+<file path=ppt/slides/slide23.xml><?xml version="1.0" encoding="utf-8"?>
 <p:sld xmlns:a="http://schemas.openxmlformats.org/drawingml/2006/main" xmlns:r="http://schemas.openxmlformats.org/officeDocument/2006/relationships" xmlns:p="http://schemas.openxmlformats.org/presentationml/2006/main">
   <p:cSld>
     <p:spTree>
@@ -4234,7 +4480,7 @@
 </p:sld>
 </file>
 
-<file path=ppt/slides/slide22.xml><?xml version="1.0" encoding="utf-8"?>
+<file path=ppt/slides/slide24.xml><?xml version="1.0" encoding="utf-8"?>
 <p:sld xmlns:a="http://schemas.openxmlformats.org/drawingml/2006/main" xmlns:r="http://schemas.openxmlformats.org/officeDocument/2006/relationships" xmlns:p="http://schemas.openxmlformats.org/presentationml/2006/main">
   <p:cSld>
     <p:spTree>
@@ -4326,7 +4572,7 @@
 </p:sld>
 </file>
 
-<file path=ppt/slides/slide23.xml><?xml version="1.0" encoding="utf-8"?>
+<file path=ppt/slides/slide25.xml><?xml version="1.0" encoding="utf-8"?>
 <p:sld xmlns:a="http://schemas.openxmlformats.org/drawingml/2006/main" xmlns:r="http://schemas.openxmlformats.org/officeDocument/2006/relationships" xmlns:p="http://schemas.openxmlformats.org/presentationml/2006/main">
   <p:cSld>
     <p:spTree>
@@ -5030,11 +5276,7 @@
             </a:r>
             <a:r>
               <a:rPr lang="en-US" dirty="0" smtClean="0"/>
-              <a:t> checkout </a:t>
-            </a:r>
-            <a:r>
-              <a:rPr lang="en-US" dirty="0" smtClean="0"/>
-              <a:t>master</a:t>
+              <a:t> checkout master</a:t>
             </a:r>
           </a:p>
           <a:p>
@@ -5442,57 +5684,92 @@
             <a:r>
               <a:rPr lang="en-US" b="1" dirty="0" smtClean="0">
                 <a:solidFill>
-                  <a:schemeClr val="accent1"/>
+                  <a:srgbClr val="00B0F0"/>
                 </a:solidFill>
               </a:rPr>
-              <a:t>Everything about .</a:t>
-            </a:r>
-            <a:r>
-              <a:rPr lang="en-US" b="1" dirty="0" err="1" smtClean="0">
-                <a:solidFill>
-                  <a:schemeClr val="accent1"/>
-                </a:solidFill>
-              </a:rPr>
-              <a:t>gitignore</a:t>
+              <a:t>Fork </a:t>
             </a:r>
             <a:endParaRPr lang="en-US" b="1" dirty="0">
               <a:solidFill>
-                <a:schemeClr val="accent1"/>
+                <a:srgbClr val="00B0F0"/>
               </a:solidFill>
             </a:endParaRPr>
           </a:p>
         </p:txBody>
       </p:sp>
-      <p:pic>
-        <p:nvPicPr>
-          <p:cNvPr id="4" name="Content Placeholder 3"/>
-          <p:cNvPicPr>
-            <a:picLocks noGrp="1" noChangeAspect="1"/>
-          </p:cNvPicPr>
+      <p:sp>
+        <p:nvSpPr>
+          <p:cNvPr id="3" name="Content Placeholder 2"/>
+          <p:cNvSpPr>
+            <a:spLocks noGrp="1"/>
+          </p:cNvSpPr>
           <p:nvPr>
             <p:ph idx="1"/>
           </p:nvPr>
-        </p:nvPicPr>
-        <p:blipFill>
-          <a:blip r:embed="rId2"/>
-          <a:stretch>
-            <a:fillRect/>
-          </a:stretch>
-        </p:blipFill>
-        <p:spPr>
-          <a:xfrm>
-            <a:off x="489258" y="1501254"/>
-            <a:ext cx="10801990" cy="5356746"/>
-          </a:xfrm>
-          <a:prstGeom prst="rect">
-            <a:avLst/>
-          </a:prstGeom>
-        </p:spPr>
-      </p:pic>
+        </p:nvSpPr>
+        <p:spPr/>
+        <p:txBody>
+          <a:bodyPr/>
+          <a:lstStyle/>
+          <a:p>
+            <a:r>
+              <a:rPr lang="en-US" dirty="0" smtClean="0"/>
+              <a:t>How it works?</a:t>
+            </a:r>
+          </a:p>
+          <a:p>
+            <a:pPr lvl="1"/>
+            <a:r>
+              <a:rPr lang="en-US" dirty="0" smtClean="0"/>
+              <a:t>Suppose, I want to edit “github.com/</a:t>
+            </a:r>
+            <a:r>
+              <a:rPr lang="en-US" dirty="0" err="1" smtClean="0"/>
+              <a:t>spondon</a:t>
+            </a:r>
+            <a:r>
+              <a:rPr lang="en-US" dirty="0" smtClean="0"/>
+              <a:t>/offline” repository </a:t>
+            </a:r>
+          </a:p>
+          <a:p>
+            <a:pPr lvl="1"/>
+            <a:r>
+              <a:rPr lang="en-US" dirty="0" smtClean="0"/>
+              <a:t>But I don’t have edit access. So, I’ll fork that repo which will create a copy repo of  that repo. So after forking, I’ll find a new repo “github.com/</a:t>
+            </a:r>
+            <a:r>
+              <a:rPr lang="en-US" dirty="0" err="1" smtClean="0"/>
+              <a:t>anasmoni</a:t>
+            </a:r>
+            <a:r>
+              <a:rPr lang="en-US" dirty="0" smtClean="0"/>
+              <a:t>/offline” in my account which I can edit.</a:t>
+            </a:r>
+          </a:p>
+          <a:p>
+            <a:pPr lvl="1"/>
+            <a:r>
+              <a:rPr lang="en-US" dirty="0" smtClean="0"/>
+              <a:t>So, it’s useful when you want to customize a open source software </a:t>
+            </a:r>
+          </a:p>
+          <a:p>
+            <a:endParaRPr lang="en-US" dirty="0" smtClean="0"/>
+          </a:p>
+          <a:p>
+            <a:r>
+              <a:rPr lang="en-US" dirty="0" smtClean="0"/>
+              <a:t>We fork from UI instead of writing command </a:t>
+            </a:r>
+            <a:endParaRPr lang="en-US" dirty="0"/>
+          </a:p>
+        </p:txBody>
+      </p:sp>
     </p:spTree>
     <p:extLst>
       <p:ext uri="{BB962C8B-B14F-4D97-AF65-F5344CB8AC3E}">
-        <p14:creationId xmlns:p14="http://schemas.microsoft.com/office/powerpoint/2010/main" val="2626990070"/>
+        <p14:creationId xmlns:p14="http://schemas.microsoft.com/office/powerpoint/2010/main" val="253635805"/>
       </p:ext>
     </p:extLst>
   </p:cSld>

</xml_diff>

<commit_message>
notes updated and more links added to readme
</commit_message>
<xml_diff>
--- a/My_Notes.pptx
+++ b/My_Notes.pptx
@@ -18,18 +18,19 @@
     <p:sldId id="259" r:id="rId12"/>
     <p:sldId id="260" r:id="rId13"/>
     <p:sldId id="263" r:id="rId14"/>
-    <p:sldId id="261" r:id="rId15"/>
-    <p:sldId id="264" r:id="rId16"/>
-    <p:sldId id="265" r:id="rId17"/>
-    <p:sldId id="266" r:id="rId18"/>
-    <p:sldId id="267" r:id="rId19"/>
-    <p:sldId id="268" r:id="rId20"/>
-    <p:sldId id="269" r:id="rId21"/>
-    <p:sldId id="270" r:id="rId22"/>
-    <p:sldId id="271" r:id="rId23"/>
-    <p:sldId id="272" r:id="rId24"/>
-    <p:sldId id="273" r:id="rId25"/>
-    <p:sldId id="278" r:id="rId26"/>
+    <p:sldId id="282" r:id="rId15"/>
+    <p:sldId id="261" r:id="rId16"/>
+    <p:sldId id="264" r:id="rId17"/>
+    <p:sldId id="265" r:id="rId18"/>
+    <p:sldId id="266" r:id="rId19"/>
+    <p:sldId id="267" r:id="rId20"/>
+    <p:sldId id="268" r:id="rId21"/>
+    <p:sldId id="269" r:id="rId22"/>
+    <p:sldId id="270" r:id="rId23"/>
+    <p:sldId id="271" r:id="rId24"/>
+    <p:sldId id="272" r:id="rId25"/>
+    <p:sldId id="273" r:id="rId26"/>
+    <p:sldId id="278" r:id="rId27"/>
   </p:sldIdLst>
   <p:sldSz cx="12192000" cy="6858000"/>
   <p:notesSz cx="6858000" cy="9144000"/>
@@ -267,7 +268,7 @@
           <a:p>
             <a:fld id="{7E78085B-F18A-4A1F-99A8-25ED8654ADA2}" type="datetimeFigureOut">
               <a:rPr lang="en-US" smtClean="0"/>
-              <a:t>1/28/2021</a:t>
+              <a:t>2/1/2021</a:t>
             </a:fld>
             <a:endParaRPr lang="en-US"/>
           </a:p>
@@ -437,7 +438,7 @@
           <a:p>
             <a:fld id="{7E78085B-F18A-4A1F-99A8-25ED8654ADA2}" type="datetimeFigureOut">
               <a:rPr lang="en-US" smtClean="0"/>
-              <a:t>1/28/2021</a:t>
+              <a:t>2/1/2021</a:t>
             </a:fld>
             <a:endParaRPr lang="en-US"/>
           </a:p>
@@ -617,7 +618,7 @@
           <a:p>
             <a:fld id="{7E78085B-F18A-4A1F-99A8-25ED8654ADA2}" type="datetimeFigureOut">
               <a:rPr lang="en-US" smtClean="0"/>
-              <a:t>1/28/2021</a:t>
+              <a:t>2/1/2021</a:t>
             </a:fld>
             <a:endParaRPr lang="en-US"/>
           </a:p>
@@ -787,7 +788,7 @@
           <a:p>
             <a:fld id="{7E78085B-F18A-4A1F-99A8-25ED8654ADA2}" type="datetimeFigureOut">
               <a:rPr lang="en-US" smtClean="0"/>
-              <a:t>1/28/2021</a:t>
+              <a:t>2/1/2021</a:t>
             </a:fld>
             <a:endParaRPr lang="en-US"/>
           </a:p>
@@ -1033,7 +1034,7 @@
           <a:p>
             <a:fld id="{7E78085B-F18A-4A1F-99A8-25ED8654ADA2}" type="datetimeFigureOut">
               <a:rPr lang="en-US" smtClean="0"/>
-              <a:t>1/28/2021</a:t>
+              <a:t>2/1/2021</a:t>
             </a:fld>
             <a:endParaRPr lang="en-US"/>
           </a:p>
@@ -1265,7 +1266,7 @@
           <a:p>
             <a:fld id="{7E78085B-F18A-4A1F-99A8-25ED8654ADA2}" type="datetimeFigureOut">
               <a:rPr lang="en-US" smtClean="0"/>
-              <a:t>1/28/2021</a:t>
+              <a:t>2/1/2021</a:t>
             </a:fld>
             <a:endParaRPr lang="en-US"/>
           </a:p>
@@ -1632,7 +1633,7 @@
           <a:p>
             <a:fld id="{7E78085B-F18A-4A1F-99A8-25ED8654ADA2}" type="datetimeFigureOut">
               <a:rPr lang="en-US" smtClean="0"/>
-              <a:t>1/28/2021</a:t>
+              <a:t>2/1/2021</a:t>
             </a:fld>
             <a:endParaRPr lang="en-US"/>
           </a:p>
@@ -1750,7 +1751,7 @@
           <a:p>
             <a:fld id="{7E78085B-F18A-4A1F-99A8-25ED8654ADA2}" type="datetimeFigureOut">
               <a:rPr lang="en-US" smtClean="0"/>
-              <a:t>1/28/2021</a:t>
+              <a:t>2/1/2021</a:t>
             </a:fld>
             <a:endParaRPr lang="en-US"/>
           </a:p>
@@ -1845,7 +1846,7 @@
           <a:p>
             <a:fld id="{7E78085B-F18A-4A1F-99A8-25ED8654ADA2}" type="datetimeFigureOut">
               <a:rPr lang="en-US" smtClean="0"/>
-              <a:t>1/28/2021</a:t>
+              <a:t>2/1/2021</a:t>
             </a:fld>
             <a:endParaRPr lang="en-US"/>
           </a:p>
@@ -2122,7 +2123,7 @@
           <a:p>
             <a:fld id="{7E78085B-F18A-4A1F-99A8-25ED8654ADA2}" type="datetimeFigureOut">
               <a:rPr lang="en-US" smtClean="0"/>
-              <a:t>1/28/2021</a:t>
+              <a:t>2/1/2021</a:t>
             </a:fld>
             <a:endParaRPr lang="en-US"/>
           </a:p>
@@ -2375,7 +2376,7 @@
           <a:p>
             <a:fld id="{7E78085B-F18A-4A1F-99A8-25ED8654ADA2}" type="datetimeFigureOut">
               <a:rPr lang="en-US" smtClean="0"/>
-              <a:t>1/28/2021</a:t>
+              <a:t>2/1/2021</a:t>
             </a:fld>
             <a:endParaRPr lang="en-US"/>
           </a:p>
@@ -2588,7 +2589,7 @@
           <a:p>
             <a:fld id="{7E78085B-F18A-4A1F-99A8-25ED8654ADA2}" type="datetimeFigureOut">
               <a:rPr lang="en-US" smtClean="0"/>
-              <a:t>1/28/2021</a:t>
+              <a:t>2/1/2021</a:t>
             </a:fld>
             <a:endParaRPr lang="en-US"/>
           </a:p>
@@ -3122,7 +3123,7 @@
             </a:r>
             <a:r>
               <a:rPr lang="en-US" dirty="0" err="1" smtClean="0"/>
-              <a:t>spodon</a:t>
+              <a:t>spondon</a:t>
             </a:r>
             <a:r>
               <a:rPr lang="en-US" dirty="0" smtClean="0"/>
@@ -3492,6 +3493,142 @@
       </p:grpSpPr>
       <p:sp>
         <p:nvSpPr>
+          <p:cNvPr id="2" name="Title 1"/>
+          <p:cNvSpPr>
+            <a:spLocks noGrp="1"/>
+          </p:cNvSpPr>
+          <p:nvPr>
+            <p:ph type="title"/>
+          </p:nvPr>
+        </p:nvSpPr>
+        <p:spPr>
+          <a:xfrm>
+            <a:off x="101220" y="4718761"/>
+            <a:ext cx="10515600" cy="1995938"/>
+          </a:xfrm>
+        </p:spPr>
+        <p:txBody>
+          <a:bodyPr>
+            <a:normAutofit/>
+          </a:bodyPr>
+          <a:lstStyle/>
+          <a:p>
+            <a:r>
+              <a:rPr lang="en-US" sz="2400" b="1" dirty="0" smtClean="0"/>
+              <a:t>Steps to quite the above vim window.</a:t>
+            </a:r>
+            <a:r>
+              <a:rPr lang="en-US" sz="2400" dirty="0" smtClean="0"/>
+              <a:t/>
+            </a:r>
+            <a:br>
+              <a:rPr lang="en-US" sz="2400" dirty="0" smtClean="0"/>
+            </a:br>
+            <a:r>
+              <a:rPr lang="en-US" sz="2400" dirty="0" smtClean="0"/>
+              <a:t/>
+            </a:r>
+            <a:br>
+              <a:rPr lang="en-US" sz="2400" dirty="0" smtClean="0"/>
+            </a:br>
+            <a:r>
+              <a:rPr lang="en-US" sz="2400" dirty="0" smtClean="0"/>
+              <a:t>1. press </a:t>
+            </a:r>
+            <a:r>
+              <a:rPr lang="en-US" sz="2400" b="1" dirty="0" smtClean="0"/>
+              <a:t>“</a:t>
+            </a:r>
+            <a:r>
+              <a:rPr lang="en-US" sz="2400" b="1" dirty="0" err="1" smtClean="0"/>
+              <a:t>i</a:t>
+            </a:r>
+            <a:r>
+              <a:rPr lang="en-US" sz="2400" b="1" dirty="0" smtClean="0"/>
+              <a:t>”</a:t>
+            </a:r>
+            <a:r>
+              <a:rPr lang="en-US" sz="2400" dirty="0" smtClean="0"/>
+              <a:t> to enter into insert mode , do editing task</a:t>
+            </a:r>
+            <a:br>
+              <a:rPr lang="en-US" sz="2400" dirty="0" smtClean="0"/>
+            </a:br>
+            <a:r>
+              <a:rPr lang="en-US" sz="2400" dirty="0" smtClean="0"/>
+              <a:t>2. press </a:t>
+            </a:r>
+            <a:r>
+              <a:rPr lang="en-US" sz="2400" b="1" dirty="0" smtClean="0"/>
+              <a:t>“esc” “:“ “w” “q” </a:t>
+            </a:r>
+            <a:br>
+              <a:rPr lang="en-US" sz="2400" b="1" dirty="0" smtClean="0"/>
+            </a:br>
+            <a:r>
+              <a:rPr lang="en-US" sz="2400" dirty="0" smtClean="0"/>
+              <a:t>3. hit enter </a:t>
+            </a:r>
+            <a:endParaRPr lang="en-US" sz="2400" dirty="0"/>
+          </a:p>
+        </p:txBody>
+      </p:sp>
+      <p:pic>
+        <p:nvPicPr>
+          <p:cNvPr id="3" name="Picture 2"/>
+          <p:cNvPicPr>
+            <a:picLocks noChangeAspect="1"/>
+          </p:cNvPicPr>
+          <p:nvPr/>
+        </p:nvPicPr>
+        <p:blipFill>
+          <a:blip r:embed="rId2"/>
+          <a:stretch>
+            <a:fillRect/>
+          </a:stretch>
+        </p:blipFill>
+        <p:spPr>
+          <a:xfrm>
+            <a:off x="0" y="0"/>
+            <a:ext cx="7192370" cy="4333056"/>
+          </a:xfrm>
+          <a:prstGeom prst="rect">
+            <a:avLst/>
+          </a:prstGeom>
+        </p:spPr>
+      </p:pic>
+    </p:spTree>
+    <p:extLst>
+      <p:ext uri="{BB962C8B-B14F-4D97-AF65-F5344CB8AC3E}">
+        <p14:creationId xmlns:p14="http://schemas.microsoft.com/office/powerpoint/2010/main" val="2382476139"/>
+      </p:ext>
+    </p:extLst>
+  </p:cSld>
+  <p:clrMapOvr>
+    <a:masterClrMapping/>
+  </p:clrMapOvr>
+</p:sld>
+</file>
+
+<file path=ppt/slides/slide15.xml><?xml version="1.0" encoding="utf-8"?>
+<p:sld xmlns:a="http://schemas.openxmlformats.org/drawingml/2006/main" xmlns:r="http://schemas.openxmlformats.org/officeDocument/2006/relationships" xmlns:p="http://schemas.openxmlformats.org/presentationml/2006/main">
+  <p:cSld>
+    <p:spTree>
+      <p:nvGrpSpPr>
+        <p:cNvPr id="1" name=""/>
+        <p:cNvGrpSpPr/>
+        <p:nvPr/>
+      </p:nvGrpSpPr>
+      <p:grpSpPr>
+        <a:xfrm>
+          <a:off x="0" y="0"/>
+          <a:ext cx="0" cy="0"/>
+          <a:chOff x="0" y="0"/>
+          <a:chExt cx="0" cy="0"/>
+        </a:xfrm>
+      </p:grpSpPr>
+      <p:sp>
+        <p:nvSpPr>
           <p:cNvPr id="3" name="Content Placeholder 2"/>
           <p:cNvSpPr>
             <a:spLocks noGrp="1"/>
@@ -3562,7 +3699,7 @@
 </p:sld>
 </file>
 
-<file path=ppt/slides/slide15.xml><?xml version="1.0" encoding="utf-8"?>
+<file path=ppt/slides/slide16.xml><?xml version="1.0" encoding="utf-8"?>
 <p:sld xmlns:a="http://schemas.openxmlformats.org/drawingml/2006/main" xmlns:r="http://schemas.openxmlformats.org/officeDocument/2006/relationships" xmlns:p="http://schemas.openxmlformats.org/presentationml/2006/main">
   <p:cSld>
     <p:spTree>
@@ -3627,6 +3764,30 @@
           </a:prstGeom>
         </p:spPr>
       </p:pic>
+      <p:pic>
+        <p:nvPicPr>
+          <p:cNvPr id="2" name="Picture 1"/>
+          <p:cNvPicPr>
+            <a:picLocks noChangeAspect="1"/>
+          </p:cNvPicPr>
+          <p:nvPr/>
+        </p:nvPicPr>
+        <p:blipFill>
+          <a:blip r:embed="rId3"/>
+          <a:stretch>
+            <a:fillRect/>
+          </a:stretch>
+        </p:blipFill>
+        <p:spPr>
+          <a:xfrm>
+            <a:off x="3509151" y="1277488"/>
+            <a:ext cx="7994775" cy="3171682"/>
+          </a:xfrm>
+          <a:prstGeom prst="rect">
+            <a:avLst/>
+          </a:prstGeom>
+        </p:spPr>
+      </p:pic>
     </p:spTree>
     <p:extLst>
       <p:ext uri="{BB962C8B-B14F-4D97-AF65-F5344CB8AC3E}">
@@ -3640,7 +3801,7 @@
 </p:sld>
 </file>
 
-<file path=ppt/slides/slide16.xml><?xml version="1.0" encoding="utf-8"?>
+<file path=ppt/slides/slide17.xml><?xml version="1.0" encoding="utf-8"?>
 <p:sld xmlns:a="http://schemas.openxmlformats.org/drawingml/2006/main" xmlns:r="http://schemas.openxmlformats.org/officeDocument/2006/relationships" xmlns:p="http://schemas.openxmlformats.org/presentationml/2006/main">
   <p:cSld>
     <p:spTree>
@@ -3732,7 +3893,7 @@
 </p:sld>
 </file>
 
-<file path=ppt/slides/slide17.xml><?xml version="1.0" encoding="utf-8"?>
+<file path=ppt/slides/slide18.xml><?xml version="1.0" encoding="utf-8"?>
 <p:sld xmlns:a="http://schemas.openxmlformats.org/drawingml/2006/main" xmlns:r="http://schemas.openxmlformats.org/officeDocument/2006/relationships" xmlns:p="http://schemas.openxmlformats.org/presentationml/2006/main">
   <p:cSld>
     <p:spTree>
@@ -3824,7 +3985,7 @@
 </p:sld>
 </file>
 
-<file path=ppt/slides/slide18.xml><?xml version="1.0" encoding="utf-8"?>
+<file path=ppt/slides/slide19.xml><?xml version="1.0" encoding="utf-8"?>
 <p:sld xmlns:a="http://schemas.openxmlformats.org/drawingml/2006/main" xmlns:r="http://schemas.openxmlformats.org/officeDocument/2006/relationships" xmlns:p="http://schemas.openxmlformats.org/presentationml/2006/main">
   <p:cSld>
     <p:spTree>
@@ -3940,7 +4101,63 @@
 </p:sld>
 </file>
 
-<file path=ppt/slides/slide19.xml><?xml version="1.0" encoding="utf-8"?>
+<file path=ppt/slides/slide2.xml><?xml version="1.0" encoding="utf-8"?>
+<p:sld xmlns:a="http://schemas.openxmlformats.org/drawingml/2006/main" xmlns:r="http://schemas.openxmlformats.org/officeDocument/2006/relationships" xmlns:p="http://schemas.openxmlformats.org/presentationml/2006/main">
+  <p:cSld>
+    <p:spTree>
+      <p:nvGrpSpPr>
+        <p:cNvPr id="1" name=""/>
+        <p:cNvGrpSpPr/>
+        <p:nvPr/>
+      </p:nvGrpSpPr>
+      <p:grpSpPr>
+        <a:xfrm>
+          <a:off x="0" y="0"/>
+          <a:ext cx="0" cy="0"/>
+          <a:chOff x="0" y="0"/>
+          <a:chExt cx="0" cy="0"/>
+        </a:xfrm>
+      </p:grpSpPr>
+      <p:pic>
+        <p:nvPicPr>
+          <p:cNvPr id="4" name="Content Placeholder 3"/>
+          <p:cNvPicPr>
+            <a:picLocks noGrp="1" noChangeAspect="1"/>
+          </p:cNvPicPr>
+          <p:nvPr>
+            <p:ph idx="1"/>
+          </p:nvPr>
+        </p:nvPicPr>
+        <p:blipFill>
+          <a:blip r:embed="rId2"/>
+          <a:stretch>
+            <a:fillRect/>
+          </a:stretch>
+        </p:blipFill>
+        <p:spPr>
+          <a:xfrm>
+            <a:off x="232013" y="504967"/>
+            <a:ext cx="11723426" cy="6353033"/>
+          </a:xfrm>
+          <a:prstGeom prst="rect">
+            <a:avLst/>
+          </a:prstGeom>
+        </p:spPr>
+      </p:pic>
+    </p:spTree>
+    <p:extLst>
+      <p:ext uri="{BB962C8B-B14F-4D97-AF65-F5344CB8AC3E}">
+        <p14:creationId xmlns:p14="http://schemas.microsoft.com/office/powerpoint/2010/main" val="1719757755"/>
+      </p:ext>
+    </p:extLst>
+  </p:cSld>
+  <p:clrMapOvr>
+    <a:masterClrMapping/>
+  </p:clrMapOvr>
+</p:sld>
+</file>
+
+<file path=ppt/slides/slide20.xml><?xml version="1.0" encoding="utf-8"?>
 <p:sld xmlns:a="http://schemas.openxmlformats.org/drawingml/2006/main" xmlns:r="http://schemas.openxmlformats.org/officeDocument/2006/relationships" xmlns:p="http://schemas.openxmlformats.org/presentationml/2006/main">
   <p:cSld>
     <p:spTree>
@@ -4056,63 +4273,7 @@
 </p:sld>
 </file>
 
-<file path=ppt/slides/slide2.xml><?xml version="1.0" encoding="utf-8"?>
-<p:sld xmlns:a="http://schemas.openxmlformats.org/drawingml/2006/main" xmlns:r="http://schemas.openxmlformats.org/officeDocument/2006/relationships" xmlns:p="http://schemas.openxmlformats.org/presentationml/2006/main">
-  <p:cSld>
-    <p:spTree>
-      <p:nvGrpSpPr>
-        <p:cNvPr id="1" name=""/>
-        <p:cNvGrpSpPr/>
-        <p:nvPr/>
-      </p:nvGrpSpPr>
-      <p:grpSpPr>
-        <a:xfrm>
-          <a:off x="0" y="0"/>
-          <a:ext cx="0" cy="0"/>
-          <a:chOff x="0" y="0"/>
-          <a:chExt cx="0" cy="0"/>
-        </a:xfrm>
-      </p:grpSpPr>
-      <p:pic>
-        <p:nvPicPr>
-          <p:cNvPr id="4" name="Content Placeholder 3"/>
-          <p:cNvPicPr>
-            <a:picLocks noGrp="1" noChangeAspect="1"/>
-          </p:cNvPicPr>
-          <p:nvPr>
-            <p:ph idx="1"/>
-          </p:nvPr>
-        </p:nvPicPr>
-        <p:blipFill>
-          <a:blip r:embed="rId2"/>
-          <a:stretch>
-            <a:fillRect/>
-          </a:stretch>
-        </p:blipFill>
-        <p:spPr>
-          <a:xfrm>
-            <a:off x="232013" y="504967"/>
-            <a:ext cx="11723426" cy="6353033"/>
-          </a:xfrm>
-          <a:prstGeom prst="rect">
-            <a:avLst/>
-          </a:prstGeom>
-        </p:spPr>
-      </p:pic>
-    </p:spTree>
-    <p:extLst>
-      <p:ext uri="{BB962C8B-B14F-4D97-AF65-F5344CB8AC3E}">
-        <p14:creationId xmlns:p14="http://schemas.microsoft.com/office/powerpoint/2010/main" val="1719757755"/>
-      </p:ext>
-    </p:extLst>
-  </p:cSld>
-  <p:clrMapOvr>
-    <a:masterClrMapping/>
-  </p:clrMapOvr>
-</p:sld>
-</file>
-
-<file path=ppt/slides/slide20.xml><?xml version="1.0" encoding="utf-8"?>
+<file path=ppt/slides/slide21.xml><?xml version="1.0" encoding="utf-8"?>
 <p:sld xmlns:a="http://schemas.openxmlformats.org/drawingml/2006/main" xmlns:r="http://schemas.openxmlformats.org/officeDocument/2006/relationships" xmlns:p="http://schemas.openxmlformats.org/presentationml/2006/main">
   <p:cSld>
     <p:spTree>
@@ -4204,7 +4365,7 @@
 </p:sld>
 </file>
 
-<file path=ppt/slides/slide21.xml><?xml version="1.0" encoding="utf-8"?>
+<file path=ppt/slides/slide22.xml><?xml version="1.0" encoding="utf-8"?>
 <p:sld xmlns:a="http://schemas.openxmlformats.org/drawingml/2006/main" xmlns:r="http://schemas.openxmlformats.org/officeDocument/2006/relationships" xmlns:p="http://schemas.openxmlformats.org/presentationml/2006/main">
   <p:cSld>
     <p:spTree>
@@ -4296,7 +4457,7 @@
 </p:sld>
 </file>
 
-<file path=ppt/slides/slide22.xml><?xml version="1.0" encoding="utf-8"?>
+<file path=ppt/slides/slide23.xml><?xml version="1.0" encoding="utf-8"?>
 <p:sld xmlns:a="http://schemas.openxmlformats.org/drawingml/2006/main" xmlns:r="http://schemas.openxmlformats.org/officeDocument/2006/relationships" xmlns:p="http://schemas.openxmlformats.org/presentationml/2006/main">
   <p:cSld>
     <p:spTree>
@@ -4388,7 +4549,7 @@
 </p:sld>
 </file>
 
-<file path=ppt/slides/slide23.xml><?xml version="1.0" encoding="utf-8"?>
+<file path=ppt/slides/slide24.xml><?xml version="1.0" encoding="utf-8"?>
 <p:sld xmlns:a="http://schemas.openxmlformats.org/drawingml/2006/main" xmlns:r="http://schemas.openxmlformats.org/officeDocument/2006/relationships" xmlns:p="http://schemas.openxmlformats.org/presentationml/2006/main">
   <p:cSld>
     <p:spTree>
@@ -4480,7 +4641,7 @@
 </p:sld>
 </file>
 
-<file path=ppt/slides/slide24.xml><?xml version="1.0" encoding="utf-8"?>
+<file path=ppt/slides/slide25.xml><?xml version="1.0" encoding="utf-8"?>
 <p:sld xmlns:a="http://schemas.openxmlformats.org/drawingml/2006/main" xmlns:r="http://schemas.openxmlformats.org/officeDocument/2006/relationships" xmlns:p="http://schemas.openxmlformats.org/presentationml/2006/main">
   <p:cSld>
     <p:spTree>
@@ -4572,7 +4733,7 @@
 </p:sld>
 </file>
 
-<file path=ppt/slides/slide25.xml><?xml version="1.0" encoding="utf-8"?>
+<file path=ppt/slides/slide26.xml><?xml version="1.0" encoding="utf-8"?>
 <p:sld xmlns:a="http://schemas.openxmlformats.org/drawingml/2006/main" xmlns:r="http://schemas.openxmlformats.org/officeDocument/2006/relationships" xmlns:p="http://schemas.openxmlformats.org/presentationml/2006/main">
   <p:cSld>
     <p:spTree>
@@ -4591,25 +4752,6 @@
       </p:grpSpPr>
       <p:sp>
         <p:nvSpPr>
-          <p:cNvPr id="2" name="Title 1"/>
-          <p:cNvSpPr>
-            <a:spLocks noGrp="1"/>
-          </p:cNvSpPr>
-          <p:nvPr>
-            <p:ph type="title"/>
-          </p:nvPr>
-        </p:nvSpPr>
-        <p:spPr/>
-        <p:txBody>
-          <a:bodyPr/>
-          <a:lstStyle/>
-          <a:p>
-            <a:endParaRPr lang="en-US"/>
-          </a:p>
-        </p:txBody>
-      </p:sp>
-      <p:sp>
-        <p:nvSpPr>
           <p:cNvPr id="3" name="Content Placeholder 2"/>
           <p:cNvSpPr>
             <a:spLocks noGrp="1"/>
@@ -4618,12 +4760,147 @@
             <p:ph idx="1"/>
           </p:nvPr>
         </p:nvSpPr>
-        <p:spPr/>
-        <p:txBody>
-          <a:bodyPr/>
-          <a:lstStyle/>
-          <a:p>
-            <a:endParaRPr lang="en-US"/>
+        <p:spPr>
+          <a:xfrm>
+            <a:off x="838200" y="313899"/>
+            <a:ext cx="10515600" cy="5863064"/>
+          </a:xfrm>
+        </p:spPr>
+        <p:txBody>
+          <a:bodyPr/>
+          <a:lstStyle/>
+          <a:p>
+            <a:r>
+              <a:rPr lang="en-US" dirty="0" smtClean="0"/>
+              <a:t> </a:t>
+            </a:r>
+            <a:r>
+              <a:rPr lang="en-US" dirty="0" err="1" smtClean="0"/>
+              <a:t>git</a:t>
+            </a:r>
+            <a:r>
+              <a:rPr lang="en-US" dirty="0"/>
+              <a:t> </a:t>
+            </a:r>
+            <a:r>
+              <a:rPr lang="en-US" dirty="0" smtClean="0"/>
+              <a:t>commit --amend --no-edit </a:t>
+            </a:r>
+          </a:p>
+          <a:p>
+            <a:pPr lvl="1"/>
+            <a:r>
+              <a:rPr lang="en-US" dirty="0" smtClean="0"/>
+              <a:t>Adds your newly staged changes to the last commit</a:t>
+            </a:r>
+          </a:p>
+          <a:p>
+            <a:pPr lvl="1"/>
+            <a:r>
+              <a:rPr lang="en-US" dirty="0" smtClean="0"/>
+              <a:t>No-edit option tells that you don’t want to reword(change the commit message) .</a:t>
+            </a:r>
+          </a:p>
+          <a:p>
+            <a:pPr lvl="1"/>
+            <a:r>
+              <a:rPr lang="en-US" dirty="0" smtClean="0"/>
+              <a:t>If you want to edit commit message then write </a:t>
+            </a:r>
+          </a:p>
+          <a:p>
+            <a:pPr lvl="2"/>
+            <a:r>
+              <a:rPr lang="en-US" dirty="0" smtClean="0"/>
+              <a:t>“ </a:t>
+            </a:r>
+            <a:r>
+              <a:rPr lang="en-US" dirty="0" err="1" smtClean="0"/>
+              <a:t>git</a:t>
+            </a:r>
+            <a:r>
+              <a:rPr lang="en-US" dirty="0" smtClean="0"/>
+              <a:t> commit --amend “ hit enter , a vim window will show up</a:t>
+            </a:r>
+          </a:p>
+          <a:p>
+            <a:pPr lvl="2"/>
+            <a:r>
+              <a:rPr lang="en-US" dirty="0" smtClean="0"/>
+              <a:t>Press “</a:t>
+            </a:r>
+            <a:r>
+              <a:rPr lang="en-US" dirty="0" err="1" smtClean="0"/>
+              <a:t>i</a:t>
+            </a:r>
+            <a:r>
+              <a:rPr lang="en-US" dirty="0" smtClean="0"/>
+              <a:t>” for insert mode in vim</a:t>
+            </a:r>
+          </a:p>
+          <a:p>
+            <a:pPr lvl="2"/>
+            <a:r>
+              <a:rPr lang="en-US" dirty="0" smtClean="0"/>
+              <a:t>Change the commit message </a:t>
+            </a:r>
+          </a:p>
+          <a:p>
+            <a:pPr lvl="2"/>
+            <a:r>
+              <a:rPr lang="en-US" dirty="0" smtClean="0"/>
+              <a:t>Press “esc” then “:” “w” “q” then hit enter </a:t>
+            </a:r>
+          </a:p>
+          <a:p>
+            <a:pPr marL="0" indent="0">
+              <a:buNone/>
+            </a:pPr>
+            <a:endParaRPr lang="en-US" dirty="0"/>
+          </a:p>
+          <a:p>
+            <a:r>
+              <a:rPr lang="en-US" dirty="0" smtClean="0"/>
+              <a:t>working with commit </a:t>
+            </a:r>
+          </a:p>
+          <a:p>
+            <a:pPr lvl="1"/>
+            <a:r>
+              <a:rPr lang="en-US" dirty="0"/>
+              <a:t> </a:t>
+            </a:r>
+            <a:r>
+              <a:rPr lang="en-US" dirty="0" err="1" smtClean="0"/>
+              <a:t>git</a:t>
+            </a:r>
+            <a:r>
+              <a:rPr lang="en-US" dirty="0" smtClean="0"/>
+              <a:t> rebase -</a:t>
+            </a:r>
+            <a:r>
+              <a:rPr lang="en-US" dirty="0" err="1" smtClean="0"/>
+              <a:t>i</a:t>
+            </a:r>
+            <a:r>
+              <a:rPr lang="en-US" dirty="0" smtClean="0"/>
+              <a:t> HEAD~2 </a:t>
+            </a:r>
+          </a:p>
+          <a:p>
+            <a:pPr lvl="2"/>
+            <a:r>
+              <a:rPr lang="en-US" dirty="0" smtClean="0"/>
+              <a:t>Meaning , operate on last two commits from head </a:t>
+            </a:r>
+          </a:p>
+          <a:p>
+            <a:pPr lvl="2"/>
+            <a:r>
+              <a:rPr lang="en-US" dirty="0" smtClean="0"/>
+              <a:t>A vim window will show up, which will allow you to operate on commits </a:t>
+            </a:r>
+            <a:endParaRPr lang="en-US" dirty="0"/>
           </a:p>
         </p:txBody>
       </p:sp>
@@ -4916,6 +5193,27 @@
             <a:r>
               <a:rPr lang="en-US" dirty="0" smtClean="0"/>
               <a:t> commit –m “ write some commit message here“</a:t>
+            </a:r>
+          </a:p>
+          <a:p>
+            <a:r>
+              <a:rPr lang="en-US" dirty="0" smtClean="0"/>
+              <a:t> </a:t>
+            </a:r>
+            <a:r>
+              <a:rPr lang="en-US" dirty="0" err="1" smtClean="0"/>
+              <a:t>git</a:t>
+            </a:r>
+            <a:r>
+              <a:rPr lang="en-US" dirty="0" smtClean="0"/>
+              <a:t> pull </a:t>
+            </a:r>
+          </a:p>
+          <a:p>
+            <a:pPr lvl="1"/>
+            <a:r>
+              <a:rPr lang="en-US" dirty="0" smtClean="0"/>
+              <a:t>Remote repo may have new updates, so local needs to be updated </a:t>
             </a:r>
             <a:endParaRPr lang="en-US" dirty="0"/>
           </a:p>

</xml_diff>